<commit_message>
adding some notes a bunch of pictures
</commit_message>
<xml_diff>
--- a/notes/Jan_28.pptx
+++ b/notes/Jan_28.pptx
@@ -18,13 +18,22 @@
     <p:sldId id="266" r:id="rId12"/>
     <p:sldId id="267" r:id="rId13"/>
     <p:sldId id="268" r:id="rId14"/>
-    <p:sldId id="269" r:id="rId15"/>
-    <p:sldId id="270" r:id="rId16"/>
-    <p:sldId id="271" r:id="rId17"/>
-    <p:sldId id="272" r:id="rId18"/>
-    <p:sldId id="273" r:id="rId19"/>
-    <p:sldId id="274" r:id="rId20"/>
-    <p:sldId id="275" r:id="rId21"/>
+    <p:sldId id="284" r:id="rId15"/>
+    <p:sldId id="269" r:id="rId16"/>
+    <p:sldId id="270" r:id="rId17"/>
+    <p:sldId id="283" r:id="rId18"/>
+    <p:sldId id="271" r:id="rId19"/>
+    <p:sldId id="277" r:id="rId20"/>
+    <p:sldId id="272" r:id="rId21"/>
+    <p:sldId id="273" r:id="rId22"/>
+    <p:sldId id="274" r:id="rId23"/>
+    <p:sldId id="275" r:id="rId24"/>
+    <p:sldId id="276" r:id="rId25"/>
+    <p:sldId id="278" r:id="rId26"/>
+    <p:sldId id="279" r:id="rId27"/>
+    <p:sldId id="280" r:id="rId28"/>
+    <p:sldId id="282" r:id="rId29"/>
+    <p:sldId id="281" r:id="rId30"/>
   </p:sldIdLst>
   <p:sldSz cx="12192000" cy="6858000"/>
   <p:notesSz cx="6858000" cy="9144000"/>
@@ -131,10 +140,16 @@
 </p:presentation>
 </file>
 
+<file path=ppt/authors.xml><?xml version="1.0" encoding="utf-8"?>
+<p188:authorLst xmlns:a="http://schemas.openxmlformats.org/drawingml/2006/main" xmlns:r="http://schemas.openxmlformats.org/officeDocument/2006/relationships" xmlns:p188="http://schemas.microsoft.com/office/powerpoint/2018/8/main">
+  <p188:author id="{FAC213E7-3D36-80F8-1B98-250F805A11AD}" name="Katie Johnston" initials="KJ" userId="Katie Johnston" providerId="None"/>
+</p188:authorLst>
+</file>
+
 <file path=ppt/revisionInfo.xml><?xml version="1.0" encoding="utf-8"?>
 <p1510:revInfo xmlns:a="http://schemas.openxmlformats.org/drawingml/2006/main" xmlns:r="http://schemas.openxmlformats.org/officeDocument/2006/relationships" xmlns:p1510="http://schemas.microsoft.com/office/powerpoint/2015/10/main">
   <p1510:revLst>
-    <p1510:client id="{DB61940C-CE1C-48E4-866C-23208D1E079C}" v="231" dt="2022-02-24T22:06:52.691"/>
+    <p1510:client id="{DB61940C-CE1C-48E4-866C-23208D1E079C}" v="361" dt="2022-03-09T17:32:30.738"/>
   </p1510:revLst>
 </p1510:revInfo>
 </file>
@@ -144,7 +159,7 @@
   <pc:docChgLst>
     <pc:chgData name="Katie Johnston" userId="a8803450-7667-44c1-ac00-9653f319424f" providerId="ADAL" clId="{DB61940C-CE1C-48E4-866C-23208D1E079C}"/>
     <pc:docChg chg="undo custSel addSld modSld">
-      <pc:chgData name="Katie Johnston" userId="a8803450-7667-44c1-ac00-9653f319424f" providerId="ADAL" clId="{DB61940C-CE1C-48E4-866C-23208D1E079C}" dt="2022-02-24T22:08:00.019" v="2716" actId="20577"/>
+      <pc:chgData name="Katie Johnston" userId="a8803450-7667-44c1-ac00-9653f319424f" providerId="ADAL" clId="{DB61940C-CE1C-48E4-866C-23208D1E079C}" dt="2022-03-09T17:32:30.738" v="3965"/>
       <pc:docMkLst>
         <pc:docMk/>
       </pc:docMkLst>
@@ -604,7 +619,7 @@
         </pc:picChg>
       </pc:sldChg>
       <pc:sldChg chg="addSp delSp modSp new mod">
-        <pc:chgData name="Katie Johnston" userId="a8803450-7667-44c1-ac00-9653f319424f" providerId="ADAL" clId="{DB61940C-CE1C-48E4-866C-23208D1E079C}" dt="2022-02-23T20:30:25.436" v="1348" actId="20577"/>
+        <pc:chgData name="Katie Johnston" userId="a8803450-7667-44c1-ac00-9653f319424f" providerId="ADAL" clId="{DB61940C-CE1C-48E4-866C-23208D1E079C}" dt="2022-02-25T18:38:21.307" v="3724" actId="1076"/>
         <pc:sldMkLst>
           <pc:docMk/>
           <pc:sldMk cId="4174184840" sldId="268"/>
@@ -650,7 +665,7 @@
           </ac:picMkLst>
         </pc:picChg>
         <pc:picChg chg="add mod">
-          <ac:chgData name="Katie Johnston" userId="a8803450-7667-44c1-ac00-9653f319424f" providerId="ADAL" clId="{DB61940C-CE1C-48E4-866C-23208D1E079C}" dt="2022-02-23T20:30:11.331" v="1301" actId="1076"/>
+          <ac:chgData name="Katie Johnston" userId="a8803450-7667-44c1-ac00-9653f319424f" providerId="ADAL" clId="{DB61940C-CE1C-48E4-866C-23208D1E079C}" dt="2022-02-25T18:38:21.307" v="3724" actId="1076"/>
           <ac:picMkLst>
             <pc:docMk/>
             <pc:sldMk cId="4174184840" sldId="268"/>
@@ -667,7 +682,7 @@
         </pc:picChg>
       </pc:sldChg>
       <pc:sldChg chg="addSp delSp modSp new mod">
-        <pc:chgData name="Katie Johnston" userId="a8803450-7667-44c1-ac00-9653f319424f" providerId="ADAL" clId="{DB61940C-CE1C-48E4-866C-23208D1E079C}" dt="2022-02-23T20:33:28.045" v="1501" actId="20577"/>
+        <pc:chgData name="Katie Johnston" userId="a8803450-7667-44c1-ac00-9653f319424f" providerId="ADAL" clId="{DB61940C-CE1C-48E4-866C-23208D1E079C}" dt="2022-02-25T18:11:52.536" v="3719" actId="1076"/>
         <pc:sldMkLst>
           <pc:docMk/>
           <pc:sldMk cId="1267434647" sldId="269"/>
@@ -697,7 +712,7 @@
           </ac:picMkLst>
         </pc:picChg>
         <pc:picChg chg="add mod">
-          <ac:chgData name="Katie Johnston" userId="a8803450-7667-44c1-ac00-9653f319424f" providerId="ADAL" clId="{DB61940C-CE1C-48E4-866C-23208D1E079C}" dt="2022-02-23T20:32:54.571" v="1387" actId="1076"/>
+          <ac:chgData name="Katie Johnston" userId="a8803450-7667-44c1-ac00-9653f319424f" providerId="ADAL" clId="{DB61940C-CE1C-48E4-866C-23208D1E079C}" dt="2022-02-25T18:11:52.536" v="3719" actId="1076"/>
           <ac:picMkLst>
             <pc:docMk/>
             <pc:sldMk cId="1267434647" sldId="269"/>
@@ -713,15 +728,15 @@
           </ac:picMkLst>
         </pc:picChg>
         <pc:picChg chg="add mod">
-          <ac:chgData name="Katie Johnston" userId="a8803450-7667-44c1-ac00-9653f319424f" providerId="ADAL" clId="{DB61940C-CE1C-48E4-866C-23208D1E079C}" dt="2022-02-23T20:32:57.129" v="1388" actId="1076"/>
+          <ac:chgData name="Katie Johnston" userId="a8803450-7667-44c1-ac00-9653f319424f" providerId="ADAL" clId="{DB61940C-CE1C-48E4-866C-23208D1E079C}" dt="2022-02-25T18:11:51.210" v="3718" actId="1076"/>
           <ac:picMkLst>
             <pc:docMk/>
             <pc:sldMk cId="1267434647" sldId="269"/>
             <ac:picMk id="2056" creationId="{9C35E469-0AF9-495D-9018-2CA4770CFF80}"/>
           </ac:picMkLst>
         </pc:picChg>
-        <pc:picChg chg="add mod">
-          <ac:chgData name="Katie Johnston" userId="a8803450-7667-44c1-ac00-9653f319424f" providerId="ADAL" clId="{DB61940C-CE1C-48E4-866C-23208D1E079C}" dt="2022-02-23T20:32:52.283" v="1386" actId="1076"/>
+        <pc:picChg chg="add del mod">
+          <ac:chgData name="Katie Johnston" userId="a8803450-7667-44c1-ac00-9653f319424f" providerId="ADAL" clId="{DB61940C-CE1C-48E4-866C-23208D1E079C}" dt="2022-02-25T18:11:48.822" v="3717" actId="478"/>
           <ac:picMkLst>
             <pc:docMk/>
             <pc:sldMk cId="1267434647" sldId="269"/>
@@ -738,7 +753,7 @@
         </pc:picChg>
       </pc:sldChg>
       <pc:sldChg chg="addSp delSp modSp new mod">
-        <pc:chgData name="Katie Johnston" userId="a8803450-7667-44c1-ac00-9653f319424f" providerId="ADAL" clId="{DB61940C-CE1C-48E4-866C-23208D1E079C}" dt="2022-02-23T21:26:34.495" v="1769" actId="27636"/>
+        <pc:chgData name="Katie Johnston" userId="a8803450-7667-44c1-ac00-9653f319424f" providerId="ADAL" clId="{DB61940C-CE1C-48E4-866C-23208D1E079C}" dt="2022-03-05T20:39:07.812" v="3940" actId="1076"/>
         <pc:sldMkLst>
           <pc:docMk/>
           <pc:sldMk cId="1614412404" sldId="270"/>
@@ -759,6 +774,14 @@
             <ac:spMk id="3" creationId="{759DD78F-1383-4629-BAAA-17AF8C274D01}"/>
           </ac:spMkLst>
         </pc:spChg>
+        <pc:picChg chg="add mod">
+          <ac:chgData name="Katie Johnston" userId="a8803450-7667-44c1-ac00-9653f319424f" providerId="ADAL" clId="{DB61940C-CE1C-48E4-866C-23208D1E079C}" dt="2022-03-05T20:39:07.812" v="3940" actId="1076"/>
+          <ac:picMkLst>
+            <pc:docMk/>
+            <pc:sldMk cId="1614412404" sldId="270"/>
+            <ac:picMk id="1026" creationId="{8D3CF9DC-BABE-4743-9905-D5E84718844E}"/>
+          </ac:picMkLst>
+        </pc:picChg>
         <pc:picChg chg="add del mod">
           <ac:chgData name="Katie Johnston" userId="a8803450-7667-44c1-ac00-9653f319424f" providerId="ADAL" clId="{DB61940C-CE1C-48E4-866C-23208D1E079C}" dt="2022-02-23T21:21:23.332" v="1594"/>
           <ac:picMkLst>
@@ -824,7 +847,7 @@
           </ac:picMkLst>
         </pc:picChg>
         <pc:picChg chg="add mod">
-          <ac:chgData name="Katie Johnston" userId="a8803450-7667-44c1-ac00-9653f319424f" providerId="ADAL" clId="{DB61940C-CE1C-48E4-866C-23208D1E079C}" dt="2022-02-23T21:24:26.229" v="1614" actId="1076"/>
+          <ac:chgData name="Katie Johnston" userId="a8803450-7667-44c1-ac00-9653f319424f" providerId="ADAL" clId="{DB61940C-CE1C-48E4-866C-23208D1E079C}" dt="2022-02-25T18:12:40.953" v="3722" actId="1076"/>
           <ac:picMkLst>
             <pc:docMk/>
             <pc:sldMk cId="1614412404" sldId="270"/>
@@ -837,6 +860,14 @@
             <pc:docMk/>
             <pc:sldMk cId="1614412404" sldId="270"/>
             <ac:picMk id="3092" creationId="{BF4E6112-9EC5-4B1B-855D-E8738CEA11A1}"/>
+          </ac:picMkLst>
+        </pc:picChg>
+        <pc:picChg chg="add del mod">
+          <ac:chgData name="Katie Johnston" userId="a8803450-7667-44c1-ac00-9653f319424f" providerId="ADAL" clId="{DB61940C-CE1C-48E4-866C-23208D1E079C}" dt="2022-03-05T20:39:02.748" v="3938" actId="478"/>
+          <ac:picMkLst>
+            <pc:docMk/>
+            <pc:sldMk cId="1614412404" sldId="270"/>
+            <ac:picMk id="3094" creationId="{0AB0F698-3E7A-4846-B6A6-A7A53D08729C}"/>
           </ac:picMkLst>
         </pc:picChg>
       </pc:sldChg>
@@ -920,7 +951,7 @@
         </pc:picChg>
       </pc:sldChg>
       <pc:sldChg chg="addSp delSp modSp new mod">
-        <pc:chgData name="Katie Johnston" userId="a8803450-7667-44c1-ac00-9653f319424f" providerId="ADAL" clId="{DB61940C-CE1C-48E4-866C-23208D1E079C}" dt="2022-02-24T21:58:38.602" v="2283" actId="1076"/>
+        <pc:chgData name="Katie Johnston" userId="a8803450-7667-44c1-ac00-9653f319424f" providerId="ADAL" clId="{DB61940C-CE1C-48E4-866C-23208D1E079C}" dt="2022-02-24T22:22:12.925" v="2903" actId="1076"/>
         <pc:sldMkLst>
           <pc:docMk/>
           <pc:sldMk cId="3905560700" sldId="272"/>
@@ -950,7 +981,7 @@
           </ac:picMkLst>
         </pc:picChg>
         <pc:picChg chg="add mod">
-          <ac:chgData name="Katie Johnston" userId="a8803450-7667-44c1-ac00-9653f319424f" providerId="ADAL" clId="{DB61940C-CE1C-48E4-866C-23208D1E079C}" dt="2022-02-24T21:58:05.354" v="2272" actId="1076"/>
+          <ac:chgData name="Katie Johnston" userId="a8803450-7667-44c1-ac00-9653f319424f" providerId="ADAL" clId="{DB61940C-CE1C-48E4-866C-23208D1E079C}" dt="2022-02-24T22:22:05.060" v="2900" actId="1076"/>
           <ac:picMkLst>
             <pc:docMk/>
             <pc:sldMk cId="3905560700" sldId="272"/>
@@ -958,7 +989,7 @@
           </ac:picMkLst>
         </pc:picChg>
         <pc:picChg chg="add mod">
-          <ac:chgData name="Katie Johnston" userId="a8803450-7667-44c1-ac00-9653f319424f" providerId="ADAL" clId="{DB61940C-CE1C-48E4-866C-23208D1E079C}" dt="2022-02-24T21:58:07.106" v="2273" actId="1076"/>
+          <ac:chgData name="Katie Johnston" userId="a8803450-7667-44c1-ac00-9653f319424f" providerId="ADAL" clId="{DB61940C-CE1C-48E4-866C-23208D1E079C}" dt="2022-02-24T22:22:09.461" v="2901" actId="1076"/>
           <ac:picMkLst>
             <pc:docMk/>
             <pc:sldMk cId="3905560700" sldId="272"/>
@@ -966,7 +997,7 @@
           </ac:picMkLst>
         </pc:picChg>
         <pc:picChg chg="add mod">
-          <ac:chgData name="Katie Johnston" userId="a8803450-7667-44c1-ac00-9653f319424f" providerId="ADAL" clId="{DB61940C-CE1C-48E4-866C-23208D1E079C}" dt="2022-02-24T21:58:34.506" v="2281" actId="1076"/>
+          <ac:chgData name="Katie Johnston" userId="a8803450-7667-44c1-ac00-9653f319424f" providerId="ADAL" clId="{DB61940C-CE1C-48E4-866C-23208D1E079C}" dt="2022-02-24T22:22:11.204" v="2902" actId="1076"/>
           <ac:picMkLst>
             <pc:docMk/>
             <pc:sldMk cId="3905560700" sldId="272"/>
@@ -974,7 +1005,7 @@
           </ac:picMkLst>
         </pc:picChg>
         <pc:picChg chg="add mod">
-          <ac:chgData name="Katie Johnston" userId="a8803450-7667-44c1-ac00-9653f319424f" providerId="ADAL" clId="{DB61940C-CE1C-48E4-866C-23208D1E079C}" dt="2022-02-24T21:58:38.602" v="2283" actId="1076"/>
+          <ac:chgData name="Katie Johnston" userId="a8803450-7667-44c1-ac00-9653f319424f" providerId="ADAL" clId="{DB61940C-CE1C-48E4-866C-23208D1E079C}" dt="2022-02-24T22:22:02.932" v="2898" actId="1076"/>
           <ac:picMkLst>
             <pc:docMk/>
             <pc:sldMk cId="3905560700" sldId="272"/>
@@ -982,7 +1013,7 @@
           </ac:picMkLst>
         </pc:picChg>
         <pc:picChg chg="add mod">
-          <ac:chgData name="Katie Johnston" userId="a8803450-7667-44c1-ac00-9653f319424f" providerId="ADAL" clId="{DB61940C-CE1C-48E4-866C-23208D1E079C}" dt="2022-02-24T21:58:36.298" v="2282" actId="1076"/>
+          <ac:chgData name="Katie Johnston" userId="a8803450-7667-44c1-ac00-9653f319424f" providerId="ADAL" clId="{DB61940C-CE1C-48E4-866C-23208D1E079C}" dt="2022-02-24T22:22:12.925" v="2903" actId="1076"/>
           <ac:picMkLst>
             <pc:docMk/>
             <pc:sldMk cId="3905560700" sldId="272"/>
@@ -1045,8 +1076,8 @@
           </ac:picMkLst>
         </pc:picChg>
       </pc:sldChg>
-      <pc:sldChg chg="addSp delSp modSp new mod">
-        <pc:chgData name="Katie Johnston" userId="a8803450-7667-44c1-ac00-9653f319424f" providerId="ADAL" clId="{DB61940C-CE1C-48E4-866C-23208D1E079C}" dt="2022-02-24T22:05:00.304" v="2539" actId="478"/>
+      <pc:sldChg chg="addSp delSp modSp new mod addCm">
+        <pc:chgData name="Katie Johnston" userId="a8803450-7667-44c1-ac00-9653f319424f" providerId="ADAL" clId="{DB61940C-CE1C-48E4-866C-23208D1E079C}" dt="2022-02-25T17:14:59.823" v="3710"/>
         <pc:sldMkLst>
           <pc:docMk/>
           <pc:sldMk cId="2199757748" sldId="274"/>
@@ -1116,8 +1147,8 @@
           </ac:picMkLst>
         </pc:picChg>
       </pc:sldChg>
-      <pc:sldChg chg="addSp delSp modSp new mod">
-        <pc:chgData name="Katie Johnston" userId="a8803450-7667-44c1-ac00-9653f319424f" providerId="ADAL" clId="{DB61940C-CE1C-48E4-866C-23208D1E079C}" dt="2022-02-24T22:08:00.019" v="2716" actId="20577"/>
+      <pc:sldChg chg="addSp delSp modSp new mod addCm">
+        <pc:chgData name="Katie Johnston" userId="a8803450-7667-44c1-ac00-9653f319424f" providerId="ADAL" clId="{DB61940C-CE1C-48E4-866C-23208D1E079C}" dt="2022-02-25T17:14:12.716" v="3709"/>
         <pc:sldMkLst>
           <pc:docMk/>
           <pc:sldMk cId="1613613128" sldId="275"/>
@@ -1138,6 +1169,14 @@
             <ac:spMk id="3" creationId="{A2BFAD6C-8D7A-48F6-A5C9-B7DAFF8B3EA6}"/>
           </ac:spMkLst>
         </pc:spChg>
+        <pc:spChg chg="add mod">
+          <ac:chgData name="Katie Johnston" userId="a8803450-7667-44c1-ac00-9653f319424f" providerId="ADAL" clId="{DB61940C-CE1C-48E4-866C-23208D1E079C}" dt="2022-02-25T05:24:41.878" v="3049" actId="20577"/>
+          <ac:spMkLst>
+            <pc:docMk/>
+            <pc:sldMk cId="1613613128" sldId="275"/>
+            <ac:spMk id="5" creationId="{BA7B1FE4-0228-4377-AC1A-4DB5BB041218}"/>
+          </ac:spMkLst>
+        </pc:spChg>
         <pc:picChg chg="add mod">
           <ac:chgData name="Katie Johnston" userId="a8803450-7667-44c1-ac00-9653f319424f" providerId="ADAL" clId="{DB61940C-CE1C-48E4-866C-23208D1E079C}" dt="2022-02-24T22:06:52.691" v="2610" actId="1076"/>
           <ac:picMkLst>
@@ -1171,9 +1210,572 @@
           </ac:picMkLst>
         </pc:picChg>
       </pc:sldChg>
+      <pc:sldChg chg="addSp modSp new mod">
+        <pc:chgData name="Katie Johnston" userId="a8803450-7667-44c1-ac00-9653f319424f" providerId="ADAL" clId="{DB61940C-CE1C-48E4-866C-23208D1E079C}" dt="2022-02-24T22:16:54.250" v="2889" actId="20577"/>
+        <pc:sldMkLst>
+          <pc:docMk/>
+          <pc:sldMk cId="3550213892" sldId="276"/>
+        </pc:sldMkLst>
+        <pc:spChg chg="mod">
+          <ac:chgData name="Katie Johnston" userId="a8803450-7667-44c1-ac00-9653f319424f" providerId="ADAL" clId="{DB61940C-CE1C-48E4-866C-23208D1E079C}" dt="2022-02-24T22:16:29.053" v="2788" actId="20577"/>
+          <ac:spMkLst>
+            <pc:docMk/>
+            <pc:sldMk cId="3550213892" sldId="276"/>
+            <ac:spMk id="2" creationId="{5B0ACD52-7E92-44C1-B62E-8EA185D090C1}"/>
+          </ac:spMkLst>
+        </pc:spChg>
+        <pc:spChg chg="mod">
+          <ac:chgData name="Katie Johnston" userId="a8803450-7667-44c1-ac00-9653f319424f" providerId="ADAL" clId="{DB61940C-CE1C-48E4-866C-23208D1E079C}" dt="2022-02-24T22:16:54.250" v="2889" actId="20577"/>
+          <ac:spMkLst>
+            <pc:docMk/>
+            <pc:sldMk cId="3550213892" sldId="276"/>
+            <ac:spMk id="3" creationId="{D8FE0429-283E-4D56-8ACA-778F2521FB71}"/>
+          </ac:spMkLst>
+        </pc:spChg>
+        <pc:picChg chg="add mod">
+          <ac:chgData name="Katie Johnston" userId="a8803450-7667-44c1-ac00-9653f319424f" providerId="ADAL" clId="{DB61940C-CE1C-48E4-866C-23208D1E079C}" dt="2022-02-24T22:16:45.395" v="2860" actId="1076"/>
+          <ac:picMkLst>
+            <pc:docMk/>
+            <pc:sldMk cId="3550213892" sldId="276"/>
+            <ac:picMk id="5" creationId="{C5714B8B-634D-4DB3-9490-139B791A1815}"/>
+          </ac:picMkLst>
+        </pc:picChg>
+      </pc:sldChg>
+      <pc:sldChg chg="addSp modSp new mod addCm">
+        <pc:chgData name="Katie Johnston" userId="a8803450-7667-44c1-ac00-9653f319424f" providerId="ADAL" clId="{DB61940C-CE1C-48E4-866C-23208D1E079C}" dt="2022-02-28T19:49:10.045" v="3907"/>
+        <pc:sldMkLst>
+          <pc:docMk/>
+          <pc:sldMk cId="4163866707" sldId="277"/>
+        </pc:sldMkLst>
+        <pc:spChg chg="mod">
+          <ac:chgData name="Katie Johnston" userId="a8803450-7667-44c1-ac00-9653f319424f" providerId="ADAL" clId="{DB61940C-CE1C-48E4-866C-23208D1E079C}" dt="2022-02-25T05:48:12.079" v="3386" actId="404"/>
+          <ac:spMkLst>
+            <pc:docMk/>
+            <pc:sldMk cId="4163866707" sldId="277"/>
+            <ac:spMk id="2" creationId="{0E607A78-1C20-4812-B53B-69C40F8455AE}"/>
+          </ac:spMkLst>
+        </pc:spChg>
+        <pc:picChg chg="add mod">
+          <ac:chgData name="Katie Johnston" userId="a8803450-7667-44c1-ac00-9653f319424f" providerId="ADAL" clId="{DB61940C-CE1C-48E4-866C-23208D1E079C}" dt="2022-02-25T05:47:37.437" v="3252" actId="1076"/>
+          <ac:picMkLst>
+            <pc:docMk/>
+            <pc:sldMk cId="4163866707" sldId="277"/>
+            <ac:picMk id="5" creationId="{B639E04E-073E-461B-A14D-EAF1ED024DCF}"/>
+          </ac:picMkLst>
+        </pc:picChg>
+        <pc:picChg chg="add mod">
+          <ac:chgData name="Katie Johnston" userId="a8803450-7667-44c1-ac00-9653f319424f" providerId="ADAL" clId="{DB61940C-CE1C-48E4-866C-23208D1E079C}" dt="2022-02-25T05:47:38.630" v="3253" actId="1076"/>
+          <ac:picMkLst>
+            <pc:docMk/>
+            <pc:sldMk cId="4163866707" sldId="277"/>
+            <ac:picMk id="6" creationId="{B261CC51-A0A3-4520-B971-B5F9191B6898}"/>
+          </ac:picMkLst>
+        </pc:picChg>
+        <pc:picChg chg="add mod">
+          <ac:chgData name="Katie Johnston" userId="a8803450-7667-44c1-ac00-9653f319424f" providerId="ADAL" clId="{DB61940C-CE1C-48E4-866C-23208D1E079C}" dt="2022-02-25T05:48:15.413" v="3387" actId="1076"/>
+          <ac:picMkLst>
+            <pc:docMk/>
+            <pc:sldMk cId="4163866707" sldId="277"/>
+            <ac:picMk id="9218" creationId="{617517CC-8DCA-497D-A938-9928E41516EA}"/>
+          </ac:picMkLst>
+        </pc:picChg>
+      </pc:sldChg>
+      <pc:sldChg chg="addSp delSp modSp new mod">
+        <pc:chgData name="Katie Johnston" userId="a8803450-7667-44c1-ac00-9653f319424f" providerId="ADAL" clId="{DB61940C-CE1C-48E4-866C-23208D1E079C}" dt="2022-02-25T17:10:13.325" v="3707" actId="20577"/>
+        <pc:sldMkLst>
+          <pc:docMk/>
+          <pc:sldMk cId="737002797" sldId="278"/>
+        </pc:sldMkLst>
+        <pc:spChg chg="mod">
+          <ac:chgData name="Katie Johnston" userId="a8803450-7667-44c1-ac00-9653f319424f" providerId="ADAL" clId="{DB61940C-CE1C-48E4-866C-23208D1E079C}" dt="2022-02-25T17:08:36.495" v="3651" actId="404"/>
+          <ac:spMkLst>
+            <pc:docMk/>
+            <pc:sldMk cId="737002797" sldId="278"/>
+            <ac:spMk id="2" creationId="{AB34E1DE-189C-4218-9C1C-1ED1ACDF5786}"/>
+          </ac:spMkLst>
+        </pc:spChg>
+        <pc:spChg chg="add del">
+          <ac:chgData name="Katie Johnston" userId="a8803450-7667-44c1-ac00-9653f319424f" providerId="ADAL" clId="{DB61940C-CE1C-48E4-866C-23208D1E079C}" dt="2022-02-25T17:10:02.100" v="3688"/>
+          <ac:spMkLst>
+            <pc:docMk/>
+            <pc:sldMk cId="737002797" sldId="278"/>
+            <ac:spMk id="3" creationId="{0BF0E399-9C02-4A34-8C5E-12A7F8F9E345}"/>
+          </ac:spMkLst>
+        </pc:spChg>
+        <pc:spChg chg="add mod">
+          <ac:chgData name="Katie Johnston" userId="a8803450-7667-44c1-ac00-9653f319424f" providerId="ADAL" clId="{DB61940C-CE1C-48E4-866C-23208D1E079C}" dt="2022-02-25T17:09:38.457" v="3675" actId="20577"/>
+          <ac:spMkLst>
+            <pc:docMk/>
+            <pc:sldMk cId="737002797" sldId="278"/>
+            <ac:spMk id="4" creationId="{E0D12B50-9DFF-4E20-A2DD-DD0B320B4791}"/>
+          </ac:spMkLst>
+        </pc:spChg>
+        <pc:spChg chg="add mod">
+          <ac:chgData name="Katie Johnston" userId="a8803450-7667-44c1-ac00-9653f319424f" providerId="ADAL" clId="{DB61940C-CE1C-48E4-866C-23208D1E079C}" dt="2022-02-25T17:09:45.577" v="3686" actId="20577"/>
+          <ac:spMkLst>
+            <pc:docMk/>
+            <pc:sldMk cId="737002797" sldId="278"/>
+            <ac:spMk id="5" creationId="{1BC96C0E-46B2-4638-AC42-92F37DE4FEC6}"/>
+          </ac:spMkLst>
+        </pc:spChg>
+        <pc:spChg chg="add mod">
+          <ac:chgData name="Katie Johnston" userId="a8803450-7667-44c1-ac00-9653f319424f" providerId="ADAL" clId="{DB61940C-CE1C-48E4-866C-23208D1E079C}" dt="2022-02-25T17:10:13.325" v="3707" actId="20577"/>
+          <ac:spMkLst>
+            <pc:docMk/>
+            <pc:sldMk cId="737002797" sldId="278"/>
+            <ac:spMk id="6" creationId="{79A70140-23E7-4563-A447-2204653F851E}"/>
+          </ac:spMkLst>
+        </pc:spChg>
+        <pc:picChg chg="add mod">
+          <ac:chgData name="Katie Johnston" userId="a8803450-7667-44c1-ac00-9653f319424f" providerId="ADAL" clId="{DB61940C-CE1C-48E4-866C-23208D1E079C}" dt="2022-02-25T17:08:40.340" v="3653" actId="1076"/>
+          <ac:picMkLst>
+            <pc:docMk/>
+            <pc:sldMk cId="737002797" sldId="278"/>
+            <ac:picMk id="10242" creationId="{E3BDCA10-B7AB-4A98-ADD0-579DC048A883}"/>
+          </ac:picMkLst>
+        </pc:picChg>
+        <pc:picChg chg="add mod">
+          <ac:chgData name="Katie Johnston" userId="a8803450-7667-44c1-ac00-9653f319424f" providerId="ADAL" clId="{DB61940C-CE1C-48E4-866C-23208D1E079C}" dt="2022-02-25T17:08:54.676" v="3655" actId="1076"/>
+          <ac:picMkLst>
+            <pc:docMk/>
+            <pc:sldMk cId="737002797" sldId="278"/>
+            <ac:picMk id="10244" creationId="{CCCA4EEE-E4FF-4E94-A9AD-344304F2E8D0}"/>
+          </ac:picMkLst>
+        </pc:picChg>
+        <pc:picChg chg="add">
+          <ac:chgData name="Katie Johnston" userId="a8803450-7667-44c1-ac00-9653f319424f" providerId="ADAL" clId="{DB61940C-CE1C-48E4-866C-23208D1E079C}" dt="2022-02-25T17:09:13.728" v="3656"/>
+          <ac:picMkLst>
+            <pc:docMk/>
+            <pc:sldMk cId="737002797" sldId="278"/>
+            <ac:picMk id="10246" creationId="{4D17D37B-7BF0-4429-B6D0-E49BFAEE4735}"/>
+          </ac:picMkLst>
+        </pc:picChg>
+        <pc:picChg chg="add del mod">
+          <ac:chgData name="Katie Johnston" userId="a8803450-7667-44c1-ac00-9653f319424f" providerId="ADAL" clId="{DB61940C-CE1C-48E4-866C-23208D1E079C}" dt="2022-02-25T17:09:22.570" v="3658"/>
+          <ac:picMkLst>
+            <pc:docMk/>
+            <pc:sldMk cId="737002797" sldId="278"/>
+            <ac:picMk id="10248" creationId="{5ACB3B85-F379-4309-9DFE-B49B641B633A}"/>
+          </ac:picMkLst>
+        </pc:picChg>
+        <pc:picChg chg="add mod">
+          <ac:chgData name="Katie Johnston" userId="a8803450-7667-44c1-ac00-9653f319424f" providerId="ADAL" clId="{DB61940C-CE1C-48E4-866C-23208D1E079C}" dt="2022-02-25T17:09:25.925" v="3660" actId="1076"/>
+          <ac:picMkLst>
+            <pc:docMk/>
+            <pc:sldMk cId="737002797" sldId="278"/>
+            <ac:picMk id="10250" creationId="{12F7C15B-565C-418F-A14A-ACB200018958}"/>
+          </ac:picMkLst>
+        </pc:picChg>
+        <pc:picChg chg="add del mod">
+          <ac:chgData name="Katie Johnston" userId="a8803450-7667-44c1-ac00-9653f319424f" providerId="ADAL" clId="{DB61940C-CE1C-48E4-866C-23208D1E079C}" dt="2022-02-25T17:10:02.100" v="3688"/>
+          <ac:picMkLst>
+            <pc:docMk/>
+            <pc:sldMk cId="737002797" sldId="278"/>
+            <ac:picMk id="10252" creationId="{C43FCA50-8FF2-4B0C-8FA9-31606BF63A62}"/>
+          </ac:picMkLst>
+        </pc:picChg>
+        <pc:picChg chg="add mod">
+          <ac:chgData name="Katie Johnston" userId="a8803450-7667-44c1-ac00-9653f319424f" providerId="ADAL" clId="{DB61940C-CE1C-48E4-866C-23208D1E079C}" dt="2022-02-25T17:10:04.820" v="3690" actId="1076"/>
+          <ac:picMkLst>
+            <pc:docMk/>
+            <pc:sldMk cId="737002797" sldId="278"/>
+            <ac:picMk id="10254" creationId="{C0747DB1-2C63-4337-AD25-0EB88D3A4C16}"/>
+          </ac:picMkLst>
+        </pc:picChg>
+      </pc:sldChg>
+      <pc:sldChg chg="addSp delSp new">
+        <pc:chgData name="Katie Johnston" userId="a8803450-7667-44c1-ac00-9653f319424f" providerId="ADAL" clId="{DB61940C-CE1C-48E4-866C-23208D1E079C}" dt="2022-03-09T17:32:30.738" v="3965"/>
+        <pc:sldMkLst>
+          <pc:docMk/>
+          <pc:sldMk cId="4084175940" sldId="279"/>
+        </pc:sldMkLst>
+        <pc:picChg chg="add del">
+          <ac:chgData name="Katie Johnston" userId="a8803450-7667-44c1-ac00-9653f319424f" providerId="ADAL" clId="{DB61940C-CE1C-48E4-866C-23208D1E079C}" dt="2022-03-09T17:21:00.073" v="3942" actId="478"/>
+          <ac:picMkLst>
+            <pc:docMk/>
+            <pc:sldMk cId="4084175940" sldId="279"/>
+            <ac:picMk id="1026" creationId="{C83FD68B-1BC2-4E35-9411-22D5036BAF1F}"/>
+          </ac:picMkLst>
+        </pc:picChg>
+        <pc:picChg chg="add del">
+          <ac:chgData name="Katie Johnston" userId="a8803450-7667-44c1-ac00-9653f319424f" providerId="ADAL" clId="{DB61940C-CE1C-48E4-866C-23208D1E079C}" dt="2022-03-09T17:21:30.016" v="3944" actId="478"/>
+          <ac:picMkLst>
+            <pc:docMk/>
+            <pc:sldMk cId="4084175940" sldId="279"/>
+            <ac:picMk id="1028" creationId="{B194EBDE-C71B-4660-B182-8458A02E3D6C}"/>
+          </ac:picMkLst>
+        </pc:picChg>
+        <pc:picChg chg="add del">
+          <ac:chgData name="Katie Johnston" userId="a8803450-7667-44c1-ac00-9653f319424f" providerId="ADAL" clId="{DB61940C-CE1C-48E4-866C-23208D1E079C}" dt="2022-03-09T17:21:54.714" v="3946" actId="478"/>
+          <ac:picMkLst>
+            <pc:docMk/>
+            <pc:sldMk cId="4084175940" sldId="279"/>
+            <ac:picMk id="1030" creationId="{D8A919ED-9FED-4699-AE03-FEE94E6DFA12}"/>
+          </ac:picMkLst>
+        </pc:picChg>
+        <pc:picChg chg="add del">
+          <ac:chgData name="Katie Johnston" userId="a8803450-7667-44c1-ac00-9653f319424f" providerId="ADAL" clId="{DB61940C-CE1C-48E4-866C-23208D1E079C}" dt="2022-03-09T17:22:09.392" v="3948" actId="478"/>
+          <ac:picMkLst>
+            <pc:docMk/>
+            <pc:sldMk cId="4084175940" sldId="279"/>
+            <ac:picMk id="1032" creationId="{DB139807-4BE5-4D55-AE17-60C1A2988E66}"/>
+          </ac:picMkLst>
+        </pc:picChg>
+        <pc:picChg chg="add del">
+          <ac:chgData name="Katie Johnston" userId="a8803450-7667-44c1-ac00-9653f319424f" providerId="ADAL" clId="{DB61940C-CE1C-48E4-866C-23208D1E079C}" dt="2022-03-09T17:22:39.712" v="3950" actId="478"/>
+          <ac:picMkLst>
+            <pc:docMk/>
+            <pc:sldMk cId="4084175940" sldId="279"/>
+            <ac:picMk id="1034" creationId="{4EC7B093-12AF-4229-A91A-362904E240D3}"/>
+          </ac:picMkLst>
+        </pc:picChg>
+        <pc:picChg chg="add del">
+          <ac:chgData name="Katie Johnston" userId="a8803450-7667-44c1-ac00-9653f319424f" providerId="ADAL" clId="{DB61940C-CE1C-48E4-866C-23208D1E079C}" dt="2022-03-09T17:23:37.921" v="3952" actId="478"/>
+          <ac:picMkLst>
+            <pc:docMk/>
+            <pc:sldMk cId="4084175940" sldId="279"/>
+            <ac:picMk id="1036" creationId="{6E7FE126-F4BE-4C04-918C-43621EBA5276}"/>
+          </ac:picMkLst>
+        </pc:picChg>
+        <pc:picChg chg="add del">
+          <ac:chgData name="Katie Johnston" userId="a8803450-7667-44c1-ac00-9653f319424f" providerId="ADAL" clId="{DB61940C-CE1C-48E4-866C-23208D1E079C}" dt="2022-03-09T17:24:34.285" v="3954" actId="478"/>
+          <ac:picMkLst>
+            <pc:docMk/>
+            <pc:sldMk cId="4084175940" sldId="279"/>
+            <ac:picMk id="1038" creationId="{7F83EC52-C4E5-4EFB-B8A4-2826EDD85C73}"/>
+          </ac:picMkLst>
+        </pc:picChg>
+        <pc:picChg chg="add del">
+          <ac:chgData name="Katie Johnston" userId="a8803450-7667-44c1-ac00-9653f319424f" providerId="ADAL" clId="{DB61940C-CE1C-48E4-866C-23208D1E079C}" dt="2022-03-09T17:25:04.376" v="3956" actId="478"/>
+          <ac:picMkLst>
+            <pc:docMk/>
+            <pc:sldMk cId="4084175940" sldId="279"/>
+            <ac:picMk id="1040" creationId="{8217E410-B350-4154-A479-931363ECFB99}"/>
+          </ac:picMkLst>
+        </pc:picChg>
+        <pc:picChg chg="add del">
+          <ac:chgData name="Katie Johnston" userId="a8803450-7667-44c1-ac00-9653f319424f" providerId="ADAL" clId="{DB61940C-CE1C-48E4-866C-23208D1E079C}" dt="2022-03-09T17:25:19.280" v="3958" actId="478"/>
+          <ac:picMkLst>
+            <pc:docMk/>
+            <pc:sldMk cId="4084175940" sldId="279"/>
+            <ac:picMk id="1042" creationId="{36422B1C-9094-40E5-9BA5-A0002D0056CD}"/>
+          </ac:picMkLst>
+        </pc:picChg>
+        <pc:picChg chg="add del">
+          <ac:chgData name="Katie Johnston" userId="a8803450-7667-44c1-ac00-9653f319424f" providerId="ADAL" clId="{DB61940C-CE1C-48E4-866C-23208D1E079C}" dt="2022-03-09T17:25:36.712" v="3960" actId="478"/>
+          <ac:picMkLst>
+            <pc:docMk/>
+            <pc:sldMk cId="4084175940" sldId="279"/>
+            <ac:picMk id="1044" creationId="{68DF0ED3-24B4-4C46-947E-BEF3FF511B23}"/>
+          </ac:picMkLst>
+        </pc:picChg>
+        <pc:picChg chg="add del">
+          <ac:chgData name="Katie Johnston" userId="a8803450-7667-44c1-ac00-9653f319424f" providerId="ADAL" clId="{DB61940C-CE1C-48E4-866C-23208D1E079C}" dt="2022-03-09T17:26:04.169" v="3962" actId="478"/>
+          <ac:picMkLst>
+            <pc:docMk/>
+            <pc:sldMk cId="4084175940" sldId="279"/>
+            <ac:picMk id="1046" creationId="{781EFF07-7290-485E-8AB7-008AEFA81B1E}"/>
+          </ac:picMkLst>
+        </pc:picChg>
+        <pc:picChg chg="add del">
+          <ac:chgData name="Katie Johnston" userId="a8803450-7667-44c1-ac00-9653f319424f" providerId="ADAL" clId="{DB61940C-CE1C-48E4-866C-23208D1E079C}" dt="2022-03-09T17:32:30.452" v="3964" actId="478"/>
+          <ac:picMkLst>
+            <pc:docMk/>
+            <pc:sldMk cId="4084175940" sldId="279"/>
+            <ac:picMk id="1048" creationId="{F6A9D08E-D45F-4E34-83B1-44F97361ABCC}"/>
+          </ac:picMkLst>
+        </pc:picChg>
+        <pc:picChg chg="add">
+          <ac:chgData name="Katie Johnston" userId="a8803450-7667-44c1-ac00-9653f319424f" providerId="ADAL" clId="{DB61940C-CE1C-48E4-866C-23208D1E079C}" dt="2022-03-09T17:32:30.738" v="3965"/>
+          <ac:picMkLst>
+            <pc:docMk/>
+            <pc:sldMk cId="4084175940" sldId="279"/>
+            <ac:picMk id="1050" creationId="{9C88EF16-7C39-49A0-A31A-E1C19066D3F9}"/>
+          </ac:picMkLst>
+        </pc:picChg>
+      </pc:sldChg>
+      <pc:sldChg chg="addSp delSp modSp new mod">
+        <pc:chgData name="Katie Johnston" userId="a8803450-7667-44c1-ac00-9653f319424f" providerId="ADAL" clId="{DB61940C-CE1C-48E4-866C-23208D1E079C}" dt="2022-02-25T21:41:47.622" v="3905" actId="1076"/>
+        <pc:sldMkLst>
+          <pc:docMk/>
+          <pc:sldMk cId="2196649931" sldId="280"/>
+        </pc:sldMkLst>
+        <pc:spChg chg="mod">
+          <ac:chgData name="Katie Johnston" userId="a8803450-7667-44c1-ac00-9653f319424f" providerId="ADAL" clId="{DB61940C-CE1C-48E4-866C-23208D1E079C}" dt="2022-02-25T21:38:10.916" v="3851" actId="20577"/>
+          <ac:spMkLst>
+            <pc:docMk/>
+            <pc:sldMk cId="2196649931" sldId="280"/>
+            <ac:spMk id="2" creationId="{44AA2370-0592-4619-AED2-83B280426205}"/>
+          </ac:spMkLst>
+        </pc:spChg>
+        <pc:spChg chg="add del">
+          <ac:chgData name="Katie Johnston" userId="a8803450-7667-44c1-ac00-9653f319424f" providerId="ADAL" clId="{DB61940C-CE1C-48E4-866C-23208D1E079C}" dt="2022-02-25T21:38:18.482" v="3854" actId="478"/>
+          <ac:spMkLst>
+            <pc:docMk/>
+            <pc:sldMk cId="2196649931" sldId="280"/>
+            <ac:spMk id="3" creationId="{26425C0D-1F2B-4A9C-A8E2-C7B29CC53541}"/>
+          </ac:spMkLst>
+        </pc:spChg>
+        <pc:spChg chg="add mod">
+          <ac:chgData name="Katie Johnston" userId="a8803450-7667-44c1-ac00-9653f319424f" providerId="ADAL" clId="{DB61940C-CE1C-48E4-866C-23208D1E079C}" dt="2022-02-25T21:38:50.195" v="3888" actId="20577"/>
+          <ac:spMkLst>
+            <pc:docMk/>
+            <pc:sldMk cId="2196649931" sldId="280"/>
+            <ac:spMk id="4" creationId="{C231B73E-9FA5-46C9-9DE9-E9C9732B7460}"/>
+          </ac:spMkLst>
+        </pc:spChg>
+        <pc:spChg chg="add mod">
+          <ac:chgData name="Katie Johnston" userId="a8803450-7667-44c1-ac00-9653f319424f" providerId="ADAL" clId="{DB61940C-CE1C-48E4-866C-23208D1E079C}" dt="2022-02-25T21:39:09.344" v="3900" actId="5793"/>
+          <ac:spMkLst>
+            <pc:docMk/>
+            <pc:sldMk cId="2196649931" sldId="280"/>
+            <ac:spMk id="8" creationId="{0468E8B1-509F-4152-AE1D-CD457A96B8B8}"/>
+          </ac:spMkLst>
+        </pc:spChg>
+        <pc:picChg chg="add del mod">
+          <ac:chgData name="Katie Johnston" userId="a8803450-7667-44c1-ac00-9653f319424f" providerId="ADAL" clId="{DB61940C-CE1C-48E4-866C-23208D1E079C}" dt="2022-02-25T21:38:15.022" v="3853"/>
+          <ac:picMkLst>
+            <pc:docMk/>
+            <pc:sldMk cId="2196649931" sldId="280"/>
+            <ac:picMk id="11266" creationId="{052DB16A-61B5-419C-A5F9-F512B7184566}"/>
+          </ac:picMkLst>
+        </pc:picChg>
+        <pc:picChg chg="add mod">
+          <ac:chgData name="Katie Johnston" userId="a8803450-7667-44c1-ac00-9653f319424f" providerId="ADAL" clId="{DB61940C-CE1C-48E4-866C-23208D1E079C}" dt="2022-02-25T21:38:21.375" v="3856" actId="1076"/>
+          <ac:picMkLst>
+            <pc:docMk/>
+            <pc:sldMk cId="2196649931" sldId="280"/>
+            <ac:picMk id="11268" creationId="{0037A314-9612-4F50-9414-47CEAB10C4D3}"/>
+          </ac:picMkLst>
+        </pc:picChg>
+        <pc:picChg chg="add mod">
+          <ac:chgData name="Katie Johnston" userId="a8803450-7667-44c1-ac00-9653f319424f" providerId="ADAL" clId="{DB61940C-CE1C-48E4-866C-23208D1E079C}" dt="2022-02-25T21:38:33.310" v="3859" actId="1076"/>
+          <ac:picMkLst>
+            <pc:docMk/>
+            <pc:sldMk cId="2196649931" sldId="280"/>
+            <ac:picMk id="11270" creationId="{7DC32418-8BA9-4FB7-AB5A-F6DD0C4F9BCA}"/>
+          </ac:picMkLst>
+        </pc:picChg>
+        <pc:picChg chg="add mod">
+          <ac:chgData name="Katie Johnston" userId="a8803450-7667-44c1-ac00-9653f319424f" providerId="ADAL" clId="{DB61940C-CE1C-48E4-866C-23208D1E079C}" dt="2022-02-25T21:41:47.622" v="3905" actId="1076"/>
+          <ac:picMkLst>
+            <pc:docMk/>
+            <pc:sldMk cId="2196649931" sldId="280"/>
+            <ac:picMk id="11272" creationId="{BBE95707-0187-4BFF-B68E-987FB69A2E48}"/>
+          </ac:picMkLst>
+        </pc:picChg>
+        <pc:picChg chg="add mod">
+          <ac:chgData name="Katie Johnston" userId="a8803450-7667-44c1-ac00-9653f319424f" providerId="ADAL" clId="{DB61940C-CE1C-48E4-866C-23208D1E079C}" dt="2022-02-25T21:41:45.966" v="3904" actId="1076"/>
+          <ac:picMkLst>
+            <pc:docMk/>
+            <pc:sldMk cId="2196649931" sldId="280"/>
+            <ac:picMk id="11274" creationId="{636D1B6C-947A-4524-B8EE-A944DB6BDFE1}"/>
+          </ac:picMkLst>
+        </pc:picChg>
+      </pc:sldChg>
+      <pc:sldChg chg="new">
+        <pc:chgData name="Katie Johnston" userId="a8803450-7667-44c1-ac00-9653f319424f" providerId="ADAL" clId="{DB61940C-CE1C-48E4-866C-23208D1E079C}" dt="2022-02-25T21:37:40.099" v="3728" actId="680"/>
+        <pc:sldMkLst>
+          <pc:docMk/>
+          <pc:sldMk cId="3430631820" sldId="281"/>
+        </pc:sldMkLst>
+      </pc:sldChg>
+      <pc:sldChg chg="new">
+        <pc:chgData name="Katie Johnston" userId="a8803450-7667-44c1-ac00-9653f319424f" providerId="ADAL" clId="{DB61940C-CE1C-48E4-866C-23208D1E079C}" dt="2022-02-25T21:50:15.950" v="3906" actId="680"/>
+        <pc:sldMkLst>
+          <pc:docMk/>
+          <pc:sldMk cId="2752307464" sldId="282"/>
+        </pc:sldMkLst>
+      </pc:sldChg>
+      <pc:sldChg chg="addSp delSp modSp new">
+        <pc:chgData name="Katie Johnston" userId="a8803450-7667-44c1-ac00-9653f319424f" providerId="ADAL" clId="{DB61940C-CE1C-48E4-866C-23208D1E079C}" dt="2022-03-01T18:02:35.372" v="3923" actId="1076"/>
+        <pc:sldMkLst>
+          <pc:docMk/>
+          <pc:sldMk cId="3252842" sldId="283"/>
+        </pc:sldMkLst>
+        <pc:spChg chg="add del">
+          <ac:chgData name="Katie Johnston" userId="a8803450-7667-44c1-ac00-9653f319424f" providerId="ADAL" clId="{DB61940C-CE1C-48E4-866C-23208D1E079C}" dt="2022-03-01T17:17:11.899" v="3910"/>
+          <ac:spMkLst>
+            <pc:docMk/>
+            <pc:sldMk cId="3252842" sldId="283"/>
+            <ac:spMk id="4" creationId="{375A6294-5F61-494E-A096-0624CA8282B1}"/>
+          </ac:spMkLst>
+        </pc:spChg>
+        <pc:picChg chg="add mod">
+          <ac:chgData name="Katie Johnston" userId="a8803450-7667-44c1-ac00-9653f319424f" providerId="ADAL" clId="{DB61940C-CE1C-48E4-866C-23208D1E079C}" dt="2022-03-01T18:02:35.372" v="3923" actId="1076"/>
+          <ac:picMkLst>
+            <pc:docMk/>
+            <pc:sldMk cId="3252842" sldId="283"/>
+            <ac:picMk id="6" creationId="{A96EAF16-1600-4FC1-90FA-918D1F710C88}"/>
+          </ac:picMkLst>
+        </pc:picChg>
+        <pc:picChg chg="add del mod">
+          <ac:chgData name="Katie Johnston" userId="a8803450-7667-44c1-ac00-9653f319424f" providerId="ADAL" clId="{DB61940C-CE1C-48E4-866C-23208D1E079C}" dt="2022-03-01T18:02:27.678" v="3919" actId="478"/>
+          <ac:picMkLst>
+            <pc:docMk/>
+            <pc:sldMk cId="3252842" sldId="283"/>
+            <ac:picMk id="12291" creationId="{032A982B-B6ED-4F49-9641-40B13114BA1E}"/>
+          </ac:picMkLst>
+        </pc:picChg>
+        <pc:picChg chg="add mod">
+          <ac:chgData name="Katie Johnston" userId="a8803450-7667-44c1-ac00-9653f319424f" providerId="ADAL" clId="{DB61940C-CE1C-48E4-866C-23208D1E079C}" dt="2022-03-01T18:02:31.715" v="3922" actId="14100"/>
+          <ac:picMkLst>
+            <pc:docMk/>
+            <pc:sldMk cId="3252842" sldId="283"/>
+            <ac:picMk id="12293" creationId="{624A602B-D956-4490-A213-75702CAC1813}"/>
+          </ac:picMkLst>
+        </pc:picChg>
+      </pc:sldChg>
+      <pc:sldChg chg="addSp delSp new">
+        <pc:chgData name="Katie Johnston" userId="a8803450-7667-44c1-ac00-9653f319424f" providerId="ADAL" clId="{DB61940C-CE1C-48E4-866C-23208D1E079C}" dt="2022-03-04T22:29:00.503" v="3937"/>
+        <pc:sldMkLst>
+          <pc:docMk/>
+          <pc:sldMk cId="4097107745" sldId="284"/>
+        </pc:sldMkLst>
+        <pc:picChg chg="add del">
+          <ac:chgData name="Katie Johnston" userId="a8803450-7667-44c1-ac00-9653f319424f" providerId="ADAL" clId="{DB61940C-CE1C-48E4-866C-23208D1E079C}" dt="2022-03-04T22:22:41.181" v="3926" actId="478"/>
+          <ac:picMkLst>
+            <pc:docMk/>
+            <pc:sldMk cId="4097107745" sldId="284"/>
+            <ac:picMk id="13314" creationId="{D1B8510C-BEE1-49AF-B324-C2AC4957298D}"/>
+          </ac:picMkLst>
+        </pc:picChg>
+        <pc:picChg chg="add del">
+          <ac:chgData name="Katie Johnston" userId="a8803450-7667-44c1-ac00-9653f319424f" providerId="ADAL" clId="{DB61940C-CE1C-48E4-866C-23208D1E079C}" dt="2022-03-04T22:23:04.697" v="3928" actId="478"/>
+          <ac:picMkLst>
+            <pc:docMk/>
+            <pc:sldMk cId="4097107745" sldId="284"/>
+            <ac:picMk id="13316" creationId="{9AABC4B0-E081-442E-9B8A-468FEEE13E73}"/>
+          </ac:picMkLst>
+        </pc:picChg>
+        <pc:picChg chg="add del">
+          <ac:chgData name="Katie Johnston" userId="a8803450-7667-44c1-ac00-9653f319424f" providerId="ADAL" clId="{DB61940C-CE1C-48E4-866C-23208D1E079C}" dt="2022-03-04T22:23:27.087" v="3930" actId="478"/>
+          <ac:picMkLst>
+            <pc:docMk/>
+            <pc:sldMk cId="4097107745" sldId="284"/>
+            <ac:picMk id="13318" creationId="{0A9A3FC2-17B0-4C2D-B17C-8A8E033394FC}"/>
+          </ac:picMkLst>
+        </pc:picChg>
+        <pc:picChg chg="add del">
+          <ac:chgData name="Katie Johnston" userId="a8803450-7667-44c1-ac00-9653f319424f" providerId="ADAL" clId="{DB61940C-CE1C-48E4-866C-23208D1E079C}" dt="2022-03-04T22:24:18.352" v="3932" actId="478"/>
+          <ac:picMkLst>
+            <pc:docMk/>
+            <pc:sldMk cId="4097107745" sldId="284"/>
+            <ac:picMk id="13320" creationId="{F972F00B-4D3B-48A0-BAC0-4B74BE6EE408}"/>
+          </ac:picMkLst>
+        </pc:picChg>
+        <pc:picChg chg="add del">
+          <ac:chgData name="Katie Johnston" userId="a8803450-7667-44c1-ac00-9653f319424f" providerId="ADAL" clId="{DB61940C-CE1C-48E4-866C-23208D1E079C}" dt="2022-03-04T22:26:31.370" v="3934" actId="478"/>
+          <ac:picMkLst>
+            <pc:docMk/>
+            <pc:sldMk cId="4097107745" sldId="284"/>
+            <ac:picMk id="13322" creationId="{D5EF9EC3-72E2-44F7-A93B-477B08ADE147}"/>
+          </ac:picMkLst>
+        </pc:picChg>
+        <pc:picChg chg="add del">
+          <ac:chgData name="Katie Johnston" userId="a8803450-7667-44c1-ac00-9653f319424f" providerId="ADAL" clId="{DB61940C-CE1C-48E4-866C-23208D1E079C}" dt="2022-03-04T22:29:00.220" v="3936" actId="478"/>
+          <ac:picMkLst>
+            <pc:docMk/>
+            <pc:sldMk cId="4097107745" sldId="284"/>
+            <ac:picMk id="13324" creationId="{B2EE80AE-1D5F-4AA3-BADE-523E513F8390}"/>
+          </ac:picMkLst>
+        </pc:picChg>
+        <pc:picChg chg="add">
+          <ac:chgData name="Katie Johnston" userId="a8803450-7667-44c1-ac00-9653f319424f" providerId="ADAL" clId="{DB61940C-CE1C-48E4-866C-23208D1E079C}" dt="2022-03-04T22:29:00.503" v="3937"/>
+          <ac:picMkLst>
+            <pc:docMk/>
+            <pc:sldMk cId="4097107745" sldId="284"/>
+            <ac:picMk id="13326" creationId="{EB91AD01-085D-4042-B11A-E50B4C0481CA}"/>
+          </ac:picMkLst>
+        </pc:picChg>
+      </pc:sldChg>
     </pc:docChg>
   </pc:docChgLst>
 </pc:chgInfo>
+</file>
+
+<file path=ppt/comments/modernComment_112_831DA3B4.xml><?xml version="1.0" encoding="utf-8"?>
+<p188:cmLst xmlns:a="http://schemas.openxmlformats.org/drawingml/2006/main" xmlns:r="http://schemas.openxmlformats.org/officeDocument/2006/relationships" xmlns:p188="http://schemas.microsoft.com/office/powerpoint/2018/8/main">
+  <p188:cm id="{BA85D9E7-A289-4948-80B6-02F1F9CA43F6}" authorId="{FAC213E7-3D36-80F8-1B98-250F805A11AD}" created="2022-02-25T17:14:59.740">
+    <ac:deMkLst xmlns:ac="http://schemas.microsoft.com/office/drawing/2013/main/command">
+      <pc:docMk xmlns:pc="http://schemas.microsoft.com/office/powerpoint/2013/main/command"/>
+      <pc:sldMk xmlns:pc="http://schemas.microsoft.com/office/powerpoint/2013/main/command" cId="2199757748" sldId="274"/>
+      <ac:picMk id="7174" creationId="{340A3A5B-28D2-4F9B-BDF5-513BDFF55036}"/>
+    </ac:deMkLst>
+    <p188:txBody>
+      <a:bodyPr/>
+      <a:lstStyle/>
+      <a:p>
+        <a:r>
+          <a:rPr lang="en-US"/>
+          <a:t>when doing the next step to widen, should I use t+1, t+step_size, or what??</a:t>
+        </a:r>
+      </a:p>
+    </p188:txBody>
+  </p188:cm>
+</p188:cmLst>
+</file>
+
+<file path=ppt/comments/modernComment_113_602DC848.xml><?xml version="1.0" encoding="utf-8"?>
+<p188:cmLst xmlns:a="http://schemas.openxmlformats.org/drawingml/2006/main" xmlns:r="http://schemas.openxmlformats.org/officeDocument/2006/relationships" xmlns:p188="http://schemas.microsoft.com/office/powerpoint/2018/8/main">
+  <p188:cm id="{4A598BC4-47E9-4CB1-BACA-16905C1E2097}" authorId="{FAC213E7-3D36-80F8-1B98-250F805A11AD}" created="2022-02-25T17:13:39.965">
+    <ac:deMkLst xmlns:ac="http://schemas.microsoft.com/office/drawing/2013/main/command">
+      <pc:docMk xmlns:pc="http://schemas.microsoft.com/office/powerpoint/2013/main/command"/>
+      <pc:sldMk xmlns:pc="http://schemas.microsoft.com/office/powerpoint/2013/main/command" cId="1613613128" sldId="275"/>
+      <ac:picMk id="8194" creationId="{B40095F7-EFF4-4193-BAAF-998E9FCFF399}"/>
+    </ac:deMkLst>
+    <p188:txBody>
+      <a:bodyPr/>
+      <a:lstStyle/>
+      <a:p>
+        <a:r>
+          <a:rPr lang="en-US"/>
+          <a:t>Get's kind of weird with all the squares and stuff. Not sure how much this is a bug or just gets weird because random parts are zero. 
+</a:t>
+        </a:r>
+      </a:p>
+    </p188:txBody>
+  </p188:cm>
+  <p188:cm id="{4AD273EF-1608-482F-8384-E1419EF69DC6}" authorId="{FAC213E7-3D36-80F8-1B98-250F805A11AD}" created="2022-02-25T17:14:12.622">
+    <ac:deMkLst xmlns:ac="http://schemas.microsoft.com/office/drawing/2013/main/command">
+      <pc:docMk xmlns:pc="http://schemas.microsoft.com/office/powerpoint/2013/main/command"/>
+      <pc:sldMk xmlns:pc="http://schemas.microsoft.com/office/powerpoint/2013/main/command" cId="1613613128" sldId="275"/>
+      <ac:picMk id="4" creationId="{BA229336-18D6-42A8-B1F2-C9425C0CEF86}"/>
+    </ac:deMkLst>
+    <p188:txBody>
+      <a:bodyPr/>
+      <a:lstStyle/>
+      <a:p>
+        <a:r>
+          <a:rPr lang="en-US"/>
+          <a:t>this error seems very weird to me. </a:t>
+        </a:r>
+      </a:p>
+    </p188:txBody>
+  </p188:cm>
+</p188:cmLst>
+</file>
+
+<file path=ppt/comments/modernComment_115_F82F9053.xml><?xml version="1.0" encoding="utf-8"?>
+<p188:cmLst xmlns:a="http://schemas.openxmlformats.org/drawingml/2006/main" xmlns:r="http://schemas.openxmlformats.org/officeDocument/2006/relationships" xmlns:p188="http://schemas.microsoft.com/office/powerpoint/2018/8/main">
+  <p188:cm id="{B27A6ACD-8EDD-4152-980E-8896CE1B53F5}" authorId="{FAC213E7-3D36-80F8-1B98-250F805A11AD}" created="2022-02-28T19:49:09.878">
+    <ac:deMkLst xmlns:ac="http://schemas.microsoft.com/office/drawing/2013/main/command">
+      <pc:docMk xmlns:pc="http://schemas.microsoft.com/office/powerpoint/2013/main/command"/>
+      <pc:sldMk xmlns:pc="http://schemas.microsoft.com/office/powerpoint/2013/main/command" cId="4163866707" sldId="277"/>
+      <ac:picMk id="9218" creationId="{617517CC-8DCA-497D-A938-9928E41516EA}"/>
+    </ac:deMkLst>
+    <p188:txBody>
+      <a:bodyPr/>
+      <a:lstStyle/>
+      <a:p>
+        <a:r>
+          <a:rPr lang="en-US"/>
+          <a:t>Why doesn't this work better? Is it just some bug somewhere? or does it get too far off and get weird?</a:t>
+        </a:r>
+      </a:p>
+    </p188:txBody>
+  </p188:cm>
+</p188:cmLst>
 </file>
 
 <file path=ppt/slideLayouts/slideLayout1.xml><?xml version="1.0" encoding="utf-8"?>
@@ -1323,7 +1925,7 @@
           <a:p>
             <a:fld id="{157714A8-0B30-4C6C-8922-47DC2EC78B7A}" type="datetimeFigureOut">
               <a:rPr lang="en-US" smtClean="0"/>
-              <a:t>2/23/2022</a:t>
+              <a:t>3/8/2022</a:t>
             </a:fld>
             <a:endParaRPr lang="en-US"/>
           </a:p>
@@ -1521,7 +2123,7 @@
           <a:p>
             <a:fld id="{157714A8-0B30-4C6C-8922-47DC2EC78B7A}" type="datetimeFigureOut">
               <a:rPr lang="en-US" smtClean="0"/>
-              <a:t>2/23/2022</a:t>
+              <a:t>3/8/2022</a:t>
             </a:fld>
             <a:endParaRPr lang="en-US"/>
           </a:p>
@@ -1729,7 +2331,7 @@
           <a:p>
             <a:fld id="{157714A8-0B30-4C6C-8922-47DC2EC78B7A}" type="datetimeFigureOut">
               <a:rPr lang="en-US" smtClean="0"/>
-              <a:t>2/23/2022</a:t>
+              <a:t>3/8/2022</a:t>
             </a:fld>
             <a:endParaRPr lang="en-US"/>
           </a:p>
@@ -1927,7 +2529,7 @@
           <a:p>
             <a:fld id="{157714A8-0B30-4C6C-8922-47DC2EC78B7A}" type="datetimeFigureOut">
               <a:rPr lang="en-US" smtClean="0"/>
-              <a:t>2/23/2022</a:t>
+              <a:t>3/8/2022</a:t>
             </a:fld>
             <a:endParaRPr lang="en-US"/>
           </a:p>
@@ -2202,7 +2804,7 @@
           <a:p>
             <a:fld id="{157714A8-0B30-4C6C-8922-47DC2EC78B7A}" type="datetimeFigureOut">
               <a:rPr lang="en-US" smtClean="0"/>
-              <a:t>2/23/2022</a:t>
+              <a:t>3/8/2022</a:t>
             </a:fld>
             <a:endParaRPr lang="en-US"/>
           </a:p>
@@ -2467,7 +3069,7 @@
           <a:p>
             <a:fld id="{157714A8-0B30-4C6C-8922-47DC2EC78B7A}" type="datetimeFigureOut">
               <a:rPr lang="en-US" smtClean="0"/>
-              <a:t>2/23/2022</a:t>
+              <a:t>3/8/2022</a:t>
             </a:fld>
             <a:endParaRPr lang="en-US"/>
           </a:p>
@@ -2879,7 +3481,7 @@
           <a:p>
             <a:fld id="{157714A8-0B30-4C6C-8922-47DC2EC78B7A}" type="datetimeFigureOut">
               <a:rPr lang="en-US" smtClean="0"/>
-              <a:t>2/23/2022</a:t>
+              <a:t>3/8/2022</a:t>
             </a:fld>
             <a:endParaRPr lang="en-US"/>
           </a:p>
@@ -3020,7 +3622,7 @@
           <a:p>
             <a:fld id="{157714A8-0B30-4C6C-8922-47DC2EC78B7A}" type="datetimeFigureOut">
               <a:rPr lang="en-US" smtClean="0"/>
-              <a:t>2/23/2022</a:t>
+              <a:t>3/8/2022</a:t>
             </a:fld>
             <a:endParaRPr lang="en-US"/>
           </a:p>
@@ -3133,7 +3735,7 @@
           <a:p>
             <a:fld id="{157714A8-0B30-4C6C-8922-47DC2EC78B7A}" type="datetimeFigureOut">
               <a:rPr lang="en-US" smtClean="0"/>
-              <a:t>2/23/2022</a:t>
+              <a:t>3/8/2022</a:t>
             </a:fld>
             <a:endParaRPr lang="en-US"/>
           </a:p>
@@ -3444,7 +4046,7 @@
           <a:p>
             <a:fld id="{157714A8-0B30-4C6C-8922-47DC2EC78B7A}" type="datetimeFigureOut">
               <a:rPr lang="en-US" smtClean="0"/>
-              <a:t>2/23/2022</a:t>
+              <a:t>3/8/2022</a:t>
             </a:fld>
             <a:endParaRPr lang="en-US"/>
           </a:p>
@@ -3732,7 +4334,7 @@
           <a:p>
             <a:fld id="{157714A8-0B30-4C6C-8922-47DC2EC78B7A}" type="datetimeFigureOut">
               <a:rPr lang="en-US" smtClean="0"/>
-              <a:t>2/23/2022</a:t>
+              <a:t>3/8/2022</a:t>
             </a:fld>
             <a:endParaRPr lang="en-US"/>
           </a:p>
@@ -3973,7 +4575,7 @@
           <a:p>
             <a:fld id="{157714A8-0B30-4C6C-8922-47DC2EC78B7A}" type="datetimeFigureOut">
               <a:rPr lang="en-US" smtClean="0"/>
-              <a:t>2/23/2022</a:t>
+              <a:t>3/8/2022</a:t>
             </a:fld>
             <a:endParaRPr lang="en-US"/>
           </a:p>
@@ -5231,7 +5833,7 @@
         </p:blipFill>
         <p:spPr bwMode="auto">
           <a:xfrm>
-            <a:off x="3241346" y="4553538"/>
+            <a:off x="3238145" y="4420776"/>
             <a:ext cx="2933700" cy="2514600"/>
           </a:xfrm>
           <a:prstGeom prst="rect">
@@ -5331,7 +5933,7 @@
           <p:cNvPr id="2" name="Title 1">
             <a:extLst>
               <a:ext uri="{FF2B5EF4-FFF2-40B4-BE49-F238E27FC236}">
-                <a16:creationId xmlns:a16="http://schemas.microsoft.com/office/drawing/2014/main" id="{C556D1E3-D9B8-4581-9658-BDBDD678BAC5}"/>
+                <a16:creationId xmlns:a16="http://schemas.microsoft.com/office/drawing/2014/main" id="{1290198C-23E8-4AD5-8E94-365E32E2E65C}"/>
               </a:ext>
             </a:extLst>
           </p:cNvPr>
@@ -5344,24 +5946,44 @@
         </p:nvSpPr>
         <p:spPr/>
         <p:txBody>
-          <a:bodyPr>
-            <a:normAutofit fontScale="90000"/>
-          </a:bodyPr>
+          <a:bodyPr/>
           <a:lstStyle/>
           <a:p>
-            <a:r>
-              <a:rPr lang="en-US" dirty="0"/>
-              <a:t>The next widening layer, does the adjustment on the 4x4 squares that need to be more modified. </a:t>
-            </a:r>
+            <a:endParaRPr lang="en-US"/>
+          </a:p>
+        </p:txBody>
+      </p:sp>
+      <p:sp>
+        <p:nvSpPr>
+          <p:cNvPr id="3" name="Content Placeholder 2">
+            <a:extLst>
+              <a:ext uri="{FF2B5EF4-FFF2-40B4-BE49-F238E27FC236}">
+                <a16:creationId xmlns:a16="http://schemas.microsoft.com/office/drawing/2014/main" id="{FD39C205-4F43-4EF5-B760-3FAD73FA8973}"/>
+              </a:ext>
+            </a:extLst>
+          </p:cNvPr>
+          <p:cNvSpPr>
+            <a:spLocks noGrp="1"/>
+          </p:cNvSpPr>
+          <p:nvPr>
+            <p:ph idx="1"/>
+          </p:nvPr>
+        </p:nvSpPr>
+        <p:spPr/>
+        <p:txBody>
+          <a:bodyPr/>
+          <a:lstStyle/>
+          <a:p>
+            <a:endParaRPr lang="en-US"/>
           </a:p>
         </p:txBody>
       </p:sp>
       <p:pic>
         <p:nvPicPr>
-          <p:cNvPr id="2050" name="Picture 2">
-            <a:extLst>
-              <a:ext uri="{FF2B5EF4-FFF2-40B4-BE49-F238E27FC236}">
-                <a16:creationId xmlns:a16="http://schemas.microsoft.com/office/drawing/2014/main" id="{06B066D5-CA7B-471B-8827-15EDB11F3239}"/>
+          <p:cNvPr id="13326" name="Picture 14">
+            <a:extLst>
+              <a:ext uri="{FF2B5EF4-FFF2-40B4-BE49-F238E27FC236}">
+                <a16:creationId xmlns:a16="http://schemas.microsoft.com/office/drawing/2014/main" id="{EB91AD01-085D-4042-B11A-E50B4C0481CA}"/>
               </a:ext>
             </a:extLst>
           </p:cNvPr>
@@ -5385,8 +6007,8 @@
         </p:blipFill>
         <p:spPr bwMode="auto">
           <a:xfrm>
-            <a:off x="0" y="1454944"/>
-            <a:ext cx="3009900" cy="2514600"/>
+            <a:off x="4881563" y="2228850"/>
+            <a:ext cx="2428875" cy="2400300"/>
           </a:xfrm>
           <a:prstGeom prst="rect">
             <a:avLst/>
@@ -5403,247 +6025,10 @@
           </a:extLst>
         </p:spPr>
       </p:pic>
-      <p:pic>
-        <p:nvPicPr>
-          <p:cNvPr id="2052" name="Picture 4">
-            <a:extLst>
-              <a:ext uri="{FF2B5EF4-FFF2-40B4-BE49-F238E27FC236}">
-                <a16:creationId xmlns:a16="http://schemas.microsoft.com/office/drawing/2014/main" id="{1E7E7CB1-C397-4EE6-9E43-AF17C6A461E6}"/>
-              </a:ext>
-            </a:extLst>
-          </p:cNvPr>
-          <p:cNvPicPr>
-            <a:picLocks noGrp="1" noChangeAspect="1" noChangeArrowheads="1"/>
-          </p:cNvPicPr>
-          <p:nvPr>
-            <p:ph idx="1"/>
-          </p:nvPr>
-        </p:nvPicPr>
-        <p:blipFill>
-          <a:blip r:embed="rId3">
-            <a:extLst>
-              <a:ext uri="{28A0092B-C50C-407E-A947-70E740481C1C}">
-                <a14:useLocalDpi xmlns:a14="http://schemas.microsoft.com/office/drawing/2010/main" val="0"/>
-              </a:ext>
-            </a:extLst>
-          </a:blip>
-          <a:srcRect/>
-          <a:stretch>
-            <a:fillRect/>
-          </a:stretch>
-        </p:blipFill>
-        <p:spPr bwMode="auto">
-          <a:xfrm>
-            <a:off x="-264160" y="4570254"/>
-            <a:ext cx="4954129" cy="3353564"/>
-          </a:xfrm>
-          <a:prstGeom prst="rect">
-            <a:avLst/>
-          </a:prstGeom>
-          <a:noFill/>
-          <a:extLst>
-            <a:ext uri="{909E8E84-426E-40DD-AFC4-6F175D3DCCD1}">
-              <a14:hiddenFill xmlns:a14="http://schemas.microsoft.com/office/drawing/2010/main">
-                <a:solidFill>
-                  <a:srgbClr val="FFFFFF"/>
-                </a:solidFill>
-              </a14:hiddenFill>
-            </a:ext>
-          </a:extLst>
-        </p:spPr>
-      </p:pic>
-      <p:pic>
-        <p:nvPicPr>
-          <p:cNvPr id="2054" name="Picture 6">
-            <a:extLst>
-              <a:ext uri="{FF2B5EF4-FFF2-40B4-BE49-F238E27FC236}">
-                <a16:creationId xmlns:a16="http://schemas.microsoft.com/office/drawing/2014/main" id="{ECD97EC0-2CC4-4C45-8A65-765A293E91D7}"/>
-              </a:ext>
-            </a:extLst>
-          </p:cNvPr>
-          <p:cNvPicPr>
-            <a:picLocks noChangeAspect="1" noChangeArrowheads="1"/>
-          </p:cNvPicPr>
-          <p:nvPr/>
-        </p:nvPicPr>
-        <p:blipFill>
-          <a:blip r:embed="rId4">
-            <a:extLst>
-              <a:ext uri="{28A0092B-C50C-407E-A947-70E740481C1C}">
-                <a14:useLocalDpi xmlns:a14="http://schemas.microsoft.com/office/drawing/2010/main" val="0"/>
-              </a:ext>
-            </a:extLst>
-          </a:blip>
-          <a:srcRect/>
-          <a:stretch>
-            <a:fillRect/>
-          </a:stretch>
-        </p:blipFill>
-        <p:spPr bwMode="auto">
-          <a:xfrm>
-            <a:off x="2964886" y="1486694"/>
-            <a:ext cx="3067050" cy="2514600"/>
-          </a:xfrm>
-          <a:prstGeom prst="rect">
-            <a:avLst/>
-          </a:prstGeom>
-          <a:noFill/>
-          <a:extLst>
-            <a:ext uri="{909E8E84-426E-40DD-AFC4-6F175D3DCCD1}">
-              <a14:hiddenFill xmlns:a14="http://schemas.microsoft.com/office/drawing/2010/main">
-                <a:solidFill>
-                  <a:srgbClr val="FFFFFF"/>
-                </a:solidFill>
-              </a14:hiddenFill>
-            </a:ext>
-          </a:extLst>
-        </p:spPr>
-      </p:pic>
-      <p:pic>
-        <p:nvPicPr>
-          <p:cNvPr id="2056" name="Picture 8">
-            <a:extLst>
-              <a:ext uri="{FF2B5EF4-FFF2-40B4-BE49-F238E27FC236}">
-                <a16:creationId xmlns:a16="http://schemas.microsoft.com/office/drawing/2014/main" id="{9C35E469-0AF9-495D-9018-2CA4770CFF80}"/>
-              </a:ext>
-            </a:extLst>
-          </p:cNvPr>
-          <p:cNvPicPr>
-            <a:picLocks noChangeAspect="1" noChangeArrowheads="1"/>
-          </p:cNvPicPr>
-          <p:nvPr/>
-        </p:nvPicPr>
-        <p:blipFill>
-          <a:blip r:embed="rId5">
-            <a:extLst>
-              <a:ext uri="{28A0092B-C50C-407E-A947-70E740481C1C}">
-                <a14:useLocalDpi xmlns:a14="http://schemas.microsoft.com/office/drawing/2010/main" val="0"/>
-              </a:ext>
-            </a:extLst>
-          </a:blip>
-          <a:srcRect/>
-          <a:stretch>
-            <a:fillRect/>
-          </a:stretch>
-        </p:blipFill>
-        <p:spPr bwMode="auto">
-          <a:xfrm>
-            <a:off x="5949950" y="4033044"/>
-            <a:ext cx="2933700" cy="2514600"/>
-          </a:xfrm>
-          <a:prstGeom prst="rect">
-            <a:avLst/>
-          </a:prstGeom>
-          <a:noFill/>
-          <a:extLst>
-            <a:ext uri="{909E8E84-426E-40DD-AFC4-6F175D3DCCD1}">
-              <a14:hiddenFill xmlns:a14="http://schemas.microsoft.com/office/drawing/2010/main">
-                <a:solidFill>
-                  <a:srgbClr val="FFFFFF"/>
-                </a:solidFill>
-              </a14:hiddenFill>
-            </a:ext>
-          </a:extLst>
-        </p:spPr>
-      </p:pic>
-      <p:pic>
-        <p:nvPicPr>
-          <p:cNvPr id="2058" name="Picture 10">
-            <a:extLst>
-              <a:ext uri="{FF2B5EF4-FFF2-40B4-BE49-F238E27FC236}">
-                <a16:creationId xmlns:a16="http://schemas.microsoft.com/office/drawing/2014/main" id="{DA5A3BE3-6111-4828-B7C3-54C33D5817CE}"/>
-              </a:ext>
-            </a:extLst>
-          </p:cNvPr>
-          <p:cNvPicPr>
-            <a:picLocks noChangeAspect="1" noChangeArrowheads="1"/>
-          </p:cNvPicPr>
-          <p:nvPr/>
-        </p:nvPicPr>
-        <p:blipFill>
-          <a:blip r:embed="rId6">
-            <a:extLst>
-              <a:ext uri="{28A0092B-C50C-407E-A947-70E740481C1C}">
-                <a14:useLocalDpi xmlns:a14="http://schemas.microsoft.com/office/drawing/2010/main" val="0"/>
-              </a:ext>
-            </a:extLst>
-          </a:blip>
-          <a:srcRect/>
-          <a:stretch>
-            <a:fillRect/>
-          </a:stretch>
-        </p:blipFill>
-        <p:spPr bwMode="auto">
-          <a:xfrm>
-            <a:off x="5875514" y="1452880"/>
-            <a:ext cx="2933700" cy="2514600"/>
-          </a:xfrm>
-          <a:prstGeom prst="rect">
-            <a:avLst/>
-          </a:prstGeom>
-          <a:noFill/>
-          <a:extLst>
-            <a:ext uri="{909E8E84-426E-40DD-AFC4-6F175D3DCCD1}">
-              <a14:hiddenFill xmlns:a14="http://schemas.microsoft.com/office/drawing/2010/main">
-                <a:solidFill>
-                  <a:srgbClr val="FFFFFF"/>
-                </a:solidFill>
-              </a14:hiddenFill>
-            </a:ext>
-          </a:extLst>
-        </p:spPr>
-      </p:pic>
-      <p:pic>
-        <p:nvPicPr>
-          <p:cNvPr id="2060" name="Picture 12">
-            <a:extLst>
-              <a:ext uri="{FF2B5EF4-FFF2-40B4-BE49-F238E27FC236}">
-                <a16:creationId xmlns:a16="http://schemas.microsoft.com/office/drawing/2014/main" id="{67B216D1-6697-413A-BBD5-DEBFEAAF9D36}"/>
-              </a:ext>
-            </a:extLst>
-          </p:cNvPr>
-          <p:cNvPicPr>
-            <a:picLocks noChangeAspect="1" noChangeArrowheads="1"/>
-          </p:cNvPicPr>
-          <p:nvPr/>
-        </p:nvPicPr>
-        <p:blipFill>
-          <a:blip r:embed="rId7">
-            <a:extLst>
-              <a:ext uri="{28A0092B-C50C-407E-A947-70E740481C1C}">
-                <a14:useLocalDpi xmlns:a14="http://schemas.microsoft.com/office/drawing/2010/main" val="0"/>
-              </a:ext>
-            </a:extLst>
-          </a:blip>
-          <a:srcRect/>
-          <a:stretch>
-            <a:fillRect/>
-          </a:stretch>
-        </p:blipFill>
-        <p:spPr bwMode="auto">
-          <a:xfrm>
-            <a:off x="8996822" y="2775744"/>
-            <a:ext cx="2990850" cy="2514600"/>
-          </a:xfrm>
-          <a:prstGeom prst="rect">
-            <a:avLst/>
-          </a:prstGeom>
-          <a:noFill/>
-          <a:extLst>
-            <a:ext uri="{909E8E84-426E-40DD-AFC4-6F175D3DCCD1}">
-              <a14:hiddenFill xmlns:a14="http://schemas.microsoft.com/office/drawing/2010/main">
-                <a:solidFill>
-                  <a:srgbClr val="FFFFFF"/>
-                </a:solidFill>
-              </a14:hiddenFill>
-            </a:ext>
-          </a:extLst>
-        </p:spPr>
-      </p:pic>
     </p:spTree>
     <p:extLst>
       <p:ext uri="{BB962C8B-B14F-4D97-AF65-F5344CB8AC3E}">
-        <p14:creationId xmlns:p14="http://schemas.microsoft.com/office/powerpoint/2010/main" val="1267434647"/>
+        <p14:creationId xmlns:p14="http://schemas.microsoft.com/office/powerpoint/2010/main" val="4097107745"/>
       </p:ext>
     </p:extLst>
   </p:cSld>
@@ -5675,7 +6060,7 @@
           <p:cNvPr id="2" name="Title 1">
             <a:extLst>
               <a:ext uri="{FF2B5EF4-FFF2-40B4-BE49-F238E27FC236}">
-                <a16:creationId xmlns:a16="http://schemas.microsoft.com/office/drawing/2014/main" id="{987D3273-E4CA-4796-BB76-5F9512EC0DA0}"/>
+                <a16:creationId xmlns:a16="http://schemas.microsoft.com/office/drawing/2014/main" id="{C556D1E3-D9B8-4581-9658-BDBDD678BAC5}"/>
               </a:ext>
             </a:extLst>
           </p:cNvPr>
@@ -5689,30 +6074,23 @@
         <p:spPr/>
         <p:txBody>
           <a:bodyPr>
-            <a:normAutofit/>
+            <a:normAutofit fontScale="90000"/>
           </a:bodyPr>
           <a:lstStyle/>
           <a:p>
             <a:r>
-              <a:rPr lang="en-US" sz="2000" dirty="0"/>
-              <a:t>For the first refinement, encode, move in time, and then decode. </a:t>
-            </a:r>
-            <a:br>
-              <a:rPr lang="en-US" sz="2000" dirty="0"/>
-            </a:br>
-            <a:r>
-              <a:rPr lang="en-US" sz="2000" dirty="0"/>
-              <a:t>It does alright for a while, and then comes off. It doesn’t really have the fast scale figured out very well. </a:t>
+              <a:rPr lang="en-US" dirty="0"/>
+              <a:t>The next widening layer, does the adjustment on the 4x4 squares that need to be more modified. </a:t>
             </a:r>
           </a:p>
         </p:txBody>
       </p:sp>
       <p:pic>
         <p:nvPicPr>
-          <p:cNvPr id="3078" name="Picture 6">
-            <a:extLst>
-              <a:ext uri="{FF2B5EF4-FFF2-40B4-BE49-F238E27FC236}">
-                <a16:creationId xmlns:a16="http://schemas.microsoft.com/office/drawing/2014/main" id="{8864DDC1-EF8C-48B3-902A-CB94604327E9}"/>
+          <p:cNvPr id="2050" name="Picture 2">
+            <a:extLst>
+              <a:ext uri="{FF2B5EF4-FFF2-40B4-BE49-F238E27FC236}">
+                <a16:creationId xmlns:a16="http://schemas.microsoft.com/office/drawing/2014/main" id="{06B066D5-CA7B-471B-8827-15EDB11F3239}"/>
               </a:ext>
             </a:extLst>
           </p:cNvPr>
@@ -5736,8 +6114,8 @@
         </p:blipFill>
         <p:spPr bwMode="auto">
           <a:xfrm>
-            <a:off x="5260048" y="3995255"/>
-            <a:ext cx="2990850" cy="2514600"/>
+            <a:off x="0" y="1454944"/>
+            <a:ext cx="3009900" cy="2514600"/>
           </a:xfrm>
           <a:prstGeom prst="rect">
             <a:avLst/>
@@ -5756,17 +6134,19 @@
       </p:pic>
       <p:pic>
         <p:nvPicPr>
-          <p:cNvPr id="3082" name="Picture 10">
-            <a:extLst>
-              <a:ext uri="{FF2B5EF4-FFF2-40B4-BE49-F238E27FC236}">
-                <a16:creationId xmlns:a16="http://schemas.microsoft.com/office/drawing/2014/main" id="{28657156-5E5F-4770-B14B-E3FFE88D4FE1}"/>
+          <p:cNvPr id="2052" name="Picture 4">
+            <a:extLst>
+              <a:ext uri="{FF2B5EF4-FFF2-40B4-BE49-F238E27FC236}">
+                <a16:creationId xmlns:a16="http://schemas.microsoft.com/office/drawing/2014/main" id="{1E7E7CB1-C397-4EE6-9E43-AF17C6A461E6}"/>
               </a:ext>
             </a:extLst>
           </p:cNvPr>
           <p:cNvPicPr>
-            <a:picLocks noChangeAspect="1" noChangeArrowheads="1"/>
+            <a:picLocks noGrp="1" noChangeAspect="1" noChangeArrowheads="1"/>
           </p:cNvPicPr>
-          <p:nvPr/>
+          <p:nvPr>
+            <p:ph idx="1"/>
+          </p:nvPr>
         </p:nvPicPr>
         <p:blipFill>
           <a:blip r:embed="rId3">
@@ -5783,8 +6163,8 @@
         </p:blipFill>
         <p:spPr bwMode="auto">
           <a:xfrm>
-            <a:off x="1985962" y="1522828"/>
-            <a:ext cx="3571875" cy="2514600"/>
+            <a:off x="0" y="4272303"/>
+            <a:ext cx="4954129" cy="3353564"/>
           </a:xfrm>
           <a:prstGeom prst="rect">
             <a:avLst/>
@@ -5803,10 +6183,10 @@
       </p:pic>
       <p:pic>
         <p:nvPicPr>
-          <p:cNvPr id="3084" name="Picture 12">
-            <a:extLst>
-              <a:ext uri="{FF2B5EF4-FFF2-40B4-BE49-F238E27FC236}">
-                <a16:creationId xmlns:a16="http://schemas.microsoft.com/office/drawing/2014/main" id="{5609C9AE-F7E1-4B09-9B0E-D03F36227356}"/>
+          <p:cNvPr id="2054" name="Picture 6">
+            <a:extLst>
+              <a:ext uri="{FF2B5EF4-FFF2-40B4-BE49-F238E27FC236}">
+                <a16:creationId xmlns:a16="http://schemas.microsoft.com/office/drawing/2014/main" id="{ECD97EC0-2CC4-4C45-8A65-765A293E91D7}"/>
               </a:ext>
             </a:extLst>
           </p:cNvPr>
@@ -5830,8 +6210,8 @@
         </p:blipFill>
         <p:spPr bwMode="auto">
           <a:xfrm>
-            <a:off x="-106755" y="5097635"/>
-            <a:ext cx="4648968" cy="1868971"/>
+            <a:off x="2964886" y="1486694"/>
+            <a:ext cx="3067050" cy="2514600"/>
           </a:xfrm>
           <a:prstGeom prst="rect">
             <a:avLst/>
@@ -5850,19 +6230,17 @@
       </p:pic>
       <p:pic>
         <p:nvPicPr>
-          <p:cNvPr id="3086" name="Picture 14">
-            <a:extLst>
-              <a:ext uri="{FF2B5EF4-FFF2-40B4-BE49-F238E27FC236}">
-                <a16:creationId xmlns:a16="http://schemas.microsoft.com/office/drawing/2014/main" id="{9FE8D79B-D71E-4EE9-A31D-D597279F9FE0}"/>
+          <p:cNvPr id="2056" name="Picture 8">
+            <a:extLst>
+              <a:ext uri="{FF2B5EF4-FFF2-40B4-BE49-F238E27FC236}">
+                <a16:creationId xmlns:a16="http://schemas.microsoft.com/office/drawing/2014/main" id="{9C35E469-0AF9-495D-9018-2CA4770CFF80}"/>
               </a:ext>
             </a:extLst>
           </p:cNvPr>
           <p:cNvPicPr>
-            <a:picLocks noGrp="1" noChangeAspect="1" noChangeArrowheads="1"/>
+            <a:picLocks noChangeAspect="1" noChangeArrowheads="1"/>
           </p:cNvPicPr>
-          <p:nvPr>
-            <p:ph idx="1"/>
-          </p:nvPr>
+          <p:nvPr/>
         </p:nvPicPr>
         <p:blipFill>
           <a:blip r:embed="rId5">
@@ -5879,8 +6257,8 @@
         </p:blipFill>
         <p:spPr bwMode="auto">
           <a:xfrm>
-            <a:off x="8200670" y="1370529"/>
-            <a:ext cx="2727235" cy="2337630"/>
+            <a:off x="6031936" y="1518444"/>
+            <a:ext cx="2933700" cy="2514600"/>
           </a:xfrm>
           <a:prstGeom prst="rect">
             <a:avLst/>
@@ -5899,10 +6277,10 @@
       </p:pic>
       <p:pic>
         <p:nvPicPr>
-          <p:cNvPr id="3088" name="Picture 16">
-            <a:extLst>
-              <a:ext uri="{FF2B5EF4-FFF2-40B4-BE49-F238E27FC236}">
-                <a16:creationId xmlns:a16="http://schemas.microsoft.com/office/drawing/2014/main" id="{4588E0EB-6D5F-4D4B-9F66-6F4A50B17A6D}"/>
+          <p:cNvPr id="2060" name="Picture 12">
+            <a:extLst>
+              <a:ext uri="{FF2B5EF4-FFF2-40B4-BE49-F238E27FC236}">
+                <a16:creationId xmlns:a16="http://schemas.microsoft.com/office/drawing/2014/main" id="{67B216D1-6697-413A-BBD5-DEBFEAAF9D36}"/>
               </a:ext>
             </a:extLst>
           </p:cNvPr>
@@ -5926,8 +6304,8 @@
         </p:blipFill>
         <p:spPr bwMode="auto">
           <a:xfrm>
-            <a:off x="8225784" y="3821527"/>
-            <a:ext cx="2933700" cy="2514600"/>
+            <a:off x="8996822" y="2775744"/>
+            <a:ext cx="2990850" cy="2514600"/>
           </a:xfrm>
           <a:prstGeom prst="rect">
             <a:avLst/>
@@ -5944,151 +6322,10 @@
           </a:extLst>
         </p:spPr>
       </p:pic>
-      <p:pic>
-        <p:nvPicPr>
-          <p:cNvPr id="3090" name="Picture 18">
-            <a:extLst>
-              <a:ext uri="{FF2B5EF4-FFF2-40B4-BE49-F238E27FC236}">
-                <a16:creationId xmlns:a16="http://schemas.microsoft.com/office/drawing/2014/main" id="{F370C4A7-0C7C-405B-A990-D6146AD6DBC4}"/>
-              </a:ext>
-            </a:extLst>
-          </p:cNvPr>
-          <p:cNvPicPr>
-            <a:picLocks noChangeAspect="1" noChangeArrowheads="1"/>
-          </p:cNvPicPr>
-          <p:nvPr/>
-        </p:nvPicPr>
-        <p:blipFill>
-          <a:blip r:embed="rId7">
-            <a:extLst>
-              <a:ext uri="{28A0092B-C50C-407E-A947-70E740481C1C}">
-                <a14:useLocalDpi xmlns:a14="http://schemas.microsoft.com/office/drawing/2010/main" val="0"/>
-              </a:ext>
-            </a:extLst>
-          </a:blip>
-          <a:srcRect/>
-          <a:stretch>
-            <a:fillRect/>
-          </a:stretch>
-        </p:blipFill>
-        <p:spPr bwMode="auto">
-          <a:xfrm>
-            <a:off x="8200670" y="4318656"/>
-            <a:ext cx="3657600" cy="2647950"/>
-          </a:xfrm>
-          <a:prstGeom prst="rect">
-            <a:avLst/>
-          </a:prstGeom>
-          <a:noFill/>
-          <a:extLst>
-            <a:ext uri="{909E8E84-426E-40DD-AFC4-6F175D3DCCD1}">
-              <a14:hiddenFill xmlns:a14="http://schemas.microsoft.com/office/drawing/2010/main">
-                <a:solidFill>
-                  <a:srgbClr val="FFFFFF"/>
-                </a:solidFill>
-              </a14:hiddenFill>
-            </a:ext>
-          </a:extLst>
-        </p:spPr>
-      </p:pic>
-      <p:pic>
-        <p:nvPicPr>
-          <p:cNvPr id="3092" name="Picture 20">
-            <a:extLst>
-              <a:ext uri="{FF2B5EF4-FFF2-40B4-BE49-F238E27FC236}">
-                <a16:creationId xmlns:a16="http://schemas.microsoft.com/office/drawing/2014/main" id="{BF4E6112-9EC5-4B1B-855D-E8738CEA11A1}"/>
-              </a:ext>
-            </a:extLst>
-          </p:cNvPr>
-          <p:cNvPicPr>
-            <a:picLocks noChangeAspect="1" noChangeArrowheads="1"/>
-          </p:cNvPicPr>
-          <p:nvPr/>
-        </p:nvPicPr>
-        <p:blipFill>
-          <a:blip r:embed="rId8">
-            <a:extLst>
-              <a:ext uri="{28A0092B-C50C-407E-A947-70E740481C1C}">
-                <a14:useLocalDpi xmlns:a14="http://schemas.microsoft.com/office/drawing/2010/main" val="0"/>
-              </a:ext>
-            </a:extLst>
-          </a:blip>
-          <a:srcRect/>
-          <a:stretch>
-            <a:fillRect/>
-          </a:stretch>
-        </p:blipFill>
-        <p:spPr bwMode="auto">
-          <a:xfrm>
-            <a:off x="-609216" y="1398209"/>
-            <a:ext cx="2933700" cy="2514600"/>
-          </a:xfrm>
-          <a:prstGeom prst="rect">
-            <a:avLst/>
-          </a:prstGeom>
-          <a:noFill/>
-          <a:extLst>
-            <a:ext uri="{909E8E84-426E-40DD-AFC4-6F175D3DCCD1}">
-              <a14:hiddenFill xmlns:a14="http://schemas.microsoft.com/office/drawing/2010/main">
-                <a:solidFill>
-                  <a:srgbClr val="FFFFFF"/>
-                </a:solidFill>
-              </a14:hiddenFill>
-            </a:ext>
-          </a:extLst>
-        </p:spPr>
-      </p:pic>
-      <p:pic>
-        <p:nvPicPr>
-          <p:cNvPr id="3080" name="Picture 8">
-            <a:extLst>
-              <a:ext uri="{FF2B5EF4-FFF2-40B4-BE49-F238E27FC236}">
-                <a16:creationId xmlns:a16="http://schemas.microsoft.com/office/drawing/2014/main" id="{2245CDEA-5308-4516-B0E7-BA115EB6E7F4}"/>
-              </a:ext>
-            </a:extLst>
-          </p:cNvPr>
-          <p:cNvPicPr>
-            <a:picLocks noChangeAspect="1" noChangeArrowheads="1"/>
-          </p:cNvPicPr>
-          <p:nvPr/>
-        </p:nvPicPr>
-        <p:blipFill>
-          <a:blip r:embed="rId9">
-            <a:extLst>
-              <a:ext uri="{28A0092B-C50C-407E-A947-70E740481C1C}">
-                <a14:useLocalDpi xmlns:a14="http://schemas.microsoft.com/office/drawing/2010/main" val="0"/>
-              </a:ext>
-            </a:extLst>
-          </a:blip>
-          <a:srcRect/>
-          <a:stretch>
-            <a:fillRect/>
-          </a:stretch>
-        </p:blipFill>
-        <p:spPr bwMode="auto">
-          <a:xfrm>
-            <a:off x="5234934" y="1480655"/>
-            <a:ext cx="2990850" cy="2514600"/>
-          </a:xfrm>
-          <a:prstGeom prst="rect">
-            <a:avLst/>
-          </a:prstGeom>
-          <a:noFill/>
-          <a:extLst>
-            <a:ext uri="{909E8E84-426E-40DD-AFC4-6F175D3DCCD1}">
-              <a14:hiddenFill xmlns:a14="http://schemas.microsoft.com/office/drawing/2010/main">
-                <a:solidFill>
-                  <a:srgbClr val="FFFFFF"/>
-                </a:solidFill>
-              </a14:hiddenFill>
-            </a:ext>
-          </a:extLst>
-        </p:spPr>
-      </p:pic>
     </p:spTree>
     <p:extLst>
       <p:ext uri="{BB962C8B-B14F-4D97-AF65-F5344CB8AC3E}">
-        <p14:creationId xmlns:p14="http://schemas.microsoft.com/office/powerpoint/2010/main" val="1614412404"/>
+        <p14:creationId xmlns:p14="http://schemas.microsoft.com/office/powerpoint/2010/main" val="1267434647"/>
       </p:ext>
     </p:extLst>
   </p:cSld>
@@ -6120,7 +6357,7 @@
           <p:cNvPr id="2" name="Title 1">
             <a:extLst>
               <a:ext uri="{FF2B5EF4-FFF2-40B4-BE49-F238E27FC236}">
-                <a16:creationId xmlns:a16="http://schemas.microsoft.com/office/drawing/2014/main" id="{A491A83B-C4B1-42D1-A73B-0D0B984F1D66}"/>
+                <a16:creationId xmlns:a16="http://schemas.microsoft.com/office/drawing/2014/main" id="{987D3273-E4CA-4796-BB76-5F9512EC0DA0}"/>
               </a:ext>
             </a:extLst>
           </p:cNvPr>
@@ -6134,23 +6371,30 @@
         <p:spPr/>
         <p:txBody>
           <a:bodyPr>
-            <a:normAutofit fontScale="90000"/>
+            <a:normAutofit/>
           </a:bodyPr>
           <a:lstStyle/>
           <a:p>
             <a:r>
-              <a:rPr lang="en-US" dirty="0"/>
-              <a:t>Looking at t=96, (8*12). It seems like its sort of picking up the big period, but not finding the small one at all, which is expected.  </a:t>
+              <a:rPr lang="en-US" sz="2000" dirty="0"/>
+              <a:t>For the first refinement, encode, move in time, and then decode. </a:t>
+            </a:r>
+            <a:br>
+              <a:rPr lang="en-US" sz="2000" dirty="0"/>
+            </a:br>
+            <a:r>
+              <a:rPr lang="en-US" sz="2000" dirty="0"/>
+              <a:t>It does alright for a while, and then comes off. It doesn’t really have the fast scale figured out very well. </a:t>
             </a:r>
           </a:p>
         </p:txBody>
       </p:sp>
       <p:pic>
         <p:nvPicPr>
-          <p:cNvPr id="4098" name="Picture 2">
-            <a:extLst>
-              <a:ext uri="{FF2B5EF4-FFF2-40B4-BE49-F238E27FC236}">
-                <a16:creationId xmlns:a16="http://schemas.microsoft.com/office/drawing/2014/main" id="{8A4A3F8E-719D-4CE0-8B83-67028E638253}"/>
+          <p:cNvPr id="3078" name="Picture 6">
+            <a:extLst>
+              <a:ext uri="{FF2B5EF4-FFF2-40B4-BE49-F238E27FC236}">
+                <a16:creationId xmlns:a16="http://schemas.microsoft.com/office/drawing/2014/main" id="{8864DDC1-EF8C-48B3-902A-CB94604327E9}"/>
               </a:ext>
             </a:extLst>
           </p:cNvPr>
@@ -6174,8 +6418,8 @@
         </p:blipFill>
         <p:spPr bwMode="auto">
           <a:xfrm>
-            <a:off x="416746" y="1801830"/>
-            <a:ext cx="2933700" cy="2514600"/>
+            <a:off x="5260048" y="3995255"/>
+            <a:ext cx="2990850" cy="2514600"/>
           </a:xfrm>
           <a:prstGeom prst="rect">
             <a:avLst/>
@@ -6194,19 +6438,17 @@
       </p:pic>
       <p:pic>
         <p:nvPicPr>
-          <p:cNvPr id="4100" name="Picture 4">
-            <a:extLst>
-              <a:ext uri="{FF2B5EF4-FFF2-40B4-BE49-F238E27FC236}">
-                <a16:creationId xmlns:a16="http://schemas.microsoft.com/office/drawing/2014/main" id="{1AA5F9CC-0C70-4933-A19E-96016F69F560}"/>
+          <p:cNvPr id="3082" name="Picture 10">
+            <a:extLst>
+              <a:ext uri="{FF2B5EF4-FFF2-40B4-BE49-F238E27FC236}">
+                <a16:creationId xmlns:a16="http://schemas.microsoft.com/office/drawing/2014/main" id="{28657156-5E5F-4770-B14B-E3FFE88D4FE1}"/>
               </a:ext>
             </a:extLst>
           </p:cNvPr>
           <p:cNvPicPr>
-            <a:picLocks noGrp="1" noChangeAspect="1" noChangeArrowheads="1"/>
+            <a:picLocks noChangeAspect="1" noChangeArrowheads="1"/>
           </p:cNvPicPr>
-          <p:nvPr>
-            <p:ph idx="1"/>
-          </p:nvPr>
+          <p:nvPr/>
         </p:nvPicPr>
         <p:blipFill>
           <a:blip r:embed="rId3">
@@ -6223,8 +6465,8 @@
         </p:blipFill>
         <p:spPr bwMode="auto">
           <a:xfrm>
-            <a:off x="357518" y="4286274"/>
-            <a:ext cx="3052156" cy="2616134"/>
+            <a:off x="1985962" y="1522828"/>
+            <a:ext cx="3571875" cy="2514600"/>
           </a:xfrm>
           <a:prstGeom prst="rect">
             <a:avLst/>
@@ -6243,10 +6485,10 @@
       </p:pic>
       <p:pic>
         <p:nvPicPr>
-          <p:cNvPr id="8" name="Picture 18">
-            <a:extLst>
-              <a:ext uri="{FF2B5EF4-FFF2-40B4-BE49-F238E27FC236}">
-                <a16:creationId xmlns:a16="http://schemas.microsoft.com/office/drawing/2014/main" id="{69020F29-A072-4A50-BE2C-91ACEA832D6C}"/>
+          <p:cNvPr id="3084" name="Picture 12">
+            <a:extLst>
+              <a:ext uri="{FF2B5EF4-FFF2-40B4-BE49-F238E27FC236}">
+                <a16:creationId xmlns:a16="http://schemas.microsoft.com/office/drawing/2014/main" id="{5609C9AE-F7E1-4B09-9B0E-D03F36227356}"/>
               </a:ext>
             </a:extLst>
           </p:cNvPr>
@@ -6270,8 +6512,8 @@
         </p:blipFill>
         <p:spPr bwMode="auto">
           <a:xfrm>
-            <a:off x="7224625" y="2895624"/>
-            <a:ext cx="3657600" cy="2647950"/>
+            <a:off x="-106755" y="5097635"/>
+            <a:ext cx="4648968" cy="1868971"/>
           </a:xfrm>
           <a:prstGeom prst="rect">
             <a:avLst/>
@@ -6290,17 +6532,19 @@
       </p:pic>
       <p:pic>
         <p:nvPicPr>
-          <p:cNvPr id="4106" name="Picture 10">
-            <a:extLst>
-              <a:ext uri="{FF2B5EF4-FFF2-40B4-BE49-F238E27FC236}">
-                <a16:creationId xmlns:a16="http://schemas.microsoft.com/office/drawing/2014/main" id="{021B5CB4-E2A9-4F3D-828E-ED9A86212D6C}"/>
+          <p:cNvPr id="3086" name="Picture 14">
+            <a:extLst>
+              <a:ext uri="{FF2B5EF4-FFF2-40B4-BE49-F238E27FC236}">
+                <a16:creationId xmlns:a16="http://schemas.microsoft.com/office/drawing/2014/main" id="{9FE8D79B-D71E-4EE9-A31D-D597279F9FE0}"/>
               </a:ext>
             </a:extLst>
           </p:cNvPr>
           <p:cNvPicPr>
-            <a:picLocks noChangeAspect="1" noChangeArrowheads="1"/>
+            <a:picLocks noGrp="1" noChangeAspect="1" noChangeArrowheads="1"/>
           </p:cNvPicPr>
-          <p:nvPr/>
+          <p:nvPr>
+            <p:ph idx="1"/>
+          </p:nvPr>
         </p:nvPicPr>
         <p:blipFill>
           <a:blip r:embed="rId5">
@@ -6317,8 +6561,8 @@
         </p:blipFill>
         <p:spPr bwMode="auto">
           <a:xfrm>
-            <a:off x="3570911" y="1810202"/>
-            <a:ext cx="2933700" cy="2514600"/>
+            <a:off x="8200670" y="1370529"/>
+            <a:ext cx="2727235" cy="2337630"/>
           </a:xfrm>
           <a:prstGeom prst="rect">
             <a:avLst/>
@@ -6337,10 +6581,10 @@
       </p:pic>
       <p:pic>
         <p:nvPicPr>
-          <p:cNvPr id="4108" name="Picture 12">
-            <a:extLst>
-              <a:ext uri="{FF2B5EF4-FFF2-40B4-BE49-F238E27FC236}">
-                <a16:creationId xmlns:a16="http://schemas.microsoft.com/office/drawing/2014/main" id="{B9162A4B-8F78-45B2-9494-A7CAF0E3DF57}"/>
+          <p:cNvPr id="3088" name="Picture 16">
+            <a:extLst>
+              <a:ext uri="{FF2B5EF4-FFF2-40B4-BE49-F238E27FC236}">
+                <a16:creationId xmlns:a16="http://schemas.microsoft.com/office/drawing/2014/main" id="{4588E0EB-6D5F-4D4B-9F66-6F4A50B17A6D}"/>
               </a:ext>
             </a:extLst>
           </p:cNvPr>
@@ -6364,7 +6608,7 @@
         </p:blipFill>
         <p:spPr bwMode="auto">
           <a:xfrm>
-            <a:off x="3570911" y="4227304"/>
+            <a:off x="8225784" y="3821527"/>
             <a:ext cx="2933700" cy="2514600"/>
           </a:xfrm>
           <a:prstGeom prst="rect">
@@ -6382,10 +6626,198 @@
           </a:extLst>
         </p:spPr>
       </p:pic>
+      <p:pic>
+        <p:nvPicPr>
+          <p:cNvPr id="3090" name="Picture 18">
+            <a:extLst>
+              <a:ext uri="{FF2B5EF4-FFF2-40B4-BE49-F238E27FC236}">
+                <a16:creationId xmlns:a16="http://schemas.microsoft.com/office/drawing/2014/main" id="{F370C4A7-0C7C-405B-A990-D6146AD6DBC4}"/>
+              </a:ext>
+            </a:extLst>
+          </p:cNvPr>
+          <p:cNvPicPr>
+            <a:picLocks noChangeAspect="1" noChangeArrowheads="1"/>
+          </p:cNvPicPr>
+          <p:nvPr/>
+        </p:nvPicPr>
+        <p:blipFill>
+          <a:blip r:embed="rId7">
+            <a:extLst>
+              <a:ext uri="{28A0092B-C50C-407E-A947-70E740481C1C}">
+                <a14:useLocalDpi xmlns:a14="http://schemas.microsoft.com/office/drawing/2010/main" val="0"/>
+              </a:ext>
+            </a:extLst>
+          </a:blip>
+          <a:srcRect/>
+          <a:stretch>
+            <a:fillRect/>
+          </a:stretch>
+        </p:blipFill>
+        <p:spPr bwMode="auto">
+          <a:xfrm>
+            <a:off x="11216634" y="3702859"/>
+            <a:ext cx="3657600" cy="2647950"/>
+          </a:xfrm>
+          <a:prstGeom prst="rect">
+            <a:avLst/>
+          </a:prstGeom>
+          <a:noFill/>
+          <a:extLst>
+            <a:ext uri="{909E8E84-426E-40DD-AFC4-6F175D3DCCD1}">
+              <a14:hiddenFill xmlns:a14="http://schemas.microsoft.com/office/drawing/2010/main">
+                <a:solidFill>
+                  <a:srgbClr val="FFFFFF"/>
+                </a:solidFill>
+              </a14:hiddenFill>
+            </a:ext>
+          </a:extLst>
+        </p:spPr>
+      </p:pic>
+      <p:pic>
+        <p:nvPicPr>
+          <p:cNvPr id="3092" name="Picture 20">
+            <a:extLst>
+              <a:ext uri="{FF2B5EF4-FFF2-40B4-BE49-F238E27FC236}">
+                <a16:creationId xmlns:a16="http://schemas.microsoft.com/office/drawing/2014/main" id="{BF4E6112-9EC5-4B1B-855D-E8738CEA11A1}"/>
+              </a:ext>
+            </a:extLst>
+          </p:cNvPr>
+          <p:cNvPicPr>
+            <a:picLocks noChangeAspect="1" noChangeArrowheads="1"/>
+          </p:cNvPicPr>
+          <p:nvPr/>
+        </p:nvPicPr>
+        <p:blipFill>
+          <a:blip r:embed="rId8">
+            <a:extLst>
+              <a:ext uri="{28A0092B-C50C-407E-A947-70E740481C1C}">
+                <a14:useLocalDpi xmlns:a14="http://schemas.microsoft.com/office/drawing/2010/main" val="0"/>
+              </a:ext>
+            </a:extLst>
+          </a:blip>
+          <a:srcRect/>
+          <a:stretch>
+            <a:fillRect/>
+          </a:stretch>
+        </p:blipFill>
+        <p:spPr bwMode="auto">
+          <a:xfrm>
+            <a:off x="-609216" y="1398209"/>
+            <a:ext cx="2933700" cy="2514600"/>
+          </a:xfrm>
+          <a:prstGeom prst="rect">
+            <a:avLst/>
+          </a:prstGeom>
+          <a:noFill/>
+          <a:extLst>
+            <a:ext uri="{909E8E84-426E-40DD-AFC4-6F175D3DCCD1}">
+              <a14:hiddenFill xmlns:a14="http://schemas.microsoft.com/office/drawing/2010/main">
+                <a:solidFill>
+                  <a:srgbClr val="FFFFFF"/>
+                </a:solidFill>
+              </a14:hiddenFill>
+            </a:ext>
+          </a:extLst>
+        </p:spPr>
+      </p:pic>
+      <p:pic>
+        <p:nvPicPr>
+          <p:cNvPr id="3080" name="Picture 8">
+            <a:extLst>
+              <a:ext uri="{FF2B5EF4-FFF2-40B4-BE49-F238E27FC236}">
+                <a16:creationId xmlns:a16="http://schemas.microsoft.com/office/drawing/2014/main" id="{2245CDEA-5308-4516-B0E7-BA115EB6E7F4}"/>
+              </a:ext>
+            </a:extLst>
+          </p:cNvPr>
+          <p:cNvPicPr>
+            <a:picLocks noChangeAspect="1" noChangeArrowheads="1"/>
+          </p:cNvPicPr>
+          <p:nvPr/>
+        </p:nvPicPr>
+        <p:blipFill>
+          <a:blip r:embed="rId9">
+            <a:extLst>
+              <a:ext uri="{28A0092B-C50C-407E-A947-70E740481C1C}">
+                <a14:useLocalDpi xmlns:a14="http://schemas.microsoft.com/office/drawing/2010/main" val="0"/>
+              </a:ext>
+            </a:extLst>
+          </a:blip>
+          <a:srcRect/>
+          <a:stretch>
+            <a:fillRect/>
+          </a:stretch>
+        </p:blipFill>
+        <p:spPr bwMode="auto">
+          <a:xfrm>
+            <a:off x="5234934" y="1480655"/>
+            <a:ext cx="2990850" cy="2514600"/>
+          </a:xfrm>
+          <a:prstGeom prst="rect">
+            <a:avLst/>
+          </a:prstGeom>
+          <a:noFill/>
+          <a:extLst>
+            <a:ext uri="{909E8E84-426E-40DD-AFC4-6F175D3DCCD1}">
+              <a14:hiddenFill xmlns:a14="http://schemas.microsoft.com/office/drawing/2010/main">
+                <a:solidFill>
+                  <a:srgbClr val="FFFFFF"/>
+                </a:solidFill>
+              </a14:hiddenFill>
+            </a:ext>
+          </a:extLst>
+        </p:spPr>
+      </p:pic>
+      <p:pic>
+        <p:nvPicPr>
+          <p:cNvPr id="1026" name="Picture 2">
+            <a:extLst>
+              <a:ext uri="{FF2B5EF4-FFF2-40B4-BE49-F238E27FC236}">
+                <a16:creationId xmlns:a16="http://schemas.microsoft.com/office/drawing/2014/main" id="{8D3CF9DC-BABE-4743-9905-D5E84718844E}"/>
+              </a:ext>
+            </a:extLst>
+          </p:cNvPr>
+          <p:cNvPicPr>
+            <a:picLocks noChangeAspect="1" noChangeArrowheads="1"/>
+          </p:cNvPicPr>
+          <p:nvPr/>
+        </p:nvPicPr>
+        <p:blipFill>
+          <a:blip r:embed="rId10">
+            <a:extLst>
+              <a:ext uri="{28A0092B-C50C-407E-A947-70E740481C1C}">
+                <a14:useLocalDpi xmlns:a14="http://schemas.microsoft.com/office/drawing/2010/main" val="0"/>
+              </a:ext>
+            </a:extLst>
+          </a:blip>
+          <a:srcRect/>
+          <a:stretch>
+            <a:fillRect/>
+          </a:stretch>
+        </p:blipFill>
+        <p:spPr bwMode="auto">
+          <a:xfrm>
+            <a:off x="1682893" y="4031318"/>
+            <a:ext cx="3571875" cy="2400300"/>
+          </a:xfrm>
+          <a:prstGeom prst="rect">
+            <a:avLst/>
+          </a:prstGeom>
+          <a:noFill/>
+          <a:extLst>
+            <a:ext uri="{909E8E84-426E-40DD-AFC4-6F175D3DCCD1}">
+              <a14:hiddenFill xmlns:a14="http://schemas.microsoft.com/office/drawing/2010/main">
+                <a:solidFill>
+                  <a:srgbClr val="FFFFFF"/>
+                </a:solidFill>
+              </a14:hiddenFill>
+            </a:ext>
+          </a:extLst>
+        </p:spPr>
+      </p:pic>
     </p:spTree>
     <p:extLst>
       <p:ext uri="{BB962C8B-B14F-4D97-AF65-F5344CB8AC3E}">
-        <p14:creationId xmlns:p14="http://schemas.microsoft.com/office/powerpoint/2010/main" val="23506946"/>
+        <p14:creationId xmlns:p14="http://schemas.microsoft.com/office/powerpoint/2010/main" val="1614412404"/>
       </p:ext>
     </p:extLst>
   </p:cSld>
@@ -6417,7 +6849,7 @@
           <p:cNvPr id="2" name="Title 1">
             <a:extLst>
               <a:ext uri="{FF2B5EF4-FFF2-40B4-BE49-F238E27FC236}">
-                <a16:creationId xmlns:a16="http://schemas.microsoft.com/office/drawing/2014/main" id="{CEF76244-4DD3-4AB1-91C8-788D6A26752C}"/>
+                <a16:creationId xmlns:a16="http://schemas.microsoft.com/office/drawing/2014/main" id="{DFE7BE26-CD41-465A-A2FD-51CB2F4A0E7B}"/>
               </a:ext>
             </a:extLst>
           </p:cNvPr>
@@ -6430,15 +6862,10 @@
         </p:nvSpPr>
         <p:spPr/>
         <p:txBody>
-          <a:bodyPr>
-            <a:normAutofit fontScale="90000"/>
-          </a:bodyPr>
+          <a:bodyPr/>
           <a:lstStyle/>
           <a:p>
-            <a:r>
-              <a:rPr lang="en-US" dirty="0"/>
-              <a:t>Doing the next step. First train a widening layer so we go from output of first step to truth </a:t>
-            </a:r>
+            <a:endParaRPr lang="en-US"/>
           </a:p>
         </p:txBody>
       </p:sp>
@@ -6447,7 +6874,7 @@
           <p:cNvPr id="3" name="Content Placeholder 2">
             <a:extLst>
               <a:ext uri="{FF2B5EF4-FFF2-40B4-BE49-F238E27FC236}">
-                <a16:creationId xmlns:a16="http://schemas.microsoft.com/office/drawing/2014/main" id="{CA3EE5CC-0B59-4ECC-8F68-A61C532B7396}"/>
+                <a16:creationId xmlns:a16="http://schemas.microsoft.com/office/drawing/2014/main" id="{79A51FBA-D1F6-4D41-A9B2-F29DC4E0B6C3}"/>
               </a:ext>
             </a:extLst>
           </p:cNvPr>
@@ -6463,28 +6890,16 @@
           <a:bodyPr/>
           <a:lstStyle/>
           <a:p>
-            <a:r>
-              <a:rPr lang="en-US" dirty="0"/>
-              <a:t>For training used t+1 of all 500 samples, and all 100 for validation. </a:t>
-            </a:r>
-          </a:p>
-          <a:p>
-            <a:r>
-              <a:rPr lang="en-US" dirty="0"/>
-              <a:t>There is a mask at the threshold, and that’s why a lot of the encoded is 0</a:t>
-            </a:r>
-          </a:p>
-          <a:p>
-            <a:endParaRPr lang="en-US" dirty="0"/>
+            <a:endParaRPr lang="en-US"/>
           </a:p>
         </p:txBody>
       </p:sp>
       <p:pic>
         <p:nvPicPr>
-          <p:cNvPr id="5124" name="Picture 4">
-            <a:extLst>
-              <a:ext uri="{FF2B5EF4-FFF2-40B4-BE49-F238E27FC236}">
-                <a16:creationId xmlns:a16="http://schemas.microsoft.com/office/drawing/2014/main" id="{76F1259C-1609-4522-90DE-184DD407D24E}"/>
+          <p:cNvPr id="6" name="Picture 18">
+            <a:extLst>
+              <a:ext uri="{FF2B5EF4-FFF2-40B4-BE49-F238E27FC236}">
+                <a16:creationId xmlns:a16="http://schemas.microsoft.com/office/drawing/2014/main" id="{A96EAF16-1600-4FC1-90FA-918D1F710C88}"/>
               </a:ext>
             </a:extLst>
           </p:cNvPr>
@@ -6508,8 +6923,8 @@
         </p:blipFill>
         <p:spPr bwMode="auto">
           <a:xfrm>
-            <a:off x="121792" y="3045004"/>
-            <a:ext cx="3009900" cy="2514600"/>
+            <a:off x="7239702" y="637138"/>
+            <a:ext cx="7424155" cy="5374779"/>
           </a:xfrm>
           <a:prstGeom prst="rect">
             <a:avLst/>
@@ -6528,10 +6943,10 @@
       </p:pic>
       <p:pic>
         <p:nvPicPr>
-          <p:cNvPr id="5126" name="Picture 6">
-            <a:extLst>
-              <a:ext uri="{FF2B5EF4-FFF2-40B4-BE49-F238E27FC236}">
-                <a16:creationId xmlns:a16="http://schemas.microsoft.com/office/drawing/2014/main" id="{58D7640B-829E-4924-89FD-1D434C2B7CE7}"/>
+          <p:cNvPr id="12293" name="Picture 5">
+            <a:extLst>
+              <a:ext uri="{FF2B5EF4-FFF2-40B4-BE49-F238E27FC236}">
+                <a16:creationId xmlns:a16="http://schemas.microsoft.com/office/drawing/2014/main" id="{624A602B-D956-4490-A213-75702CAC1813}"/>
               </a:ext>
             </a:extLst>
           </p:cNvPr>
@@ -6555,8 +6970,8 @@
         </p:blipFill>
         <p:spPr bwMode="auto">
           <a:xfrm>
-            <a:off x="3131692" y="3045004"/>
-            <a:ext cx="3133725" cy="2514600"/>
+            <a:off x="546538" y="896335"/>
+            <a:ext cx="7066128" cy="5115582"/>
           </a:xfrm>
           <a:prstGeom prst="rect">
             <a:avLst/>
@@ -6573,151 +6988,10 @@
           </a:extLst>
         </p:spPr>
       </p:pic>
-      <p:pic>
-        <p:nvPicPr>
-          <p:cNvPr id="5128" name="Picture 8">
-            <a:extLst>
-              <a:ext uri="{FF2B5EF4-FFF2-40B4-BE49-F238E27FC236}">
-                <a16:creationId xmlns:a16="http://schemas.microsoft.com/office/drawing/2014/main" id="{2D6CDC52-042E-499C-98A0-5CED288F7ECA}"/>
-              </a:ext>
-            </a:extLst>
-          </p:cNvPr>
-          <p:cNvPicPr>
-            <a:picLocks noChangeAspect="1" noChangeArrowheads="1"/>
-          </p:cNvPicPr>
-          <p:nvPr/>
-        </p:nvPicPr>
-        <p:blipFill>
-          <a:blip r:embed="rId4">
-            <a:extLst>
-              <a:ext uri="{28A0092B-C50C-407E-A947-70E740481C1C}">
-                <a14:useLocalDpi xmlns:a14="http://schemas.microsoft.com/office/drawing/2010/main" val="0"/>
-              </a:ext>
-            </a:extLst>
-          </a:blip>
-          <a:srcRect/>
-          <a:stretch>
-            <a:fillRect/>
-          </a:stretch>
-        </p:blipFill>
-        <p:spPr bwMode="auto">
-          <a:xfrm>
-            <a:off x="6447675" y="3033713"/>
-            <a:ext cx="2933700" cy="2514600"/>
-          </a:xfrm>
-          <a:prstGeom prst="rect">
-            <a:avLst/>
-          </a:prstGeom>
-          <a:noFill/>
-          <a:extLst>
-            <a:ext uri="{909E8E84-426E-40DD-AFC4-6F175D3DCCD1}">
-              <a14:hiddenFill xmlns:a14="http://schemas.microsoft.com/office/drawing/2010/main">
-                <a:solidFill>
-                  <a:srgbClr val="FFFFFF"/>
-                </a:solidFill>
-              </a14:hiddenFill>
-            </a:ext>
-          </a:extLst>
-        </p:spPr>
-      </p:pic>
-      <p:pic>
-        <p:nvPicPr>
-          <p:cNvPr id="5130" name="Picture 10">
-            <a:extLst>
-              <a:ext uri="{FF2B5EF4-FFF2-40B4-BE49-F238E27FC236}">
-                <a16:creationId xmlns:a16="http://schemas.microsoft.com/office/drawing/2014/main" id="{DF029209-D00C-4BCB-A5F7-96CDA0A61E6B}"/>
-              </a:ext>
-            </a:extLst>
-          </p:cNvPr>
-          <p:cNvPicPr>
-            <a:picLocks noChangeAspect="1" noChangeArrowheads="1"/>
-          </p:cNvPicPr>
-          <p:nvPr/>
-        </p:nvPicPr>
-        <p:blipFill>
-          <a:blip r:embed="rId5">
-            <a:extLst>
-              <a:ext uri="{28A0092B-C50C-407E-A947-70E740481C1C}">
-                <a14:useLocalDpi xmlns:a14="http://schemas.microsoft.com/office/drawing/2010/main" val="0"/>
-              </a:ext>
-            </a:extLst>
-          </a:blip>
-          <a:srcRect/>
-          <a:stretch>
-            <a:fillRect/>
-          </a:stretch>
-        </p:blipFill>
-        <p:spPr bwMode="auto">
-          <a:xfrm>
-            <a:off x="3162300" y="5521683"/>
-            <a:ext cx="2933700" cy="2514600"/>
-          </a:xfrm>
-          <a:prstGeom prst="rect">
-            <a:avLst/>
-          </a:prstGeom>
-          <a:noFill/>
-          <a:extLst>
-            <a:ext uri="{909E8E84-426E-40DD-AFC4-6F175D3DCCD1}">
-              <a14:hiddenFill xmlns:a14="http://schemas.microsoft.com/office/drawing/2010/main">
-                <a:solidFill>
-                  <a:srgbClr val="FFFFFF"/>
-                </a:solidFill>
-              </a14:hiddenFill>
-            </a:ext>
-          </a:extLst>
-        </p:spPr>
-      </p:pic>
-      <p:pic>
-        <p:nvPicPr>
-          <p:cNvPr id="5132" name="Picture 12">
-            <a:extLst>
-              <a:ext uri="{FF2B5EF4-FFF2-40B4-BE49-F238E27FC236}">
-                <a16:creationId xmlns:a16="http://schemas.microsoft.com/office/drawing/2014/main" id="{FB265B74-F35B-43F4-90C8-443C507370EF}"/>
-              </a:ext>
-            </a:extLst>
-          </p:cNvPr>
-          <p:cNvPicPr>
-            <a:picLocks noChangeAspect="1" noChangeArrowheads="1"/>
-          </p:cNvPicPr>
-          <p:nvPr/>
-        </p:nvPicPr>
-        <p:blipFill>
-          <a:blip r:embed="rId6">
-            <a:extLst>
-              <a:ext uri="{28A0092B-C50C-407E-A947-70E740481C1C}">
-                <a14:useLocalDpi xmlns:a14="http://schemas.microsoft.com/office/drawing/2010/main" val="0"/>
-              </a:ext>
-            </a:extLst>
-          </a:blip>
-          <a:srcRect/>
-          <a:stretch>
-            <a:fillRect/>
-          </a:stretch>
-        </p:blipFill>
-        <p:spPr bwMode="auto">
-          <a:xfrm>
-            <a:off x="6265417" y="5547190"/>
-            <a:ext cx="2933700" cy="2514600"/>
-          </a:xfrm>
-          <a:prstGeom prst="rect">
-            <a:avLst/>
-          </a:prstGeom>
-          <a:noFill/>
-          <a:extLst>
-            <a:ext uri="{909E8E84-426E-40DD-AFC4-6F175D3DCCD1}">
-              <a14:hiddenFill xmlns:a14="http://schemas.microsoft.com/office/drawing/2010/main">
-                <a:solidFill>
-                  <a:srgbClr val="FFFFFF"/>
-                </a:solidFill>
-              </a14:hiddenFill>
-            </a:ext>
-          </a:extLst>
-        </p:spPr>
-      </p:pic>
     </p:spTree>
     <p:extLst>
       <p:ext uri="{BB962C8B-B14F-4D97-AF65-F5344CB8AC3E}">
-        <p14:creationId xmlns:p14="http://schemas.microsoft.com/office/powerpoint/2010/main" val="3905560700"/>
+        <p14:creationId xmlns:p14="http://schemas.microsoft.com/office/powerpoint/2010/main" val="3252842"/>
       </p:ext>
     </p:extLst>
   </p:cSld>
@@ -6749,7 +7023,7 @@
           <p:cNvPr id="2" name="Title 1">
             <a:extLst>
               <a:ext uri="{FF2B5EF4-FFF2-40B4-BE49-F238E27FC236}">
-                <a16:creationId xmlns:a16="http://schemas.microsoft.com/office/drawing/2014/main" id="{CEF76244-4DD3-4AB1-91C8-788D6A26752C}"/>
+                <a16:creationId xmlns:a16="http://schemas.microsoft.com/office/drawing/2014/main" id="{A491A83B-C4B1-42D1-A73B-0D0B984F1D66}"/>
               </a:ext>
             </a:extLst>
           </p:cNvPr>
@@ -6769,34 +7043,24 @@
           <a:p>
             <a:r>
               <a:rPr lang="en-US" dirty="0"/>
-              <a:t>Next, we move that forward in time. Did a little hyperparameter tuning and it’s better to use </a:t>
-            </a:r>
-            <a:r>
-              <a:rPr lang="en-US" dirty="0" err="1"/>
-              <a:t>stepsize</a:t>
-            </a:r>
-            <a:r>
-              <a:rPr lang="en-US" dirty="0"/>
-              <a:t> =4, and a few other things changed. </a:t>
+              <a:t>Looking at t=96, (8*12). It seems like its sort of picking up the big period, but not finding the small one at all, which is expected.  </a:t>
             </a:r>
           </a:p>
         </p:txBody>
       </p:sp>
       <p:pic>
         <p:nvPicPr>
-          <p:cNvPr id="6146" name="Picture 2">
-            <a:extLst>
-              <a:ext uri="{FF2B5EF4-FFF2-40B4-BE49-F238E27FC236}">
-                <a16:creationId xmlns:a16="http://schemas.microsoft.com/office/drawing/2014/main" id="{B7493E7D-28F7-439E-9FC6-F5506764D23D}"/>
+          <p:cNvPr id="4098" name="Picture 2">
+            <a:extLst>
+              <a:ext uri="{FF2B5EF4-FFF2-40B4-BE49-F238E27FC236}">
+                <a16:creationId xmlns:a16="http://schemas.microsoft.com/office/drawing/2014/main" id="{8A4A3F8E-719D-4CE0-8B83-67028E638253}"/>
               </a:ext>
             </a:extLst>
           </p:cNvPr>
           <p:cNvPicPr>
-            <a:picLocks noGrp="1" noChangeAspect="1" noChangeArrowheads="1"/>
+            <a:picLocks noChangeAspect="1" noChangeArrowheads="1"/>
           </p:cNvPicPr>
-          <p:nvPr>
-            <p:ph idx="1"/>
-          </p:nvPr>
+          <p:nvPr/>
         </p:nvPicPr>
         <p:blipFill>
           <a:blip r:embed="rId2">
@@ -6813,8 +7077,8 @@
         </p:blipFill>
         <p:spPr bwMode="auto">
           <a:xfrm>
-            <a:off x="752447" y="1935394"/>
-            <a:ext cx="3942844" cy="2669002"/>
+            <a:off x="416746" y="1801830"/>
+            <a:ext cx="2933700" cy="2514600"/>
           </a:xfrm>
           <a:prstGeom prst="rect">
             <a:avLst/>
@@ -6833,17 +7097,19 @@
       </p:pic>
       <p:pic>
         <p:nvPicPr>
-          <p:cNvPr id="6148" name="Picture 4">
-            <a:extLst>
-              <a:ext uri="{FF2B5EF4-FFF2-40B4-BE49-F238E27FC236}">
-                <a16:creationId xmlns:a16="http://schemas.microsoft.com/office/drawing/2014/main" id="{018C6E38-C36C-4985-BE4B-CE8CA45A2D2D}"/>
+          <p:cNvPr id="4100" name="Picture 4">
+            <a:extLst>
+              <a:ext uri="{FF2B5EF4-FFF2-40B4-BE49-F238E27FC236}">
+                <a16:creationId xmlns:a16="http://schemas.microsoft.com/office/drawing/2014/main" id="{1AA5F9CC-0C70-4933-A19E-96016F69F560}"/>
               </a:ext>
             </a:extLst>
           </p:cNvPr>
           <p:cNvPicPr>
-            <a:picLocks noChangeAspect="1" noChangeArrowheads="1"/>
+            <a:picLocks noGrp="1" noChangeAspect="1" noChangeArrowheads="1"/>
           </p:cNvPicPr>
-          <p:nvPr/>
+          <p:nvPr>
+            <p:ph idx="1"/>
+          </p:nvPr>
         </p:nvPicPr>
         <p:blipFill>
           <a:blip r:embed="rId3">
@@ -6860,8 +7126,8 @@
         </p:blipFill>
         <p:spPr bwMode="auto">
           <a:xfrm>
-            <a:off x="4598220" y="1935394"/>
-            <a:ext cx="4092297" cy="2770170"/>
+            <a:off x="357518" y="4286274"/>
+            <a:ext cx="3052156" cy="2616134"/>
           </a:xfrm>
           <a:prstGeom prst="rect">
             <a:avLst/>
@@ -6880,10 +7146,10 @@
       </p:pic>
       <p:pic>
         <p:nvPicPr>
-          <p:cNvPr id="6150" name="Picture 6">
-            <a:extLst>
-              <a:ext uri="{FF2B5EF4-FFF2-40B4-BE49-F238E27FC236}">
-                <a16:creationId xmlns:a16="http://schemas.microsoft.com/office/drawing/2014/main" id="{9B7FF119-B63A-46C2-AD0A-4BCB632811A3}"/>
+          <p:cNvPr id="8" name="Picture 18">
+            <a:extLst>
+              <a:ext uri="{FF2B5EF4-FFF2-40B4-BE49-F238E27FC236}">
+                <a16:creationId xmlns:a16="http://schemas.microsoft.com/office/drawing/2014/main" id="{69020F29-A072-4A50-BE2C-91ACEA832D6C}"/>
               </a:ext>
             </a:extLst>
           </p:cNvPr>
@@ -6907,8 +7173,8 @@
         </p:blipFill>
         <p:spPr bwMode="auto">
           <a:xfrm>
-            <a:off x="6096000" y="4746661"/>
-            <a:ext cx="5484527" cy="2204881"/>
+            <a:off x="7224625" y="2895624"/>
+            <a:ext cx="3657600" cy="2647950"/>
           </a:xfrm>
           <a:prstGeom prst="rect">
             <a:avLst/>
@@ -6925,10 +7191,104 @@
           </a:extLst>
         </p:spPr>
       </p:pic>
+      <p:pic>
+        <p:nvPicPr>
+          <p:cNvPr id="4106" name="Picture 10">
+            <a:extLst>
+              <a:ext uri="{FF2B5EF4-FFF2-40B4-BE49-F238E27FC236}">
+                <a16:creationId xmlns:a16="http://schemas.microsoft.com/office/drawing/2014/main" id="{021B5CB4-E2A9-4F3D-828E-ED9A86212D6C}"/>
+              </a:ext>
+            </a:extLst>
+          </p:cNvPr>
+          <p:cNvPicPr>
+            <a:picLocks noChangeAspect="1" noChangeArrowheads="1"/>
+          </p:cNvPicPr>
+          <p:nvPr/>
+        </p:nvPicPr>
+        <p:blipFill>
+          <a:blip r:embed="rId5">
+            <a:extLst>
+              <a:ext uri="{28A0092B-C50C-407E-A947-70E740481C1C}">
+                <a14:useLocalDpi xmlns:a14="http://schemas.microsoft.com/office/drawing/2010/main" val="0"/>
+              </a:ext>
+            </a:extLst>
+          </a:blip>
+          <a:srcRect/>
+          <a:stretch>
+            <a:fillRect/>
+          </a:stretch>
+        </p:blipFill>
+        <p:spPr bwMode="auto">
+          <a:xfrm>
+            <a:off x="3570911" y="1810202"/>
+            <a:ext cx="2933700" cy="2514600"/>
+          </a:xfrm>
+          <a:prstGeom prst="rect">
+            <a:avLst/>
+          </a:prstGeom>
+          <a:noFill/>
+          <a:extLst>
+            <a:ext uri="{909E8E84-426E-40DD-AFC4-6F175D3DCCD1}">
+              <a14:hiddenFill xmlns:a14="http://schemas.microsoft.com/office/drawing/2010/main">
+                <a:solidFill>
+                  <a:srgbClr val="FFFFFF"/>
+                </a:solidFill>
+              </a14:hiddenFill>
+            </a:ext>
+          </a:extLst>
+        </p:spPr>
+      </p:pic>
+      <p:pic>
+        <p:nvPicPr>
+          <p:cNvPr id="4108" name="Picture 12">
+            <a:extLst>
+              <a:ext uri="{FF2B5EF4-FFF2-40B4-BE49-F238E27FC236}">
+                <a16:creationId xmlns:a16="http://schemas.microsoft.com/office/drawing/2014/main" id="{B9162A4B-8F78-45B2-9494-A7CAF0E3DF57}"/>
+              </a:ext>
+            </a:extLst>
+          </p:cNvPr>
+          <p:cNvPicPr>
+            <a:picLocks noChangeAspect="1" noChangeArrowheads="1"/>
+          </p:cNvPicPr>
+          <p:nvPr/>
+        </p:nvPicPr>
+        <p:blipFill>
+          <a:blip r:embed="rId6">
+            <a:extLst>
+              <a:ext uri="{28A0092B-C50C-407E-A947-70E740481C1C}">
+                <a14:useLocalDpi xmlns:a14="http://schemas.microsoft.com/office/drawing/2010/main" val="0"/>
+              </a:ext>
+            </a:extLst>
+          </a:blip>
+          <a:srcRect/>
+          <a:stretch>
+            <a:fillRect/>
+          </a:stretch>
+        </p:blipFill>
+        <p:spPr bwMode="auto">
+          <a:xfrm>
+            <a:off x="3570911" y="4227304"/>
+            <a:ext cx="2933700" cy="2514600"/>
+          </a:xfrm>
+          <a:prstGeom prst="rect">
+            <a:avLst/>
+          </a:prstGeom>
+          <a:noFill/>
+          <a:extLst>
+            <a:ext uri="{909E8E84-426E-40DD-AFC4-6F175D3DCCD1}">
+              <a14:hiddenFill xmlns:a14="http://schemas.microsoft.com/office/drawing/2010/main">
+                <a:solidFill>
+                  <a:srgbClr val="FFFFFF"/>
+                </a:solidFill>
+              </a14:hiddenFill>
+            </a:ext>
+          </a:extLst>
+        </p:spPr>
+      </p:pic>
     </p:spTree>
     <p:extLst>
       <p:ext uri="{BB962C8B-B14F-4D97-AF65-F5344CB8AC3E}">
-        <p14:creationId xmlns:p14="http://schemas.microsoft.com/office/powerpoint/2010/main" val="3203391298"/>
+        <p14:creationId xmlns:p14="http://schemas.microsoft.com/office/powerpoint/2010/main" val="23506946"/>
       </p:ext>
     </p:extLst>
   </p:cSld>
@@ -6960,7 +7320,7 @@
           <p:cNvPr id="2" name="Title 1">
             <a:extLst>
               <a:ext uri="{FF2B5EF4-FFF2-40B4-BE49-F238E27FC236}">
-                <a16:creationId xmlns:a16="http://schemas.microsoft.com/office/drawing/2014/main" id="{A3663FB9-59D1-44F6-B04B-D3930D8C3EBF}"/>
+                <a16:creationId xmlns:a16="http://schemas.microsoft.com/office/drawing/2014/main" id="{0E607A78-1C20-4812-B53B-69C40F8455AE}"/>
               </a:ext>
             </a:extLst>
           </p:cNvPr>
@@ -6973,22 +7333,56 @@
         </p:nvSpPr>
         <p:spPr/>
         <p:txBody>
+          <a:bodyPr>
+            <a:noAutofit/>
+          </a:bodyPr>
+          <a:lstStyle/>
+          <a:p>
+            <a:r>
+              <a:rPr lang="en-US" sz="2000" dirty="0"/>
+              <a:t>One timestep is doing well on the main behavior, but not the multiscale part. Try using 2 timescales at once. </a:t>
+            </a:r>
+            <a:br>
+              <a:rPr lang="en-US" sz="2000" dirty="0"/>
+            </a:br>
+            <a:r>
+              <a:rPr lang="en-US" sz="2000" dirty="0"/>
+              <a:t>When training the encoded in time, if we consider 2 timescales at once, I am getting something weird. I don’t know if it is just a bug or something going wrong</a:t>
+            </a:r>
+          </a:p>
+        </p:txBody>
+      </p:sp>
+      <p:sp>
+        <p:nvSpPr>
+          <p:cNvPr id="3" name="Content Placeholder 2">
+            <a:extLst>
+              <a:ext uri="{FF2B5EF4-FFF2-40B4-BE49-F238E27FC236}">
+                <a16:creationId xmlns:a16="http://schemas.microsoft.com/office/drawing/2014/main" id="{D26D0018-2920-4DEF-A168-A3452F1F4016}"/>
+              </a:ext>
+            </a:extLst>
+          </p:cNvPr>
+          <p:cNvSpPr>
+            <a:spLocks noGrp="1"/>
+          </p:cNvSpPr>
+          <p:nvPr>
+            <p:ph idx="1"/>
+          </p:nvPr>
+        </p:nvSpPr>
+        <p:spPr/>
+        <p:txBody>
           <a:bodyPr/>
           <a:lstStyle/>
           <a:p>
-            <a:r>
-              <a:rPr lang="en-US" dirty="0"/>
-              <a:t>Decoded for t+2</a:t>
-            </a:r>
+            <a:endParaRPr lang="en-US" dirty="0"/>
           </a:p>
         </p:txBody>
       </p:sp>
       <p:pic>
         <p:nvPicPr>
-          <p:cNvPr id="4" name="Picture 2">
-            <a:extLst>
-              <a:ext uri="{FF2B5EF4-FFF2-40B4-BE49-F238E27FC236}">
-                <a16:creationId xmlns:a16="http://schemas.microsoft.com/office/drawing/2014/main" id="{26C72859-4451-4098-9D78-AD6DE343732E}"/>
+          <p:cNvPr id="9218" name="Picture 2">
+            <a:extLst>
+              <a:ext uri="{FF2B5EF4-FFF2-40B4-BE49-F238E27FC236}">
+                <a16:creationId xmlns:a16="http://schemas.microsoft.com/office/drawing/2014/main" id="{617517CC-8DCA-497D-A938-9928E41516EA}"/>
               </a:ext>
             </a:extLst>
           </p:cNvPr>
@@ -6998,7 +7392,7 @@
           <p:nvPr/>
         </p:nvPicPr>
         <p:blipFill>
-          <a:blip r:embed="rId2">
+          <a:blip r:embed="rId3">
             <a:extLst>
               <a:ext uri="{28A0092B-C50C-407E-A947-70E740481C1C}">
                 <a14:useLocalDpi xmlns:a14="http://schemas.microsoft.com/office/drawing/2010/main" val="0"/>
@@ -7012,8 +7406,8 @@
         </p:blipFill>
         <p:spPr bwMode="auto">
           <a:xfrm>
-            <a:off x="7200900" y="3663950"/>
-            <a:ext cx="3657600" cy="2647950"/>
+            <a:off x="4226821" y="2289102"/>
+            <a:ext cx="8351164" cy="3259998"/>
           </a:xfrm>
           <a:prstGeom prst="rect">
             <a:avLst/>
@@ -7032,10 +7426,10 @@
       </p:pic>
       <p:pic>
         <p:nvPicPr>
-          <p:cNvPr id="7174" name="Picture 6">
-            <a:extLst>
-              <a:ext uri="{FF2B5EF4-FFF2-40B4-BE49-F238E27FC236}">
-                <a16:creationId xmlns:a16="http://schemas.microsoft.com/office/drawing/2014/main" id="{340A3A5B-28D2-4F9B-BDF5-513BDFF55036}"/>
+          <p:cNvPr id="5" name="Picture 22">
+            <a:extLst>
+              <a:ext uri="{FF2B5EF4-FFF2-40B4-BE49-F238E27FC236}">
+                <a16:creationId xmlns:a16="http://schemas.microsoft.com/office/drawing/2014/main" id="{B639E04E-073E-461B-A14D-EAF1ED024DCF}"/>
               </a:ext>
             </a:extLst>
           </p:cNvPr>
@@ -7045,7 +7439,7 @@
           <p:nvPr/>
         </p:nvPicPr>
         <p:blipFill>
-          <a:blip r:embed="rId3">
+          <a:blip r:embed="rId4">
             <a:extLst>
               <a:ext uri="{28A0092B-C50C-407E-A947-70E740481C1C}">
                 <a14:useLocalDpi xmlns:a14="http://schemas.microsoft.com/office/drawing/2010/main" val="0"/>
@@ -7059,8 +7453,8 @@
         </p:blipFill>
         <p:spPr bwMode="auto">
           <a:xfrm>
-            <a:off x="622229" y="1882045"/>
-            <a:ext cx="2933700" cy="2514600"/>
+            <a:off x="336447" y="4145001"/>
+            <a:ext cx="3571875" cy="2400300"/>
           </a:xfrm>
           <a:prstGeom prst="rect">
             <a:avLst/>
@@ -7079,10 +7473,10 @@
       </p:pic>
       <p:pic>
         <p:nvPicPr>
-          <p:cNvPr id="7176" name="Picture 8">
-            <a:extLst>
-              <a:ext uri="{FF2B5EF4-FFF2-40B4-BE49-F238E27FC236}">
-                <a16:creationId xmlns:a16="http://schemas.microsoft.com/office/drawing/2014/main" id="{F82C0BEE-DDA4-469D-BE93-EC89C1FBDCB5}"/>
+          <p:cNvPr id="6" name="Picture 10">
+            <a:extLst>
+              <a:ext uri="{FF2B5EF4-FFF2-40B4-BE49-F238E27FC236}">
+                <a16:creationId xmlns:a16="http://schemas.microsoft.com/office/drawing/2014/main" id="{B261CC51-A0A3-4520-B971-B5F9191B6898}"/>
               </a:ext>
             </a:extLst>
           </p:cNvPr>
@@ -7092,7 +7486,7 @@
           <p:nvPr/>
         </p:nvPicPr>
         <p:blipFill>
-          <a:blip r:embed="rId4">
+          <a:blip r:embed="rId5">
             <a:extLst>
               <a:ext uri="{28A0092B-C50C-407E-A947-70E740481C1C}">
                 <a14:useLocalDpi xmlns:a14="http://schemas.microsoft.com/office/drawing/2010/main" val="0"/>
@@ -7106,8 +7500,8 @@
         </p:blipFill>
         <p:spPr bwMode="auto">
           <a:xfrm>
-            <a:off x="3771900" y="1825625"/>
-            <a:ext cx="2933700" cy="2514600"/>
+            <a:off x="336447" y="1825625"/>
+            <a:ext cx="3571875" cy="2514600"/>
           </a:xfrm>
           <a:prstGeom prst="rect">
             <a:avLst/>
@@ -7127,13 +7521,18 @@
     </p:spTree>
     <p:extLst>
       <p:ext uri="{BB962C8B-B14F-4D97-AF65-F5344CB8AC3E}">
-        <p14:creationId xmlns:p14="http://schemas.microsoft.com/office/powerpoint/2010/main" val="2199757748"/>
+        <p14:creationId xmlns:p14="http://schemas.microsoft.com/office/powerpoint/2010/main" val="4163866707"/>
       </p:ext>
     </p:extLst>
   </p:cSld>
   <p:clrMapOvr>
     <a:masterClrMapping/>
   </p:clrMapOvr>
+  <p:extLst>
+    <p:ext uri="{6950BFC3-D8DA-4A85-94F7-54DA5524770B}">
+      <p188:commentRel xmlns:p188="http://schemas.microsoft.com/office/powerpoint/2018/8/main" r:id="rId2"/>
+    </p:ext>
+  </p:extLst>
 </p:sld>
 </file>
 
@@ -7289,7 +7688,7 @@
           <p:cNvPr id="2" name="Title 1">
             <a:extLst>
               <a:ext uri="{FF2B5EF4-FFF2-40B4-BE49-F238E27FC236}">
-                <a16:creationId xmlns:a16="http://schemas.microsoft.com/office/drawing/2014/main" id="{5039ADC5-BC38-4D4B-B1F3-7AD130829C0E}"/>
+                <a16:creationId xmlns:a16="http://schemas.microsoft.com/office/drawing/2014/main" id="{CEF76244-4DD3-4AB1-91C8-788D6A26752C}"/>
               </a:ext>
             </a:extLst>
           </p:cNvPr>
@@ -7309,30 +7708,54 @@
           <a:p>
             <a:r>
               <a:rPr lang="en-US" dirty="0"/>
-              <a:t>Largest error is at t=86, and it’s really bad there. I am confused why the </a:t>
-            </a:r>
-            <a:r>
-              <a:rPr lang="en-US" dirty="0" err="1"/>
-              <a:t>ossilcations</a:t>
-            </a:r>
+              <a:t>Doing the next step. First train a widening layer so we go from output of first step to truth </a:t>
+            </a:r>
+          </a:p>
+        </p:txBody>
+      </p:sp>
+      <p:sp>
+        <p:nvSpPr>
+          <p:cNvPr id="3" name="Content Placeholder 2">
+            <a:extLst>
+              <a:ext uri="{FF2B5EF4-FFF2-40B4-BE49-F238E27FC236}">
+                <a16:creationId xmlns:a16="http://schemas.microsoft.com/office/drawing/2014/main" id="{CA3EE5CC-0B59-4ECC-8F68-A61C532B7396}"/>
+              </a:ext>
+            </a:extLst>
+          </p:cNvPr>
+          <p:cNvSpPr>
+            <a:spLocks noGrp="1"/>
+          </p:cNvSpPr>
+          <p:nvPr>
+            <p:ph idx="1"/>
+          </p:nvPr>
+        </p:nvSpPr>
+        <p:spPr/>
+        <p:txBody>
+          <a:bodyPr/>
+          <a:lstStyle/>
+          <a:p>
             <a:r>
               <a:rPr lang="en-US" dirty="0"/>
-              <a:t> on the error are getting less, and </a:t>
-            </a:r>
-            <a:r>
-              <a:rPr lang="en-US"/>
-              <a:t>why are they so big here.</a:t>
-            </a:r>
+              <a:t>For training used t+1 of all 500 samples, and all 100 for validation. </a:t>
+            </a:r>
+          </a:p>
+          <a:p>
+            <a:r>
+              <a:rPr lang="en-US" dirty="0"/>
+              <a:t>There is a mask at the threshold, and that’s why a lot of the encoded is 0</a:t>
+            </a:r>
+          </a:p>
+          <a:p>
             <a:endParaRPr lang="en-US" dirty="0"/>
           </a:p>
         </p:txBody>
       </p:sp>
       <p:pic>
         <p:nvPicPr>
-          <p:cNvPr id="4" name="Picture 2">
-            <a:extLst>
-              <a:ext uri="{FF2B5EF4-FFF2-40B4-BE49-F238E27FC236}">
-                <a16:creationId xmlns:a16="http://schemas.microsoft.com/office/drawing/2014/main" id="{BA229336-18D6-42A8-B1F2-C9425C0CEF86}"/>
+          <p:cNvPr id="5124" name="Picture 4">
+            <a:extLst>
+              <a:ext uri="{FF2B5EF4-FFF2-40B4-BE49-F238E27FC236}">
+                <a16:creationId xmlns:a16="http://schemas.microsoft.com/office/drawing/2014/main" id="{76F1259C-1609-4522-90DE-184DD407D24E}"/>
               </a:ext>
             </a:extLst>
           </p:cNvPr>
@@ -7356,8 +7779,8 @@
         </p:blipFill>
         <p:spPr bwMode="auto">
           <a:xfrm>
-            <a:off x="7200900" y="4210050"/>
-            <a:ext cx="3657600" cy="2647950"/>
+            <a:off x="2266950" y="2897653"/>
+            <a:ext cx="3009900" cy="2514600"/>
           </a:xfrm>
           <a:prstGeom prst="rect">
             <a:avLst/>
@@ -7376,19 +7799,17 @@
       </p:pic>
       <p:pic>
         <p:nvPicPr>
-          <p:cNvPr id="8194" name="Picture 2">
-            <a:extLst>
-              <a:ext uri="{FF2B5EF4-FFF2-40B4-BE49-F238E27FC236}">
-                <a16:creationId xmlns:a16="http://schemas.microsoft.com/office/drawing/2014/main" id="{B40095F7-EFF4-4193-BAAF-998E9FCFF399}"/>
+          <p:cNvPr id="5126" name="Picture 6">
+            <a:extLst>
+              <a:ext uri="{FF2B5EF4-FFF2-40B4-BE49-F238E27FC236}">
+                <a16:creationId xmlns:a16="http://schemas.microsoft.com/office/drawing/2014/main" id="{58D7640B-829E-4924-89FD-1D434C2B7CE7}"/>
               </a:ext>
             </a:extLst>
           </p:cNvPr>
           <p:cNvPicPr>
-            <a:picLocks noGrp="1" noChangeAspect="1" noChangeArrowheads="1"/>
+            <a:picLocks noChangeAspect="1" noChangeArrowheads="1"/>
           </p:cNvPicPr>
-          <p:nvPr>
-            <p:ph idx="1"/>
-          </p:nvPr>
+          <p:nvPr/>
         </p:nvPicPr>
         <p:blipFill>
           <a:blip r:embed="rId3">
@@ -7405,8 +7826,8 @@
         </p:blipFill>
         <p:spPr bwMode="auto">
           <a:xfrm>
-            <a:off x="495078" y="1599310"/>
-            <a:ext cx="3467212" cy="2833882"/>
+            <a:off x="5276850" y="2897653"/>
+            <a:ext cx="3133725" cy="2514600"/>
           </a:xfrm>
           <a:prstGeom prst="rect">
             <a:avLst/>
@@ -7425,10 +7846,10 @@
       </p:pic>
       <p:pic>
         <p:nvPicPr>
-          <p:cNvPr id="8196" name="Picture 4">
-            <a:extLst>
-              <a:ext uri="{FF2B5EF4-FFF2-40B4-BE49-F238E27FC236}">
-                <a16:creationId xmlns:a16="http://schemas.microsoft.com/office/drawing/2014/main" id="{F4089EAB-E71B-416D-92DA-4FB6AD5F0025}"/>
+          <p:cNvPr id="5128" name="Picture 8">
+            <a:extLst>
+              <a:ext uri="{FF2B5EF4-FFF2-40B4-BE49-F238E27FC236}">
+                <a16:creationId xmlns:a16="http://schemas.microsoft.com/office/drawing/2014/main" id="{2D6CDC52-042E-499C-98A0-5CED288F7ECA}"/>
               </a:ext>
             </a:extLst>
           </p:cNvPr>
@@ -7452,7 +7873,7 @@
         </p:blipFill>
         <p:spPr bwMode="auto">
           <a:xfrm>
-            <a:off x="4095639" y="1690688"/>
+            <a:off x="8421011" y="2897653"/>
             <a:ext cx="2933700" cy="2514600"/>
           </a:xfrm>
           <a:prstGeom prst="rect">
@@ -7472,10 +7893,10 @@
       </p:pic>
       <p:pic>
         <p:nvPicPr>
-          <p:cNvPr id="8198" name="Picture 6">
-            <a:extLst>
-              <a:ext uri="{FF2B5EF4-FFF2-40B4-BE49-F238E27FC236}">
-                <a16:creationId xmlns:a16="http://schemas.microsoft.com/office/drawing/2014/main" id="{AE3C73DD-EB52-4415-9C4E-89DA89222A5C}"/>
+          <p:cNvPr id="5130" name="Picture 10">
+            <a:extLst>
+              <a:ext uri="{FF2B5EF4-FFF2-40B4-BE49-F238E27FC236}">
+                <a16:creationId xmlns:a16="http://schemas.microsoft.com/office/drawing/2014/main" id="{DF029209-D00C-4BCB-A5F7-96CDA0A61E6B}"/>
               </a:ext>
             </a:extLst>
           </p:cNvPr>
@@ -7499,7 +7920,7 @@
         </p:blipFill>
         <p:spPr bwMode="auto">
           <a:xfrm>
-            <a:off x="7200900" y="1690688"/>
+            <a:off x="-672207" y="2897653"/>
             <a:ext cx="2933700" cy="2514600"/>
           </a:xfrm>
           <a:prstGeom prst="rect">
@@ -7517,10 +7938,1947 @@
           </a:extLst>
         </p:spPr>
       </p:pic>
+      <p:pic>
+        <p:nvPicPr>
+          <p:cNvPr id="5132" name="Picture 12">
+            <a:extLst>
+              <a:ext uri="{FF2B5EF4-FFF2-40B4-BE49-F238E27FC236}">
+                <a16:creationId xmlns:a16="http://schemas.microsoft.com/office/drawing/2014/main" id="{FB265B74-F35B-43F4-90C8-443C507370EF}"/>
+              </a:ext>
+            </a:extLst>
+          </p:cNvPr>
+          <p:cNvPicPr>
+            <a:picLocks noChangeAspect="1" noChangeArrowheads="1"/>
+          </p:cNvPicPr>
+          <p:nvPr/>
+        </p:nvPicPr>
+        <p:blipFill>
+          <a:blip r:embed="rId6">
+            <a:extLst>
+              <a:ext uri="{28A0092B-C50C-407E-A947-70E740481C1C}">
+                <a14:useLocalDpi xmlns:a14="http://schemas.microsoft.com/office/drawing/2010/main" val="0"/>
+              </a:ext>
+            </a:extLst>
+          </a:blip>
+          <a:srcRect/>
+          <a:stretch>
+            <a:fillRect/>
+          </a:stretch>
+        </p:blipFill>
+        <p:spPr bwMode="auto">
+          <a:xfrm>
+            <a:off x="8520112" y="5302018"/>
+            <a:ext cx="2933700" cy="2514600"/>
+          </a:xfrm>
+          <a:prstGeom prst="rect">
+            <a:avLst/>
+          </a:prstGeom>
+          <a:noFill/>
+          <a:extLst>
+            <a:ext uri="{909E8E84-426E-40DD-AFC4-6F175D3DCCD1}">
+              <a14:hiddenFill xmlns:a14="http://schemas.microsoft.com/office/drawing/2010/main">
+                <a:solidFill>
+                  <a:srgbClr val="FFFFFF"/>
+                </a:solidFill>
+              </a14:hiddenFill>
+            </a:ext>
+          </a:extLst>
+        </p:spPr>
+      </p:pic>
+    </p:spTree>
+    <p:extLst>
+      <p:ext uri="{BB962C8B-B14F-4D97-AF65-F5344CB8AC3E}">
+        <p14:creationId xmlns:p14="http://schemas.microsoft.com/office/powerpoint/2010/main" val="3905560700"/>
+      </p:ext>
+    </p:extLst>
+  </p:cSld>
+  <p:clrMapOvr>
+    <a:masterClrMapping/>
+  </p:clrMapOvr>
+</p:sld>
+</file>
+
+<file path=ppt/slides/slide21.xml><?xml version="1.0" encoding="utf-8"?>
+<p:sld xmlns:a="http://schemas.openxmlformats.org/drawingml/2006/main" xmlns:r="http://schemas.openxmlformats.org/officeDocument/2006/relationships" xmlns:p="http://schemas.openxmlformats.org/presentationml/2006/main">
+  <p:cSld>
+    <p:spTree>
+      <p:nvGrpSpPr>
+        <p:cNvPr id="1" name=""/>
+        <p:cNvGrpSpPr/>
+        <p:nvPr/>
+      </p:nvGrpSpPr>
+      <p:grpSpPr>
+        <a:xfrm>
+          <a:off x="0" y="0"/>
+          <a:ext cx="0" cy="0"/>
+          <a:chOff x="0" y="0"/>
+          <a:chExt cx="0" cy="0"/>
+        </a:xfrm>
+      </p:grpSpPr>
+      <p:sp>
+        <p:nvSpPr>
+          <p:cNvPr id="2" name="Title 1">
+            <a:extLst>
+              <a:ext uri="{FF2B5EF4-FFF2-40B4-BE49-F238E27FC236}">
+                <a16:creationId xmlns:a16="http://schemas.microsoft.com/office/drawing/2014/main" id="{CEF76244-4DD3-4AB1-91C8-788D6A26752C}"/>
+              </a:ext>
+            </a:extLst>
+          </p:cNvPr>
+          <p:cNvSpPr>
+            <a:spLocks noGrp="1"/>
+          </p:cNvSpPr>
+          <p:nvPr>
+            <p:ph type="title"/>
+          </p:nvPr>
+        </p:nvSpPr>
+        <p:spPr/>
+        <p:txBody>
+          <a:bodyPr>
+            <a:normAutofit fontScale="90000"/>
+          </a:bodyPr>
+          <a:lstStyle/>
+          <a:p>
+            <a:r>
+              <a:rPr lang="en-US" dirty="0"/>
+              <a:t>Next, we move that forward in time. Did a little hyperparameter tuning and it’s better to use </a:t>
+            </a:r>
+            <a:r>
+              <a:rPr lang="en-US" dirty="0" err="1"/>
+              <a:t>stepsize</a:t>
+            </a:r>
+            <a:r>
+              <a:rPr lang="en-US" dirty="0"/>
+              <a:t> =4, and a few other things changed. </a:t>
+            </a:r>
+          </a:p>
+        </p:txBody>
+      </p:sp>
+      <p:pic>
+        <p:nvPicPr>
+          <p:cNvPr id="6146" name="Picture 2">
+            <a:extLst>
+              <a:ext uri="{FF2B5EF4-FFF2-40B4-BE49-F238E27FC236}">
+                <a16:creationId xmlns:a16="http://schemas.microsoft.com/office/drawing/2014/main" id="{B7493E7D-28F7-439E-9FC6-F5506764D23D}"/>
+              </a:ext>
+            </a:extLst>
+          </p:cNvPr>
+          <p:cNvPicPr>
+            <a:picLocks noGrp="1" noChangeAspect="1" noChangeArrowheads="1"/>
+          </p:cNvPicPr>
+          <p:nvPr>
+            <p:ph idx="1"/>
+          </p:nvPr>
+        </p:nvPicPr>
+        <p:blipFill>
+          <a:blip r:embed="rId2">
+            <a:extLst>
+              <a:ext uri="{28A0092B-C50C-407E-A947-70E740481C1C}">
+                <a14:useLocalDpi xmlns:a14="http://schemas.microsoft.com/office/drawing/2010/main" val="0"/>
+              </a:ext>
+            </a:extLst>
+          </a:blip>
+          <a:srcRect/>
+          <a:stretch>
+            <a:fillRect/>
+          </a:stretch>
+        </p:blipFill>
+        <p:spPr bwMode="auto">
+          <a:xfrm>
+            <a:off x="752447" y="1935394"/>
+            <a:ext cx="3942844" cy="2669002"/>
+          </a:xfrm>
+          <a:prstGeom prst="rect">
+            <a:avLst/>
+          </a:prstGeom>
+          <a:noFill/>
+          <a:extLst>
+            <a:ext uri="{909E8E84-426E-40DD-AFC4-6F175D3DCCD1}">
+              <a14:hiddenFill xmlns:a14="http://schemas.microsoft.com/office/drawing/2010/main">
+                <a:solidFill>
+                  <a:srgbClr val="FFFFFF"/>
+                </a:solidFill>
+              </a14:hiddenFill>
+            </a:ext>
+          </a:extLst>
+        </p:spPr>
+      </p:pic>
+      <p:pic>
+        <p:nvPicPr>
+          <p:cNvPr id="6148" name="Picture 4">
+            <a:extLst>
+              <a:ext uri="{FF2B5EF4-FFF2-40B4-BE49-F238E27FC236}">
+                <a16:creationId xmlns:a16="http://schemas.microsoft.com/office/drawing/2014/main" id="{018C6E38-C36C-4985-BE4B-CE8CA45A2D2D}"/>
+              </a:ext>
+            </a:extLst>
+          </p:cNvPr>
+          <p:cNvPicPr>
+            <a:picLocks noChangeAspect="1" noChangeArrowheads="1"/>
+          </p:cNvPicPr>
+          <p:nvPr/>
+        </p:nvPicPr>
+        <p:blipFill>
+          <a:blip r:embed="rId3">
+            <a:extLst>
+              <a:ext uri="{28A0092B-C50C-407E-A947-70E740481C1C}">
+                <a14:useLocalDpi xmlns:a14="http://schemas.microsoft.com/office/drawing/2010/main" val="0"/>
+              </a:ext>
+            </a:extLst>
+          </a:blip>
+          <a:srcRect/>
+          <a:stretch>
+            <a:fillRect/>
+          </a:stretch>
+        </p:blipFill>
+        <p:spPr bwMode="auto">
+          <a:xfrm>
+            <a:off x="4598220" y="1935394"/>
+            <a:ext cx="4092297" cy="2770170"/>
+          </a:xfrm>
+          <a:prstGeom prst="rect">
+            <a:avLst/>
+          </a:prstGeom>
+          <a:noFill/>
+          <a:extLst>
+            <a:ext uri="{909E8E84-426E-40DD-AFC4-6F175D3DCCD1}">
+              <a14:hiddenFill xmlns:a14="http://schemas.microsoft.com/office/drawing/2010/main">
+                <a:solidFill>
+                  <a:srgbClr val="FFFFFF"/>
+                </a:solidFill>
+              </a14:hiddenFill>
+            </a:ext>
+          </a:extLst>
+        </p:spPr>
+      </p:pic>
+      <p:pic>
+        <p:nvPicPr>
+          <p:cNvPr id="6150" name="Picture 6">
+            <a:extLst>
+              <a:ext uri="{FF2B5EF4-FFF2-40B4-BE49-F238E27FC236}">
+                <a16:creationId xmlns:a16="http://schemas.microsoft.com/office/drawing/2014/main" id="{9B7FF119-B63A-46C2-AD0A-4BCB632811A3}"/>
+              </a:ext>
+            </a:extLst>
+          </p:cNvPr>
+          <p:cNvPicPr>
+            <a:picLocks noChangeAspect="1" noChangeArrowheads="1"/>
+          </p:cNvPicPr>
+          <p:nvPr/>
+        </p:nvPicPr>
+        <p:blipFill>
+          <a:blip r:embed="rId4">
+            <a:extLst>
+              <a:ext uri="{28A0092B-C50C-407E-A947-70E740481C1C}">
+                <a14:useLocalDpi xmlns:a14="http://schemas.microsoft.com/office/drawing/2010/main" val="0"/>
+              </a:ext>
+            </a:extLst>
+          </a:blip>
+          <a:srcRect/>
+          <a:stretch>
+            <a:fillRect/>
+          </a:stretch>
+        </p:blipFill>
+        <p:spPr bwMode="auto">
+          <a:xfrm>
+            <a:off x="6096000" y="4746661"/>
+            <a:ext cx="5484527" cy="2204881"/>
+          </a:xfrm>
+          <a:prstGeom prst="rect">
+            <a:avLst/>
+          </a:prstGeom>
+          <a:noFill/>
+          <a:extLst>
+            <a:ext uri="{909E8E84-426E-40DD-AFC4-6F175D3DCCD1}">
+              <a14:hiddenFill xmlns:a14="http://schemas.microsoft.com/office/drawing/2010/main">
+                <a:solidFill>
+                  <a:srgbClr val="FFFFFF"/>
+                </a:solidFill>
+              </a14:hiddenFill>
+            </a:ext>
+          </a:extLst>
+        </p:spPr>
+      </p:pic>
+    </p:spTree>
+    <p:extLst>
+      <p:ext uri="{BB962C8B-B14F-4D97-AF65-F5344CB8AC3E}">
+        <p14:creationId xmlns:p14="http://schemas.microsoft.com/office/powerpoint/2010/main" val="3203391298"/>
+      </p:ext>
+    </p:extLst>
+  </p:cSld>
+  <p:clrMapOvr>
+    <a:masterClrMapping/>
+  </p:clrMapOvr>
+</p:sld>
+</file>
+
+<file path=ppt/slides/slide22.xml><?xml version="1.0" encoding="utf-8"?>
+<p:sld xmlns:a="http://schemas.openxmlformats.org/drawingml/2006/main" xmlns:r="http://schemas.openxmlformats.org/officeDocument/2006/relationships" xmlns:p="http://schemas.openxmlformats.org/presentationml/2006/main">
+  <p:cSld>
+    <p:spTree>
+      <p:nvGrpSpPr>
+        <p:cNvPr id="1" name=""/>
+        <p:cNvGrpSpPr/>
+        <p:nvPr/>
+      </p:nvGrpSpPr>
+      <p:grpSpPr>
+        <a:xfrm>
+          <a:off x="0" y="0"/>
+          <a:ext cx="0" cy="0"/>
+          <a:chOff x="0" y="0"/>
+          <a:chExt cx="0" cy="0"/>
+        </a:xfrm>
+      </p:grpSpPr>
+      <p:sp>
+        <p:nvSpPr>
+          <p:cNvPr id="2" name="Title 1">
+            <a:extLst>
+              <a:ext uri="{FF2B5EF4-FFF2-40B4-BE49-F238E27FC236}">
+                <a16:creationId xmlns:a16="http://schemas.microsoft.com/office/drawing/2014/main" id="{A3663FB9-59D1-44F6-B04B-D3930D8C3EBF}"/>
+              </a:ext>
+            </a:extLst>
+          </p:cNvPr>
+          <p:cNvSpPr>
+            <a:spLocks noGrp="1"/>
+          </p:cNvSpPr>
+          <p:nvPr>
+            <p:ph type="title"/>
+          </p:nvPr>
+        </p:nvSpPr>
+        <p:spPr/>
+        <p:txBody>
+          <a:bodyPr/>
+          <a:lstStyle/>
+          <a:p>
+            <a:r>
+              <a:rPr lang="en-US" dirty="0"/>
+              <a:t>Decoded for t+2</a:t>
+            </a:r>
+          </a:p>
+        </p:txBody>
+      </p:sp>
+      <p:pic>
+        <p:nvPicPr>
+          <p:cNvPr id="4" name="Picture 2">
+            <a:extLst>
+              <a:ext uri="{FF2B5EF4-FFF2-40B4-BE49-F238E27FC236}">
+                <a16:creationId xmlns:a16="http://schemas.microsoft.com/office/drawing/2014/main" id="{26C72859-4451-4098-9D78-AD6DE343732E}"/>
+              </a:ext>
+            </a:extLst>
+          </p:cNvPr>
+          <p:cNvPicPr>
+            <a:picLocks noChangeAspect="1" noChangeArrowheads="1"/>
+          </p:cNvPicPr>
+          <p:nvPr/>
+        </p:nvPicPr>
+        <p:blipFill>
+          <a:blip r:embed="rId3">
+            <a:extLst>
+              <a:ext uri="{28A0092B-C50C-407E-A947-70E740481C1C}">
+                <a14:useLocalDpi xmlns:a14="http://schemas.microsoft.com/office/drawing/2010/main" val="0"/>
+              </a:ext>
+            </a:extLst>
+          </a:blip>
+          <a:srcRect/>
+          <a:stretch>
+            <a:fillRect/>
+          </a:stretch>
+        </p:blipFill>
+        <p:spPr bwMode="auto">
+          <a:xfrm>
+            <a:off x="7200900" y="3663950"/>
+            <a:ext cx="3657600" cy="2647950"/>
+          </a:xfrm>
+          <a:prstGeom prst="rect">
+            <a:avLst/>
+          </a:prstGeom>
+          <a:noFill/>
+          <a:extLst>
+            <a:ext uri="{909E8E84-426E-40DD-AFC4-6F175D3DCCD1}">
+              <a14:hiddenFill xmlns:a14="http://schemas.microsoft.com/office/drawing/2010/main">
+                <a:solidFill>
+                  <a:srgbClr val="FFFFFF"/>
+                </a:solidFill>
+              </a14:hiddenFill>
+            </a:ext>
+          </a:extLst>
+        </p:spPr>
+      </p:pic>
+      <p:pic>
+        <p:nvPicPr>
+          <p:cNvPr id="7174" name="Picture 6">
+            <a:extLst>
+              <a:ext uri="{FF2B5EF4-FFF2-40B4-BE49-F238E27FC236}">
+                <a16:creationId xmlns:a16="http://schemas.microsoft.com/office/drawing/2014/main" id="{340A3A5B-28D2-4F9B-BDF5-513BDFF55036}"/>
+              </a:ext>
+            </a:extLst>
+          </p:cNvPr>
+          <p:cNvPicPr>
+            <a:picLocks noChangeAspect="1" noChangeArrowheads="1"/>
+          </p:cNvPicPr>
+          <p:nvPr/>
+        </p:nvPicPr>
+        <p:blipFill>
+          <a:blip r:embed="rId4">
+            <a:extLst>
+              <a:ext uri="{28A0092B-C50C-407E-A947-70E740481C1C}">
+                <a14:useLocalDpi xmlns:a14="http://schemas.microsoft.com/office/drawing/2010/main" val="0"/>
+              </a:ext>
+            </a:extLst>
+          </a:blip>
+          <a:srcRect/>
+          <a:stretch>
+            <a:fillRect/>
+          </a:stretch>
+        </p:blipFill>
+        <p:spPr bwMode="auto">
+          <a:xfrm>
+            <a:off x="622229" y="1882045"/>
+            <a:ext cx="2933700" cy="2514600"/>
+          </a:xfrm>
+          <a:prstGeom prst="rect">
+            <a:avLst/>
+          </a:prstGeom>
+          <a:noFill/>
+          <a:extLst>
+            <a:ext uri="{909E8E84-426E-40DD-AFC4-6F175D3DCCD1}">
+              <a14:hiddenFill xmlns:a14="http://schemas.microsoft.com/office/drawing/2010/main">
+                <a:solidFill>
+                  <a:srgbClr val="FFFFFF"/>
+                </a:solidFill>
+              </a14:hiddenFill>
+            </a:ext>
+          </a:extLst>
+        </p:spPr>
+      </p:pic>
+      <p:pic>
+        <p:nvPicPr>
+          <p:cNvPr id="7176" name="Picture 8">
+            <a:extLst>
+              <a:ext uri="{FF2B5EF4-FFF2-40B4-BE49-F238E27FC236}">
+                <a16:creationId xmlns:a16="http://schemas.microsoft.com/office/drawing/2014/main" id="{F82C0BEE-DDA4-469D-BE93-EC89C1FBDCB5}"/>
+              </a:ext>
+            </a:extLst>
+          </p:cNvPr>
+          <p:cNvPicPr>
+            <a:picLocks noChangeAspect="1" noChangeArrowheads="1"/>
+          </p:cNvPicPr>
+          <p:nvPr/>
+        </p:nvPicPr>
+        <p:blipFill>
+          <a:blip r:embed="rId5">
+            <a:extLst>
+              <a:ext uri="{28A0092B-C50C-407E-A947-70E740481C1C}">
+                <a14:useLocalDpi xmlns:a14="http://schemas.microsoft.com/office/drawing/2010/main" val="0"/>
+              </a:ext>
+            </a:extLst>
+          </a:blip>
+          <a:srcRect/>
+          <a:stretch>
+            <a:fillRect/>
+          </a:stretch>
+        </p:blipFill>
+        <p:spPr bwMode="auto">
+          <a:xfrm>
+            <a:off x="3771900" y="1825625"/>
+            <a:ext cx="2933700" cy="2514600"/>
+          </a:xfrm>
+          <a:prstGeom prst="rect">
+            <a:avLst/>
+          </a:prstGeom>
+          <a:noFill/>
+          <a:extLst>
+            <a:ext uri="{909E8E84-426E-40DD-AFC4-6F175D3DCCD1}">
+              <a14:hiddenFill xmlns:a14="http://schemas.microsoft.com/office/drawing/2010/main">
+                <a:solidFill>
+                  <a:srgbClr val="FFFFFF"/>
+                </a:solidFill>
+              </a14:hiddenFill>
+            </a:ext>
+          </a:extLst>
+        </p:spPr>
+      </p:pic>
+    </p:spTree>
+    <p:extLst>
+      <p:ext uri="{BB962C8B-B14F-4D97-AF65-F5344CB8AC3E}">
+        <p14:creationId xmlns:p14="http://schemas.microsoft.com/office/powerpoint/2010/main" val="2199757748"/>
+      </p:ext>
+    </p:extLst>
+  </p:cSld>
+  <p:clrMapOvr>
+    <a:masterClrMapping/>
+  </p:clrMapOvr>
+  <p:extLst>
+    <p:ext uri="{6950BFC3-D8DA-4A85-94F7-54DA5524770B}">
+      <p188:commentRel xmlns:p188="http://schemas.microsoft.com/office/powerpoint/2018/8/main" r:id="rId2"/>
+    </p:ext>
+  </p:extLst>
+</p:sld>
+</file>
+
+<file path=ppt/slides/slide23.xml><?xml version="1.0" encoding="utf-8"?>
+<p:sld xmlns:a="http://schemas.openxmlformats.org/drawingml/2006/main" xmlns:r="http://schemas.openxmlformats.org/officeDocument/2006/relationships" xmlns:p="http://schemas.openxmlformats.org/presentationml/2006/main">
+  <p:cSld>
+    <p:spTree>
+      <p:nvGrpSpPr>
+        <p:cNvPr id="1" name=""/>
+        <p:cNvGrpSpPr/>
+        <p:nvPr/>
+      </p:nvGrpSpPr>
+      <p:grpSpPr>
+        <a:xfrm>
+          <a:off x="0" y="0"/>
+          <a:ext cx="0" cy="0"/>
+          <a:chOff x="0" y="0"/>
+          <a:chExt cx="0" cy="0"/>
+        </a:xfrm>
+      </p:grpSpPr>
+      <p:sp>
+        <p:nvSpPr>
+          <p:cNvPr id="2" name="Title 1">
+            <a:extLst>
+              <a:ext uri="{FF2B5EF4-FFF2-40B4-BE49-F238E27FC236}">
+                <a16:creationId xmlns:a16="http://schemas.microsoft.com/office/drawing/2014/main" id="{5039ADC5-BC38-4D4B-B1F3-7AD130829C0E}"/>
+              </a:ext>
+            </a:extLst>
+          </p:cNvPr>
+          <p:cNvSpPr>
+            <a:spLocks noGrp="1"/>
+          </p:cNvSpPr>
+          <p:nvPr>
+            <p:ph type="title"/>
+          </p:nvPr>
+        </p:nvSpPr>
+        <p:spPr/>
+        <p:txBody>
+          <a:bodyPr>
+            <a:normAutofit fontScale="90000"/>
+          </a:bodyPr>
+          <a:lstStyle/>
+          <a:p>
+            <a:r>
+              <a:rPr lang="en-US" dirty="0"/>
+              <a:t>Largest error is at t=86, and it’s really bad there. I am confused why the </a:t>
+            </a:r>
+            <a:r>
+              <a:rPr lang="en-US" dirty="0" err="1"/>
+              <a:t>ossilcations</a:t>
+            </a:r>
+            <a:r>
+              <a:rPr lang="en-US" dirty="0"/>
+              <a:t> on the error are getting less, and why are they so big here.</a:t>
+            </a:r>
+          </a:p>
+        </p:txBody>
+      </p:sp>
+      <p:pic>
+        <p:nvPicPr>
+          <p:cNvPr id="4" name="Picture 2">
+            <a:extLst>
+              <a:ext uri="{FF2B5EF4-FFF2-40B4-BE49-F238E27FC236}">
+                <a16:creationId xmlns:a16="http://schemas.microsoft.com/office/drawing/2014/main" id="{BA229336-18D6-42A8-B1F2-C9425C0CEF86}"/>
+              </a:ext>
+            </a:extLst>
+          </p:cNvPr>
+          <p:cNvPicPr>
+            <a:picLocks noChangeAspect="1" noChangeArrowheads="1"/>
+          </p:cNvPicPr>
+          <p:nvPr/>
+        </p:nvPicPr>
+        <p:blipFill>
+          <a:blip r:embed="rId3">
+            <a:extLst>
+              <a:ext uri="{28A0092B-C50C-407E-A947-70E740481C1C}">
+                <a14:useLocalDpi xmlns:a14="http://schemas.microsoft.com/office/drawing/2010/main" val="0"/>
+              </a:ext>
+            </a:extLst>
+          </a:blip>
+          <a:srcRect/>
+          <a:stretch>
+            <a:fillRect/>
+          </a:stretch>
+        </p:blipFill>
+        <p:spPr bwMode="auto">
+          <a:xfrm>
+            <a:off x="7200900" y="4210050"/>
+            <a:ext cx="3657600" cy="2647950"/>
+          </a:xfrm>
+          <a:prstGeom prst="rect">
+            <a:avLst/>
+          </a:prstGeom>
+          <a:noFill/>
+          <a:extLst>
+            <a:ext uri="{909E8E84-426E-40DD-AFC4-6F175D3DCCD1}">
+              <a14:hiddenFill xmlns:a14="http://schemas.microsoft.com/office/drawing/2010/main">
+                <a:solidFill>
+                  <a:srgbClr val="FFFFFF"/>
+                </a:solidFill>
+              </a14:hiddenFill>
+            </a:ext>
+          </a:extLst>
+        </p:spPr>
+      </p:pic>
+      <p:pic>
+        <p:nvPicPr>
+          <p:cNvPr id="8194" name="Picture 2">
+            <a:extLst>
+              <a:ext uri="{FF2B5EF4-FFF2-40B4-BE49-F238E27FC236}">
+                <a16:creationId xmlns:a16="http://schemas.microsoft.com/office/drawing/2014/main" id="{B40095F7-EFF4-4193-BAAF-998E9FCFF399}"/>
+              </a:ext>
+            </a:extLst>
+          </p:cNvPr>
+          <p:cNvPicPr>
+            <a:picLocks noGrp="1" noChangeAspect="1" noChangeArrowheads="1"/>
+          </p:cNvPicPr>
+          <p:nvPr>
+            <p:ph idx="1"/>
+          </p:nvPr>
+        </p:nvPicPr>
+        <p:blipFill>
+          <a:blip r:embed="rId4">
+            <a:extLst>
+              <a:ext uri="{28A0092B-C50C-407E-A947-70E740481C1C}">
+                <a14:useLocalDpi xmlns:a14="http://schemas.microsoft.com/office/drawing/2010/main" val="0"/>
+              </a:ext>
+            </a:extLst>
+          </a:blip>
+          <a:srcRect/>
+          <a:stretch>
+            <a:fillRect/>
+          </a:stretch>
+        </p:blipFill>
+        <p:spPr bwMode="auto">
+          <a:xfrm>
+            <a:off x="495078" y="1599310"/>
+            <a:ext cx="3467212" cy="2833882"/>
+          </a:xfrm>
+          <a:prstGeom prst="rect">
+            <a:avLst/>
+          </a:prstGeom>
+          <a:noFill/>
+          <a:extLst>
+            <a:ext uri="{909E8E84-426E-40DD-AFC4-6F175D3DCCD1}">
+              <a14:hiddenFill xmlns:a14="http://schemas.microsoft.com/office/drawing/2010/main">
+                <a:solidFill>
+                  <a:srgbClr val="FFFFFF"/>
+                </a:solidFill>
+              </a14:hiddenFill>
+            </a:ext>
+          </a:extLst>
+        </p:spPr>
+      </p:pic>
+      <p:pic>
+        <p:nvPicPr>
+          <p:cNvPr id="8196" name="Picture 4">
+            <a:extLst>
+              <a:ext uri="{FF2B5EF4-FFF2-40B4-BE49-F238E27FC236}">
+                <a16:creationId xmlns:a16="http://schemas.microsoft.com/office/drawing/2014/main" id="{F4089EAB-E71B-416D-92DA-4FB6AD5F0025}"/>
+              </a:ext>
+            </a:extLst>
+          </p:cNvPr>
+          <p:cNvPicPr>
+            <a:picLocks noChangeAspect="1" noChangeArrowheads="1"/>
+          </p:cNvPicPr>
+          <p:nvPr/>
+        </p:nvPicPr>
+        <p:blipFill>
+          <a:blip r:embed="rId5">
+            <a:extLst>
+              <a:ext uri="{28A0092B-C50C-407E-A947-70E740481C1C}">
+                <a14:useLocalDpi xmlns:a14="http://schemas.microsoft.com/office/drawing/2010/main" val="0"/>
+              </a:ext>
+            </a:extLst>
+          </a:blip>
+          <a:srcRect/>
+          <a:stretch>
+            <a:fillRect/>
+          </a:stretch>
+        </p:blipFill>
+        <p:spPr bwMode="auto">
+          <a:xfrm>
+            <a:off x="4095639" y="1690688"/>
+            <a:ext cx="2933700" cy="2514600"/>
+          </a:xfrm>
+          <a:prstGeom prst="rect">
+            <a:avLst/>
+          </a:prstGeom>
+          <a:noFill/>
+          <a:extLst>
+            <a:ext uri="{909E8E84-426E-40DD-AFC4-6F175D3DCCD1}">
+              <a14:hiddenFill xmlns:a14="http://schemas.microsoft.com/office/drawing/2010/main">
+                <a:solidFill>
+                  <a:srgbClr val="FFFFFF"/>
+                </a:solidFill>
+              </a14:hiddenFill>
+            </a:ext>
+          </a:extLst>
+        </p:spPr>
+      </p:pic>
+      <p:pic>
+        <p:nvPicPr>
+          <p:cNvPr id="8198" name="Picture 6">
+            <a:extLst>
+              <a:ext uri="{FF2B5EF4-FFF2-40B4-BE49-F238E27FC236}">
+                <a16:creationId xmlns:a16="http://schemas.microsoft.com/office/drawing/2014/main" id="{AE3C73DD-EB52-4415-9C4E-89DA89222A5C}"/>
+              </a:ext>
+            </a:extLst>
+          </p:cNvPr>
+          <p:cNvPicPr>
+            <a:picLocks noChangeAspect="1" noChangeArrowheads="1"/>
+          </p:cNvPicPr>
+          <p:nvPr/>
+        </p:nvPicPr>
+        <p:blipFill>
+          <a:blip r:embed="rId6">
+            <a:extLst>
+              <a:ext uri="{28A0092B-C50C-407E-A947-70E740481C1C}">
+                <a14:useLocalDpi xmlns:a14="http://schemas.microsoft.com/office/drawing/2010/main" val="0"/>
+              </a:ext>
+            </a:extLst>
+          </a:blip>
+          <a:srcRect/>
+          <a:stretch>
+            <a:fillRect/>
+          </a:stretch>
+        </p:blipFill>
+        <p:spPr bwMode="auto">
+          <a:xfrm>
+            <a:off x="7200900" y="1690688"/>
+            <a:ext cx="2933700" cy="2514600"/>
+          </a:xfrm>
+          <a:prstGeom prst="rect">
+            <a:avLst/>
+          </a:prstGeom>
+          <a:noFill/>
+          <a:extLst>
+            <a:ext uri="{909E8E84-426E-40DD-AFC4-6F175D3DCCD1}">
+              <a14:hiddenFill xmlns:a14="http://schemas.microsoft.com/office/drawing/2010/main">
+                <a:solidFill>
+                  <a:srgbClr val="FFFFFF"/>
+                </a:solidFill>
+              </a14:hiddenFill>
+            </a:ext>
+          </a:extLst>
+        </p:spPr>
+      </p:pic>
+      <p:sp>
+        <p:nvSpPr>
+          <p:cNvPr id="5" name="TextBox 4">
+            <a:extLst>
+              <a:ext uri="{FF2B5EF4-FFF2-40B4-BE49-F238E27FC236}">
+                <a16:creationId xmlns:a16="http://schemas.microsoft.com/office/drawing/2014/main" id="{BA7B1FE4-0228-4377-AC1A-4DB5BB041218}"/>
+              </a:ext>
+            </a:extLst>
+          </p:cNvPr>
+          <p:cNvSpPr txBox="1"/>
+          <p:nvPr/>
+        </p:nvSpPr>
+        <p:spPr>
+          <a:xfrm>
+            <a:off x="495078" y="4839128"/>
+            <a:ext cx="7500258" cy="1200329"/>
+          </a:xfrm>
+          <a:prstGeom prst="rect">
+            <a:avLst/>
+          </a:prstGeom>
+          <a:noFill/>
+        </p:spPr>
+        <p:txBody>
+          <a:bodyPr wrap="none" rtlCol="0">
+            <a:spAutoFit/>
+          </a:bodyPr>
+          <a:lstStyle/>
+          <a:p>
+            <a:r>
+              <a:rPr lang="en-US" dirty="0"/>
+              <a:t>Questions to consider:</a:t>
+            </a:r>
+          </a:p>
+          <a:p>
+            <a:r>
+              <a:rPr lang="en-US" dirty="0"/>
+              <a:t>How should I pick input data for next step? Should I do t+1 or something else?</a:t>
+            </a:r>
+          </a:p>
+          <a:p>
+            <a:r>
+              <a:rPr lang="en-US" dirty="0"/>
+              <a:t>Is this even a good outline? </a:t>
+            </a:r>
+          </a:p>
+          <a:p>
+            <a:endParaRPr lang="en-US" dirty="0"/>
+          </a:p>
+        </p:txBody>
+      </p:sp>
     </p:spTree>
     <p:extLst>
       <p:ext uri="{BB962C8B-B14F-4D97-AF65-F5344CB8AC3E}">
         <p14:creationId xmlns:p14="http://schemas.microsoft.com/office/powerpoint/2010/main" val="1613613128"/>
+      </p:ext>
+    </p:extLst>
+  </p:cSld>
+  <p:clrMapOvr>
+    <a:masterClrMapping/>
+  </p:clrMapOvr>
+  <p:extLst>
+    <p:ext uri="{6950BFC3-D8DA-4A85-94F7-54DA5524770B}">
+      <p188:commentRel xmlns:p188="http://schemas.microsoft.com/office/powerpoint/2018/8/main" r:id="rId2"/>
+    </p:ext>
+  </p:extLst>
+</p:sld>
+</file>
+
+<file path=ppt/slides/slide24.xml><?xml version="1.0" encoding="utf-8"?>
+<p:sld xmlns:a="http://schemas.openxmlformats.org/drawingml/2006/main" xmlns:r="http://schemas.openxmlformats.org/officeDocument/2006/relationships" xmlns:p="http://schemas.openxmlformats.org/presentationml/2006/main">
+  <p:cSld>
+    <p:spTree>
+      <p:nvGrpSpPr>
+        <p:cNvPr id="1" name=""/>
+        <p:cNvGrpSpPr/>
+        <p:nvPr/>
+      </p:nvGrpSpPr>
+      <p:grpSpPr>
+        <a:xfrm>
+          <a:off x="0" y="0"/>
+          <a:ext cx="0" cy="0"/>
+          <a:chOff x="0" y="0"/>
+          <a:chExt cx="0" cy="0"/>
+        </a:xfrm>
+      </p:grpSpPr>
+      <p:sp>
+        <p:nvSpPr>
+          <p:cNvPr id="2" name="Title 1">
+            <a:extLst>
+              <a:ext uri="{FF2B5EF4-FFF2-40B4-BE49-F238E27FC236}">
+                <a16:creationId xmlns:a16="http://schemas.microsoft.com/office/drawing/2014/main" id="{5B0ACD52-7E92-44C1-B62E-8EA185D090C1}"/>
+              </a:ext>
+            </a:extLst>
+          </p:cNvPr>
+          <p:cNvSpPr>
+            <a:spLocks noGrp="1"/>
+          </p:cNvSpPr>
+          <p:nvPr>
+            <p:ph type="title"/>
+          </p:nvPr>
+        </p:nvSpPr>
+        <p:spPr/>
+        <p:txBody>
+          <a:bodyPr/>
+          <a:lstStyle/>
+          <a:p>
+            <a:r>
+              <a:rPr lang="en-US" dirty="0"/>
+              <a:t>Doing the next step, but I’m getting weird results. </a:t>
+            </a:r>
+          </a:p>
+        </p:txBody>
+      </p:sp>
+      <p:sp>
+        <p:nvSpPr>
+          <p:cNvPr id="3" name="Content Placeholder 2">
+            <a:extLst>
+              <a:ext uri="{FF2B5EF4-FFF2-40B4-BE49-F238E27FC236}">
+                <a16:creationId xmlns:a16="http://schemas.microsoft.com/office/drawing/2014/main" id="{D8FE0429-283E-4D56-8ACA-778F2521FB71}"/>
+              </a:ext>
+            </a:extLst>
+          </p:cNvPr>
+          <p:cNvSpPr>
+            <a:spLocks noGrp="1"/>
+          </p:cNvSpPr>
+          <p:nvPr>
+            <p:ph idx="1"/>
+          </p:nvPr>
+        </p:nvSpPr>
+        <p:spPr/>
+        <p:txBody>
+          <a:bodyPr/>
+          <a:lstStyle/>
+          <a:p>
+            <a:r>
+              <a:rPr lang="en-US" dirty="0"/>
+              <a:t>For 1, my validation error is going up when I am training a lot, right away</a:t>
+            </a:r>
+          </a:p>
+          <a:p>
+            <a:endParaRPr lang="en-US" dirty="0"/>
+          </a:p>
+        </p:txBody>
+      </p:sp>
+      <p:pic>
+        <p:nvPicPr>
+          <p:cNvPr id="5" name="Picture 4">
+            <a:extLst>
+              <a:ext uri="{FF2B5EF4-FFF2-40B4-BE49-F238E27FC236}">
+                <a16:creationId xmlns:a16="http://schemas.microsoft.com/office/drawing/2014/main" id="{C5714B8B-634D-4DB3-9490-139B791A1815}"/>
+              </a:ext>
+            </a:extLst>
+          </p:cNvPr>
+          <p:cNvPicPr>
+            <a:picLocks noChangeAspect="1"/>
+          </p:cNvPicPr>
+          <p:nvPr/>
+        </p:nvPicPr>
+        <p:blipFill>
+          <a:blip r:embed="rId2"/>
+          <a:stretch>
+            <a:fillRect/>
+          </a:stretch>
+        </p:blipFill>
+        <p:spPr>
+          <a:xfrm>
+            <a:off x="2795534" y="2606675"/>
+            <a:ext cx="5162550" cy="3705225"/>
+          </a:xfrm>
+          <a:prstGeom prst="rect">
+            <a:avLst/>
+          </a:prstGeom>
+        </p:spPr>
+      </p:pic>
+    </p:spTree>
+    <p:extLst>
+      <p:ext uri="{BB962C8B-B14F-4D97-AF65-F5344CB8AC3E}">
+        <p14:creationId xmlns:p14="http://schemas.microsoft.com/office/powerpoint/2010/main" val="3550213892"/>
+      </p:ext>
+    </p:extLst>
+  </p:cSld>
+  <p:clrMapOvr>
+    <a:masterClrMapping/>
+  </p:clrMapOvr>
+</p:sld>
+</file>
+
+<file path=ppt/slides/slide25.xml><?xml version="1.0" encoding="utf-8"?>
+<p:sld xmlns:a="http://schemas.openxmlformats.org/drawingml/2006/main" xmlns:r="http://schemas.openxmlformats.org/officeDocument/2006/relationships" xmlns:p="http://schemas.openxmlformats.org/presentationml/2006/main">
+  <p:cSld>
+    <p:spTree>
+      <p:nvGrpSpPr>
+        <p:cNvPr id="1" name=""/>
+        <p:cNvGrpSpPr/>
+        <p:nvPr/>
+      </p:nvGrpSpPr>
+      <p:grpSpPr>
+        <a:xfrm>
+          <a:off x="0" y="0"/>
+          <a:ext cx="0" cy="0"/>
+          <a:chOff x="0" y="0"/>
+          <a:chExt cx="0" cy="0"/>
+        </a:xfrm>
+      </p:grpSpPr>
+      <p:sp>
+        <p:nvSpPr>
+          <p:cNvPr id="2" name="Title 1">
+            <a:extLst>
+              <a:ext uri="{FF2B5EF4-FFF2-40B4-BE49-F238E27FC236}">
+                <a16:creationId xmlns:a16="http://schemas.microsoft.com/office/drawing/2014/main" id="{AB34E1DE-189C-4218-9C1C-1ED1ACDF5786}"/>
+              </a:ext>
+            </a:extLst>
+          </p:cNvPr>
+          <p:cNvSpPr>
+            <a:spLocks noGrp="1"/>
+          </p:cNvSpPr>
+          <p:nvPr>
+            <p:ph type="title"/>
+          </p:nvPr>
+        </p:nvSpPr>
+        <p:spPr/>
+        <p:txBody>
+          <a:bodyPr>
+            <a:noAutofit/>
+          </a:bodyPr>
+          <a:lstStyle/>
+          <a:p>
+            <a:r>
+              <a:rPr lang="en-US" sz="2800" dirty="0"/>
+              <a:t>I tried just going from truth to truth_t+1. but wasn’t getting the behavior really at all. I made it so it’s not actually an autoencoder anymore. These are a few of the single cell </a:t>
+            </a:r>
+            <a:r>
+              <a:rPr lang="en-US" sz="2800" dirty="0" err="1"/>
+              <a:t>trategories</a:t>
+            </a:r>
+            <a:endParaRPr lang="en-US" sz="2800" dirty="0"/>
+          </a:p>
+        </p:txBody>
+      </p:sp>
+      <p:sp>
+        <p:nvSpPr>
+          <p:cNvPr id="3" name="Content Placeholder 2">
+            <a:extLst>
+              <a:ext uri="{FF2B5EF4-FFF2-40B4-BE49-F238E27FC236}">
+                <a16:creationId xmlns:a16="http://schemas.microsoft.com/office/drawing/2014/main" id="{0BF0E399-9C02-4A34-8C5E-12A7F8F9E345}"/>
+              </a:ext>
+            </a:extLst>
+          </p:cNvPr>
+          <p:cNvSpPr>
+            <a:spLocks noGrp="1"/>
+          </p:cNvSpPr>
+          <p:nvPr>
+            <p:ph idx="1"/>
+          </p:nvPr>
+        </p:nvSpPr>
+        <p:spPr/>
+        <p:txBody>
+          <a:bodyPr/>
+          <a:lstStyle/>
+          <a:p>
+            <a:endParaRPr lang="en-US" dirty="0"/>
+          </a:p>
+        </p:txBody>
+      </p:sp>
+      <p:pic>
+        <p:nvPicPr>
+          <p:cNvPr id="10242" name="Picture 2">
+            <a:extLst>
+              <a:ext uri="{FF2B5EF4-FFF2-40B4-BE49-F238E27FC236}">
+                <a16:creationId xmlns:a16="http://schemas.microsoft.com/office/drawing/2014/main" id="{E3BDCA10-B7AB-4A98-ADD0-579DC048A883}"/>
+              </a:ext>
+            </a:extLst>
+          </p:cNvPr>
+          <p:cNvPicPr>
+            <a:picLocks noChangeAspect="1" noChangeArrowheads="1"/>
+          </p:cNvPicPr>
+          <p:nvPr/>
+        </p:nvPicPr>
+        <p:blipFill>
+          <a:blip r:embed="rId2">
+            <a:extLst>
+              <a:ext uri="{28A0092B-C50C-407E-A947-70E740481C1C}">
+                <a14:useLocalDpi xmlns:a14="http://schemas.microsoft.com/office/drawing/2010/main" val="0"/>
+              </a:ext>
+            </a:extLst>
+          </a:blip>
+          <a:srcRect/>
+          <a:stretch>
+            <a:fillRect/>
+          </a:stretch>
+        </p:blipFill>
+        <p:spPr bwMode="auto">
+          <a:xfrm>
+            <a:off x="231223" y="1825625"/>
+            <a:ext cx="3571875" cy="2400300"/>
+          </a:xfrm>
+          <a:prstGeom prst="rect">
+            <a:avLst/>
+          </a:prstGeom>
+          <a:noFill/>
+          <a:extLst>
+            <a:ext uri="{909E8E84-426E-40DD-AFC4-6F175D3DCCD1}">
+              <a14:hiddenFill xmlns:a14="http://schemas.microsoft.com/office/drawing/2010/main">
+                <a:solidFill>
+                  <a:srgbClr val="FFFFFF"/>
+                </a:solidFill>
+              </a14:hiddenFill>
+            </a:ext>
+          </a:extLst>
+        </p:spPr>
+      </p:pic>
+      <p:pic>
+        <p:nvPicPr>
+          <p:cNvPr id="10244" name="Picture 4">
+            <a:extLst>
+              <a:ext uri="{FF2B5EF4-FFF2-40B4-BE49-F238E27FC236}">
+                <a16:creationId xmlns:a16="http://schemas.microsoft.com/office/drawing/2014/main" id="{CCCA4EEE-E4FF-4E94-A9AD-344304F2E8D0}"/>
+              </a:ext>
+            </a:extLst>
+          </p:cNvPr>
+          <p:cNvPicPr>
+            <a:picLocks noChangeAspect="1" noChangeArrowheads="1"/>
+          </p:cNvPicPr>
+          <p:nvPr/>
+        </p:nvPicPr>
+        <p:blipFill>
+          <a:blip r:embed="rId3">
+            <a:extLst>
+              <a:ext uri="{28A0092B-C50C-407E-A947-70E740481C1C}">
+                <a14:useLocalDpi xmlns:a14="http://schemas.microsoft.com/office/drawing/2010/main" val="0"/>
+              </a:ext>
+            </a:extLst>
+          </a:blip>
+          <a:srcRect/>
+          <a:stretch>
+            <a:fillRect/>
+          </a:stretch>
+        </p:blipFill>
+        <p:spPr bwMode="auto">
+          <a:xfrm>
+            <a:off x="202647" y="4200275"/>
+            <a:ext cx="3629025" cy="2400300"/>
+          </a:xfrm>
+          <a:prstGeom prst="rect">
+            <a:avLst/>
+          </a:prstGeom>
+          <a:noFill/>
+          <a:extLst>
+            <a:ext uri="{909E8E84-426E-40DD-AFC4-6F175D3DCCD1}">
+              <a14:hiddenFill xmlns:a14="http://schemas.microsoft.com/office/drawing/2010/main">
+                <a:solidFill>
+                  <a:srgbClr val="FFFFFF"/>
+                </a:solidFill>
+              </a14:hiddenFill>
+            </a:ext>
+          </a:extLst>
+        </p:spPr>
+      </p:pic>
+      <p:pic>
+        <p:nvPicPr>
+          <p:cNvPr id="10246" name="Picture 6">
+            <a:extLst>
+              <a:ext uri="{FF2B5EF4-FFF2-40B4-BE49-F238E27FC236}">
+                <a16:creationId xmlns:a16="http://schemas.microsoft.com/office/drawing/2014/main" id="{4D17D37B-7BF0-4429-B6D0-E49BFAEE4735}"/>
+              </a:ext>
+            </a:extLst>
+          </p:cNvPr>
+          <p:cNvPicPr>
+            <a:picLocks noChangeAspect="1" noChangeArrowheads="1"/>
+          </p:cNvPicPr>
+          <p:nvPr/>
+        </p:nvPicPr>
+        <p:blipFill>
+          <a:blip r:embed="rId4">
+            <a:extLst>
+              <a:ext uri="{28A0092B-C50C-407E-A947-70E740481C1C}">
+                <a14:useLocalDpi xmlns:a14="http://schemas.microsoft.com/office/drawing/2010/main" val="0"/>
+              </a:ext>
+            </a:extLst>
+          </a:blip>
+          <a:srcRect/>
+          <a:stretch>
+            <a:fillRect/>
+          </a:stretch>
+        </p:blipFill>
+        <p:spPr bwMode="auto">
+          <a:xfrm>
+            <a:off x="4629150" y="2228850"/>
+            <a:ext cx="2933700" cy="2400300"/>
+          </a:xfrm>
+          <a:prstGeom prst="rect">
+            <a:avLst/>
+          </a:prstGeom>
+          <a:noFill/>
+          <a:extLst>
+            <a:ext uri="{909E8E84-426E-40DD-AFC4-6F175D3DCCD1}">
+              <a14:hiddenFill xmlns:a14="http://schemas.microsoft.com/office/drawing/2010/main">
+                <a:solidFill>
+                  <a:srgbClr val="FFFFFF"/>
+                </a:solidFill>
+              </a14:hiddenFill>
+            </a:ext>
+          </a:extLst>
+        </p:spPr>
+      </p:pic>
+      <p:pic>
+        <p:nvPicPr>
+          <p:cNvPr id="10250" name="Picture 10">
+            <a:extLst>
+              <a:ext uri="{FF2B5EF4-FFF2-40B4-BE49-F238E27FC236}">
+                <a16:creationId xmlns:a16="http://schemas.microsoft.com/office/drawing/2014/main" id="{12F7C15B-565C-418F-A14A-ACB200018958}"/>
+              </a:ext>
+            </a:extLst>
+          </p:cNvPr>
+          <p:cNvPicPr>
+            <a:picLocks noChangeAspect="1" noChangeArrowheads="1"/>
+          </p:cNvPicPr>
+          <p:nvPr/>
+        </p:nvPicPr>
+        <p:blipFill>
+          <a:blip r:embed="rId5">
+            <a:extLst>
+              <a:ext uri="{28A0092B-C50C-407E-A947-70E740481C1C}">
+                <a14:useLocalDpi xmlns:a14="http://schemas.microsoft.com/office/drawing/2010/main" val="0"/>
+              </a:ext>
+            </a:extLst>
+          </a:blip>
+          <a:srcRect/>
+          <a:stretch>
+            <a:fillRect/>
+          </a:stretch>
+        </p:blipFill>
+        <p:spPr bwMode="auto">
+          <a:xfrm>
+            <a:off x="7991475" y="2228850"/>
+            <a:ext cx="2933700" cy="2400300"/>
+          </a:xfrm>
+          <a:prstGeom prst="rect">
+            <a:avLst/>
+          </a:prstGeom>
+          <a:noFill/>
+          <a:extLst>
+            <a:ext uri="{909E8E84-426E-40DD-AFC4-6F175D3DCCD1}">
+              <a14:hiddenFill xmlns:a14="http://schemas.microsoft.com/office/drawing/2010/main">
+                <a:solidFill>
+                  <a:srgbClr val="FFFFFF"/>
+                </a:solidFill>
+              </a14:hiddenFill>
+            </a:ext>
+          </a:extLst>
+        </p:spPr>
+      </p:pic>
+      <p:sp>
+        <p:nvSpPr>
+          <p:cNvPr id="4" name="TextBox 3">
+            <a:extLst>
+              <a:ext uri="{FF2B5EF4-FFF2-40B4-BE49-F238E27FC236}">
+                <a16:creationId xmlns:a16="http://schemas.microsoft.com/office/drawing/2014/main" id="{E0D12B50-9DFF-4E20-A2DD-DD0B320B4791}"/>
+              </a:ext>
+            </a:extLst>
+          </p:cNvPr>
+          <p:cNvSpPr txBox="1"/>
+          <p:nvPr/>
+        </p:nvSpPr>
+        <p:spPr>
+          <a:xfrm>
+            <a:off x="5085708" y="2650733"/>
+            <a:ext cx="1442318" cy="369332"/>
+          </a:xfrm>
+          <a:prstGeom prst="rect">
+            <a:avLst/>
+          </a:prstGeom>
+          <a:noFill/>
+        </p:spPr>
+        <p:txBody>
+          <a:bodyPr wrap="none" rtlCol="0">
+            <a:spAutoFit/>
+          </a:bodyPr>
+          <a:lstStyle/>
+          <a:p>
+            <a:r>
+              <a:rPr lang="en-US" dirty="0"/>
+              <a:t>Predicted t+1</a:t>
+            </a:r>
+          </a:p>
+        </p:txBody>
+      </p:sp>
+      <p:sp>
+        <p:nvSpPr>
+          <p:cNvPr id="5" name="TextBox 4">
+            <a:extLst>
+              <a:ext uri="{FF2B5EF4-FFF2-40B4-BE49-F238E27FC236}">
+                <a16:creationId xmlns:a16="http://schemas.microsoft.com/office/drawing/2014/main" id="{1BC96C0E-46B2-4638-AC42-92F37DE4FEC6}"/>
+              </a:ext>
+            </a:extLst>
+          </p:cNvPr>
+          <p:cNvSpPr txBox="1"/>
+          <p:nvPr/>
+        </p:nvSpPr>
+        <p:spPr>
+          <a:xfrm>
+            <a:off x="8476180" y="2712378"/>
+            <a:ext cx="1045607" cy="369332"/>
+          </a:xfrm>
+          <a:prstGeom prst="rect">
+            <a:avLst/>
+          </a:prstGeom>
+          <a:noFill/>
+        </p:spPr>
+        <p:txBody>
+          <a:bodyPr wrap="none" rtlCol="0">
+            <a:spAutoFit/>
+          </a:bodyPr>
+          <a:lstStyle/>
+          <a:p>
+            <a:r>
+              <a:rPr lang="en-US" dirty="0"/>
+              <a:t>Truth t+1</a:t>
+            </a:r>
+          </a:p>
+        </p:txBody>
+      </p:sp>
+      <p:pic>
+        <p:nvPicPr>
+          <p:cNvPr id="10254" name="Picture 14">
+            <a:extLst>
+              <a:ext uri="{FF2B5EF4-FFF2-40B4-BE49-F238E27FC236}">
+                <a16:creationId xmlns:a16="http://schemas.microsoft.com/office/drawing/2014/main" id="{C0747DB1-2C63-4337-AD25-0EB88D3A4C16}"/>
+              </a:ext>
+            </a:extLst>
+          </p:cNvPr>
+          <p:cNvPicPr>
+            <a:picLocks noChangeAspect="1" noChangeArrowheads="1"/>
+          </p:cNvPicPr>
+          <p:nvPr/>
+        </p:nvPicPr>
+        <p:blipFill>
+          <a:blip r:embed="rId6">
+            <a:extLst>
+              <a:ext uri="{28A0092B-C50C-407E-A947-70E740481C1C}">
+                <a14:useLocalDpi xmlns:a14="http://schemas.microsoft.com/office/drawing/2010/main" val="0"/>
+              </a:ext>
+            </a:extLst>
+          </a:blip>
+          <a:srcRect/>
+          <a:stretch>
+            <a:fillRect/>
+          </a:stretch>
+        </p:blipFill>
+        <p:spPr bwMode="auto">
+          <a:xfrm>
+            <a:off x="4629150" y="4550570"/>
+            <a:ext cx="2933700" cy="2400300"/>
+          </a:xfrm>
+          <a:prstGeom prst="rect">
+            <a:avLst/>
+          </a:prstGeom>
+          <a:noFill/>
+          <a:extLst>
+            <a:ext uri="{909E8E84-426E-40DD-AFC4-6F175D3DCCD1}">
+              <a14:hiddenFill xmlns:a14="http://schemas.microsoft.com/office/drawing/2010/main">
+                <a:solidFill>
+                  <a:srgbClr val="FFFFFF"/>
+                </a:solidFill>
+              </a14:hiddenFill>
+            </a:ext>
+          </a:extLst>
+        </p:spPr>
+      </p:pic>
+      <p:sp>
+        <p:nvSpPr>
+          <p:cNvPr id="6" name="TextBox 5">
+            <a:extLst>
+              <a:ext uri="{FF2B5EF4-FFF2-40B4-BE49-F238E27FC236}">
+                <a16:creationId xmlns:a16="http://schemas.microsoft.com/office/drawing/2014/main" id="{79A70140-23E7-4563-A447-2204653F851E}"/>
+              </a:ext>
+            </a:extLst>
+          </p:cNvPr>
+          <p:cNvSpPr txBox="1"/>
+          <p:nvPr/>
+        </p:nvSpPr>
+        <p:spPr>
+          <a:xfrm>
+            <a:off x="5178175" y="5051033"/>
+            <a:ext cx="1442318" cy="369332"/>
+          </a:xfrm>
+          <a:prstGeom prst="rect">
+            <a:avLst/>
+          </a:prstGeom>
+          <a:noFill/>
+        </p:spPr>
+        <p:txBody>
+          <a:bodyPr wrap="none" rtlCol="0">
+            <a:spAutoFit/>
+          </a:bodyPr>
+          <a:lstStyle/>
+          <a:p>
+            <a:r>
+              <a:rPr lang="en-US" dirty="0"/>
+              <a:t>Predicted t+2</a:t>
+            </a:r>
+          </a:p>
+        </p:txBody>
+      </p:sp>
+    </p:spTree>
+    <p:extLst>
+      <p:ext uri="{BB962C8B-B14F-4D97-AF65-F5344CB8AC3E}">
+        <p14:creationId xmlns:p14="http://schemas.microsoft.com/office/powerpoint/2010/main" val="737002797"/>
+      </p:ext>
+    </p:extLst>
+  </p:cSld>
+  <p:clrMapOvr>
+    <a:masterClrMapping/>
+  </p:clrMapOvr>
+</p:sld>
+</file>
+
+<file path=ppt/slides/slide26.xml><?xml version="1.0" encoding="utf-8"?>
+<p:sld xmlns:a="http://schemas.openxmlformats.org/drawingml/2006/main" xmlns:r="http://schemas.openxmlformats.org/officeDocument/2006/relationships" xmlns:p="http://schemas.openxmlformats.org/presentationml/2006/main">
+  <p:cSld>
+    <p:spTree>
+      <p:nvGrpSpPr>
+        <p:cNvPr id="1" name=""/>
+        <p:cNvGrpSpPr/>
+        <p:nvPr/>
+      </p:nvGrpSpPr>
+      <p:grpSpPr>
+        <a:xfrm>
+          <a:off x="0" y="0"/>
+          <a:ext cx="0" cy="0"/>
+          <a:chOff x="0" y="0"/>
+          <a:chExt cx="0" cy="0"/>
+        </a:xfrm>
+      </p:grpSpPr>
+      <p:sp>
+        <p:nvSpPr>
+          <p:cNvPr id="2" name="Title 1">
+            <a:extLst>
+              <a:ext uri="{FF2B5EF4-FFF2-40B4-BE49-F238E27FC236}">
+                <a16:creationId xmlns:a16="http://schemas.microsoft.com/office/drawing/2014/main" id="{99EC638F-716A-4292-B04E-F93C0D0E4AD5}"/>
+              </a:ext>
+            </a:extLst>
+          </p:cNvPr>
+          <p:cNvSpPr>
+            <a:spLocks noGrp="1"/>
+          </p:cNvSpPr>
+          <p:nvPr>
+            <p:ph type="title"/>
+          </p:nvPr>
+        </p:nvSpPr>
+        <p:spPr/>
+        <p:txBody>
+          <a:bodyPr/>
+          <a:lstStyle/>
+          <a:p>
+            <a:endParaRPr lang="en-US"/>
+          </a:p>
+        </p:txBody>
+      </p:sp>
+      <p:sp>
+        <p:nvSpPr>
+          <p:cNvPr id="3" name="Content Placeholder 2">
+            <a:extLst>
+              <a:ext uri="{FF2B5EF4-FFF2-40B4-BE49-F238E27FC236}">
+                <a16:creationId xmlns:a16="http://schemas.microsoft.com/office/drawing/2014/main" id="{C9949239-6408-4B56-9403-3BE63CB77A77}"/>
+              </a:ext>
+            </a:extLst>
+          </p:cNvPr>
+          <p:cNvSpPr>
+            <a:spLocks noGrp="1"/>
+          </p:cNvSpPr>
+          <p:nvPr>
+            <p:ph idx="1"/>
+          </p:nvPr>
+        </p:nvSpPr>
+        <p:spPr/>
+        <p:txBody>
+          <a:bodyPr/>
+          <a:lstStyle/>
+          <a:p>
+            <a:endParaRPr lang="en-US"/>
+          </a:p>
+        </p:txBody>
+      </p:sp>
+      <p:pic>
+        <p:nvPicPr>
+          <p:cNvPr id="1050" name="Picture 26">
+            <a:extLst>
+              <a:ext uri="{FF2B5EF4-FFF2-40B4-BE49-F238E27FC236}">
+                <a16:creationId xmlns:a16="http://schemas.microsoft.com/office/drawing/2014/main" id="{9C88EF16-7C39-49A0-A31A-E1C19066D3F9}"/>
+              </a:ext>
+            </a:extLst>
+          </p:cNvPr>
+          <p:cNvPicPr>
+            <a:picLocks noChangeAspect="1" noChangeArrowheads="1"/>
+          </p:cNvPicPr>
+          <p:nvPr/>
+        </p:nvPicPr>
+        <p:blipFill>
+          <a:blip r:embed="rId2">
+            <a:extLst>
+              <a:ext uri="{28A0092B-C50C-407E-A947-70E740481C1C}">
+                <a14:useLocalDpi xmlns:a14="http://schemas.microsoft.com/office/drawing/2010/main" val="0"/>
+              </a:ext>
+            </a:extLst>
+          </a:blip>
+          <a:srcRect/>
+          <a:stretch>
+            <a:fillRect/>
+          </a:stretch>
+        </p:blipFill>
+        <p:spPr bwMode="auto">
+          <a:xfrm>
+            <a:off x="4210050" y="2171700"/>
+            <a:ext cx="3771900" cy="2514600"/>
+          </a:xfrm>
+          <a:prstGeom prst="rect">
+            <a:avLst/>
+          </a:prstGeom>
+          <a:noFill/>
+          <a:extLst>
+            <a:ext uri="{909E8E84-426E-40DD-AFC4-6F175D3DCCD1}">
+              <a14:hiddenFill xmlns:a14="http://schemas.microsoft.com/office/drawing/2010/main">
+                <a:solidFill>
+                  <a:srgbClr val="FFFFFF"/>
+                </a:solidFill>
+              </a14:hiddenFill>
+            </a:ext>
+          </a:extLst>
+        </p:spPr>
+      </p:pic>
+    </p:spTree>
+    <p:extLst>
+      <p:ext uri="{BB962C8B-B14F-4D97-AF65-F5344CB8AC3E}">
+        <p14:creationId xmlns:p14="http://schemas.microsoft.com/office/powerpoint/2010/main" val="4084175940"/>
+      </p:ext>
+    </p:extLst>
+  </p:cSld>
+  <p:clrMapOvr>
+    <a:masterClrMapping/>
+  </p:clrMapOvr>
+</p:sld>
+</file>
+
+<file path=ppt/slides/slide27.xml><?xml version="1.0" encoding="utf-8"?>
+<p:sld xmlns:a="http://schemas.openxmlformats.org/drawingml/2006/main" xmlns:r="http://schemas.openxmlformats.org/officeDocument/2006/relationships" xmlns:p="http://schemas.openxmlformats.org/presentationml/2006/main">
+  <p:cSld>
+    <p:spTree>
+      <p:nvGrpSpPr>
+        <p:cNvPr id="1" name=""/>
+        <p:cNvGrpSpPr/>
+        <p:nvPr/>
+      </p:nvGrpSpPr>
+      <p:grpSpPr>
+        <a:xfrm>
+          <a:off x="0" y="0"/>
+          <a:ext cx="0" cy="0"/>
+          <a:chOff x="0" y="0"/>
+          <a:chExt cx="0" cy="0"/>
+        </a:xfrm>
+      </p:grpSpPr>
+      <p:sp>
+        <p:nvSpPr>
+          <p:cNvPr id="2" name="Title 1">
+            <a:extLst>
+              <a:ext uri="{FF2B5EF4-FFF2-40B4-BE49-F238E27FC236}">
+                <a16:creationId xmlns:a16="http://schemas.microsoft.com/office/drawing/2014/main" id="{44AA2370-0592-4619-AED2-83B280426205}"/>
+              </a:ext>
+            </a:extLst>
+          </p:cNvPr>
+          <p:cNvSpPr>
+            <a:spLocks noGrp="1"/>
+          </p:cNvSpPr>
+          <p:nvPr>
+            <p:ph type="title"/>
+          </p:nvPr>
+        </p:nvSpPr>
+        <p:spPr/>
+        <p:txBody>
+          <a:bodyPr>
+            <a:normAutofit fontScale="90000"/>
+          </a:bodyPr>
+          <a:lstStyle/>
+          <a:p>
+            <a:r>
+              <a:rPr lang="en-US" dirty="0"/>
+              <a:t>In meeting, we talked about doing two </a:t>
+            </a:r>
+            <a:r>
+              <a:rPr lang="en-US" dirty="0" err="1"/>
+              <a:t>timesteppers</a:t>
+            </a:r>
+            <a:r>
+              <a:rPr lang="en-US" dirty="0"/>
+              <a:t>. 1 for big area, and 1 for smaller high error area</a:t>
+            </a:r>
+          </a:p>
+        </p:txBody>
+      </p:sp>
+      <p:pic>
+        <p:nvPicPr>
+          <p:cNvPr id="11268" name="Picture 4">
+            <a:extLst>
+              <a:ext uri="{FF2B5EF4-FFF2-40B4-BE49-F238E27FC236}">
+                <a16:creationId xmlns:a16="http://schemas.microsoft.com/office/drawing/2014/main" id="{0037A314-9612-4F50-9414-47CEAB10C4D3}"/>
+              </a:ext>
+            </a:extLst>
+          </p:cNvPr>
+          <p:cNvPicPr>
+            <a:picLocks noChangeAspect="1" noChangeArrowheads="1"/>
+          </p:cNvPicPr>
+          <p:nvPr/>
+        </p:nvPicPr>
+        <p:blipFill>
+          <a:blip r:embed="rId2">
+            <a:extLst>
+              <a:ext uri="{28A0092B-C50C-407E-A947-70E740481C1C}">
+                <a14:useLocalDpi xmlns:a14="http://schemas.microsoft.com/office/drawing/2010/main" val="0"/>
+              </a:ext>
+            </a:extLst>
+          </a:blip>
+          <a:srcRect/>
+          <a:stretch>
+            <a:fillRect/>
+          </a:stretch>
+        </p:blipFill>
+        <p:spPr bwMode="auto">
+          <a:xfrm>
+            <a:off x="499952" y="1973669"/>
+            <a:ext cx="3600450" cy="2400300"/>
+          </a:xfrm>
+          <a:prstGeom prst="rect">
+            <a:avLst/>
+          </a:prstGeom>
+          <a:noFill/>
+          <a:extLst>
+            <a:ext uri="{909E8E84-426E-40DD-AFC4-6F175D3DCCD1}">
+              <a14:hiddenFill xmlns:a14="http://schemas.microsoft.com/office/drawing/2010/main">
+                <a:solidFill>
+                  <a:srgbClr val="FFFFFF"/>
+                </a:solidFill>
+              </a14:hiddenFill>
+            </a:ext>
+          </a:extLst>
+        </p:spPr>
+      </p:pic>
+      <p:pic>
+        <p:nvPicPr>
+          <p:cNvPr id="11270" name="Picture 6">
+            <a:extLst>
+              <a:ext uri="{FF2B5EF4-FFF2-40B4-BE49-F238E27FC236}">
+                <a16:creationId xmlns:a16="http://schemas.microsoft.com/office/drawing/2014/main" id="{7DC32418-8BA9-4FB7-AB5A-F6DD0C4F9BCA}"/>
+              </a:ext>
+            </a:extLst>
+          </p:cNvPr>
+          <p:cNvPicPr>
+            <a:picLocks noChangeAspect="1" noChangeArrowheads="1"/>
+          </p:cNvPicPr>
+          <p:nvPr/>
+        </p:nvPicPr>
+        <p:blipFill>
+          <a:blip r:embed="rId3">
+            <a:extLst>
+              <a:ext uri="{28A0092B-C50C-407E-A947-70E740481C1C}">
+                <a14:useLocalDpi xmlns:a14="http://schemas.microsoft.com/office/drawing/2010/main" val="0"/>
+              </a:ext>
+            </a:extLst>
+          </a:blip>
+          <a:srcRect/>
+          <a:stretch>
+            <a:fillRect/>
+          </a:stretch>
+        </p:blipFill>
+        <p:spPr bwMode="auto">
+          <a:xfrm>
+            <a:off x="499952" y="4656950"/>
+            <a:ext cx="3903825" cy="1569410"/>
+          </a:xfrm>
+          <a:prstGeom prst="rect">
+            <a:avLst/>
+          </a:prstGeom>
+          <a:noFill/>
+          <a:extLst>
+            <a:ext uri="{909E8E84-426E-40DD-AFC4-6F175D3DCCD1}">
+              <a14:hiddenFill xmlns:a14="http://schemas.microsoft.com/office/drawing/2010/main">
+                <a:solidFill>
+                  <a:srgbClr val="FFFFFF"/>
+                </a:solidFill>
+              </a14:hiddenFill>
+            </a:ext>
+          </a:extLst>
+        </p:spPr>
+      </p:pic>
+      <p:sp>
+        <p:nvSpPr>
+          <p:cNvPr id="4" name="TextBox 3">
+            <a:extLst>
+              <a:ext uri="{FF2B5EF4-FFF2-40B4-BE49-F238E27FC236}">
+                <a16:creationId xmlns:a16="http://schemas.microsoft.com/office/drawing/2014/main" id="{C231B73E-9FA5-46C9-9DE9-E9C9732B7460}"/>
+              </a:ext>
+            </a:extLst>
+          </p:cNvPr>
+          <p:cNvSpPr txBox="1"/>
+          <p:nvPr/>
+        </p:nvSpPr>
+        <p:spPr>
+          <a:xfrm>
+            <a:off x="988828" y="3173819"/>
+            <a:ext cx="2745047" cy="369332"/>
+          </a:xfrm>
+          <a:prstGeom prst="rect">
+            <a:avLst/>
+          </a:prstGeom>
+          <a:noFill/>
+        </p:spPr>
+        <p:txBody>
+          <a:bodyPr wrap="none" rtlCol="0">
+            <a:spAutoFit/>
+          </a:bodyPr>
+          <a:lstStyle/>
+          <a:p>
+            <a:r>
+              <a:rPr lang="en-US" dirty="0"/>
+              <a:t>1 example of smaller chunk</a:t>
+            </a:r>
+          </a:p>
+        </p:txBody>
+      </p:sp>
+      <p:sp>
+        <p:nvSpPr>
+          <p:cNvPr id="8" name="TextBox 7">
+            <a:extLst>
+              <a:ext uri="{FF2B5EF4-FFF2-40B4-BE49-F238E27FC236}">
+                <a16:creationId xmlns:a16="http://schemas.microsoft.com/office/drawing/2014/main" id="{0468E8B1-509F-4152-AE1D-CD457A96B8B8}"/>
+              </a:ext>
+            </a:extLst>
+          </p:cNvPr>
+          <p:cNvSpPr txBox="1"/>
+          <p:nvPr/>
+        </p:nvSpPr>
+        <p:spPr>
+          <a:xfrm>
+            <a:off x="1173125" y="5102817"/>
+            <a:ext cx="2263248" cy="369332"/>
+          </a:xfrm>
+          <a:prstGeom prst="rect">
+            <a:avLst/>
+          </a:prstGeom>
+          <a:noFill/>
+        </p:spPr>
+        <p:txBody>
+          <a:bodyPr wrap="none" rtlCol="0">
+            <a:spAutoFit/>
+          </a:bodyPr>
+          <a:lstStyle/>
+          <a:p>
+            <a:r>
+              <a:rPr lang="en-US" dirty="0"/>
+              <a:t>Error of smaller chunk</a:t>
+            </a:r>
+          </a:p>
+        </p:txBody>
+      </p:sp>
+      <p:pic>
+        <p:nvPicPr>
+          <p:cNvPr id="11272" name="Picture 8">
+            <a:extLst>
+              <a:ext uri="{FF2B5EF4-FFF2-40B4-BE49-F238E27FC236}">
+                <a16:creationId xmlns:a16="http://schemas.microsoft.com/office/drawing/2014/main" id="{BBE95707-0187-4BFF-B68E-987FB69A2E48}"/>
+              </a:ext>
+            </a:extLst>
+          </p:cNvPr>
+          <p:cNvPicPr>
+            <a:picLocks noChangeAspect="1" noChangeArrowheads="1"/>
+          </p:cNvPicPr>
+          <p:nvPr/>
+        </p:nvPicPr>
+        <p:blipFill>
+          <a:blip r:embed="rId4">
+            <a:extLst>
+              <a:ext uri="{28A0092B-C50C-407E-A947-70E740481C1C}">
+                <a14:useLocalDpi xmlns:a14="http://schemas.microsoft.com/office/drawing/2010/main" val="0"/>
+              </a:ext>
+            </a:extLst>
+          </a:blip>
+          <a:srcRect/>
+          <a:stretch>
+            <a:fillRect/>
+          </a:stretch>
+        </p:blipFill>
+        <p:spPr bwMode="auto">
+          <a:xfrm>
+            <a:off x="4714695" y="1877976"/>
+            <a:ext cx="3571875" cy="2400300"/>
+          </a:xfrm>
+          <a:prstGeom prst="rect">
+            <a:avLst/>
+          </a:prstGeom>
+          <a:noFill/>
+          <a:extLst>
+            <a:ext uri="{909E8E84-426E-40DD-AFC4-6F175D3DCCD1}">
+              <a14:hiddenFill xmlns:a14="http://schemas.microsoft.com/office/drawing/2010/main">
+                <a:solidFill>
+                  <a:srgbClr val="FFFFFF"/>
+                </a:solidFill>
+              </a14:hiddenFill>
+            </a:ext>
+          </a:extLst>
+        </p:spPr>
+      </p:pic>
+      <p:pic>
+        <p:nvPicPr>
+          <p:cNvPr id="11274" name="Picture 10">
+            <a:extLst>
+              <a:ext uri="{FF2B5EF4-FFF2-40B4-BE49-F238E27FC236}">
+                <a16:creationId xmlns:a16="http://schemas.microsoft.com/office/drawing/2014/main" id="{636D1B6C-947A-4524-B8EE-A944DB6BDFE1}"/>
+              </a:ext>
+            </a:extLst>
+          </p:cNvPr>
+          <p:cNvPicPr>
+            <a:picLocks noChangeAspect="1" noChangeArrowheads="1"/>
+          </p:cNvPicPr>
+          <p:nvPr/>
+        </p:nvPicPr>
+        <p:blipFill>
+          <a:blip r:embed="rId5">
+            <a:extLst>
+              <a:ext uri="{28A0092B-C50C-407E-A947-70E740481C1C}">
+                <a14:useLocalDpi xmlns:a14="http://schemas.microsoft.com/office/drawing/2010/main" val="0"/>
+              </a:ext>
+            </a:extLst>
+          </a:blip>
+          <a:srcRect/>
+          <a:stretch>
+            <a:fillRect/>
+          </a:stretch>
+        </p:blipFill>
+        <p:spPr bwMode="auto">
+          <a:xfrm>
+            <a:off x="4654513" y="4729974"/>
+            <a:ext cx="3692241" cy="1484349"/>
+          </a:xfrm>
+          <a:prstGeom prst="rect">
+            <a:avLst/>
+          </a:prstGeom>
+          <a:noFill/>
+          <a:extLst>
+            <a:ext uri="{909E8E84-426E-40DD-AFC4-6F175D3DCCD1}">
+              <a14:hiddenFill xmlns:a14="http://schemas.microsoft.com/office/drawing/2010/main">
+                <a:solidFill>
+                  <a:srgbClr val="FFFFFF"/>
+                </a:solidFill>
+              </a14:hiddenFill>
+            </a:ext>
+          </a:extLst>
+        </p:spPr>
+      </p:pic>
+    </p:spTree>
+    <p:extLst>
+      <p:ext uri="{BB962C8B-B14F-4D97-AF65-F5344CB8AC3E}">
+        <p14:creationId xmlns:p14="http://schemas.microsoft.com/office/powerpoint/2010/main" val="2196649931"/>
+      </p:ext>
+    </p:extLst>
+  </p:cSld>
+  <p:clrMapOvr>
+    <a:masterClrMapping/>
+  </p:clrMapOvr>
+</p:sld>
+</file>
+
+<file path=ppt/slides/slide28.xml><?xml version="1.0" encoding="utf-8"?>
+<p:sld xmlns:a="http://schemas.openxmlformats.org/drawingml/2006/main" xmlns:r="http://schemas.openxmlformats.org/officeDocument/2006/relationships" xmlns:p="http://schemas.openxmlformats.org/presentationml/2006/main">
+  <p:cSld>
+    <p:spTree>
+      <p:nvGrpSpPr>
+        <p:cNvPr id="1" name=""/>
+        <p:cNvGrpSpPr/>
+        <p:nvPr/>
+      </p:nvGrpSpPr>
+      <p:grpSpPr>
+        <a:xfrm>
+          <a:off x="0" y="0"/>
+          <a:ext cx="0" cy="0"/>
+          <a:chOff x="0" y="0"/>
+          <a:chExt cx="0" cy="0"/>
+        </a:xfrm>
+      </p:grpSpPr>
+      <p:sp>
+        <p:nvSpPr>
+          <p:cNvPr id="2" name="Title 1">
+            <a:extLst>
+              <a:ext uri="{FF2B5EF4-FFF2-40B4-BE49-F238E27FC236}">
+                <a16:creationId xmlns:a16="http://schemas.microsoft.com/office/drawing/2014/main" id="{1F8D5C4D-3C83-416B-A77B-6E2A296FAB4A}"/>
+              </a:ext>
+            </a:extLst>
+          </p:cNvPr>
+          <p:cNvSpPr>
+            <a:spLocks noGrp="1"/>
+          </p:cNvSpPr>
+          <p:nvPr>
+            <p:ph type="title"/>
+          </p:nvPr>
+        </p:nvSpPr>
+        <p:spPr/>
+        <p:txBody>
+          <a:bodyPr/>
+          <a:lstStyle/>
+          <a:p>
+            <a:endParaRPr lang="en-US"/>
+          </a:p>
+        </p:txBody>
+      </p:sp>
+      <p:sp>
+        <p:nvSpPr>
+          <p:cNvPr id="3" name="Content Placeholder 2">
+            <a:extLst>
+              <a:ext uri="{FF2B5EF4-FFF2-40B4-BE49-F238E27FC236}">
+                <a16:creationId xmlns:a16="http://schemas.microsoft.com/office/drawing/2014/main" id="{B159A94B-7E79-4AFD-AB75-119AF1854FC7}"/>
+              </a:ext>
+            </a:extLst>
+          </p:cNvPr>
+          <p:cNvSpPr>
+            <a:spLocks noGrp="1"/>
+          </p:cNvSpPr>
+          <p:nvPr>
+            <p:ph idx="1"/>
+          </p:nvPr>
+        </p:nvSpPr>
+        <p:spPr/>
+        <p:txBody>
+          <a:bodyPr/>
+          <a:lstStyle/>
+          <a:p>
+            <a:endParaRPr lang="en-US"/>
+          </a:p>
+        </p:txBody>
+      </p:sp>
+    </p:spTree>
+    <p:extLst>
+      <p:ext uri="{BB962C8B-B14F-4D97-AF65-F5344CB8AC3E}">
+        <p14:creationId xmlns:p14="http://schemas.microsoft.com/office/powerpoint/2010/main" val="2752307464"/>
+      </p:ext>
+    </p:extLst>
+  </p:cSld>
+  <p:clrMapOvr>
+    <a:masterClrMapping/>
+  </p:clrMapOvr>
+</p:sld>
+</file>
+
+<file path=ppt/slides/slide29.xml><?xml version="1.0" encoding="utf-8"?>
+<p:sld xmlns:a="http://schemas.openxmlformats.org/drawingml/2006/main" xmlns:r="http://schemas.openxmlformats.org/officeDocument/2006/relationships" xmlns:p="http://schemas.openxmlformats.org/presentationml/2006/main">
+  <p:cSld>
+    <p:spTree>
+      <p:nvGrpSpPr>
+        <p:cNvPr id="1" name=""/>
+        <p:cNvGrpSpPr/>
+        <p:nvPr/>
+      </p:nvGrpSpPr>
+      <p:grpSpPr>
+        <a:xfrm>
+          <a:off x="0" y="0"/>
+          <a:ext cx="0" cy="0"/>
+          <a:chOff x="0" y="0"/>
+          <a:chExt cx="0" cy="0"/>
+        </a:xfrm>
+      </p:grpSpPr>
+      <p:sp>
+        <p:nvSpPr>
+          <p:cNvPr id="2" name="Title 1">
+            <a:extLst>
+              <a:ext uri="{FF2B5EF4-FFF2-40B4-BE49-F238E27FC236}">
+                <a16:creationId xmlns:a16="http://schemas.microsoft.com/office/drawing/2014/main" id="{864D0340-A2D8-45ED-8571-6852DDB7A550}"/>
+              </a:ext>
+            </a:extLst>
+          </p:cNvPr>
+          <p:cNvSpPr>
+            <a:spLocks noGrp="1"/>
+          </p:cNvSpPr>
+          <p:nvPr>
+            <p:ph type="title"/>
+          </p:nvPr>
+        </p:nvSpPr>
+        <p:spPr/>
+        <p:txBody>
+          <a:bodyPr/>
+          <a:lstStyle/>
+          <a:p>
+            <a:endParaRPr lang="en-US"/>
+          </a:p>
+        </p:txBody>
+      </p:sp>
+      <p:sp>
+        <p:nvSpPr>
+          <p:cNvPr id="3" name="Content Placeholder 2">
+            <a:extLst>
+              <a:ext uri="{FF2B5EF4-FFF2-40B4-BE49-F238E27FC236}">
+                <a16:creationId xmlns:a16="http://schemas.microsoft.com/office/drawing/2014/main" id="{D0981921-0FD1-4EB8-B966-2749C03CA761}"/>
+              </a:ext>
+            </a:extLst>
+          </p:cNvPr>
+          <p:cNvSpPr>
+            <a:spLocks noGrp="1"/>
+          </p:cNvSpPr>
+          <p:nvPr>
+            <p:ph idx="1"/>
+          </p:nvPr>
+        </p:nvSpPr>
+        <p:spPr/>
+        <p:txBody>
+          <a:bodyPr/>
+          <a:lstStyle/>
+          <a:p>
+            <a:endParaRPr lang="en-US"/>
+          </a:p>
+        </p:txBody>
+      </p:sp>
+    </p:spTree>
+    <p:extLst>
+      <p:ext uri="{BB962C8B-B14F-4D97-AF65-F5344CB8AC3E}">
+        <p14:creationId xmlns:p14="http://schemas.microsoft.com/office/powerpoint/2010/main" val="3430631820"/>
       </p:ext>
     </p:extLst>
   </p:cSld>

</xml_diff>